<commit_message>
Added things to the text and presentation.
</commit_message>
<xml_diff>
--- a/Презентація.pptx
+++ b/Презентація.pptx
@@ -5,10 +5,10 @@
     <p:sldMasterId id="2147483672" r:id="rId4"/>
   </p:sldMasterIdLst>
   <p:notesMasterIdLst>
-    <p:notesMasterId r:id="rId14"/>
+    <p:notesMasterId r:id="rId13"/>
   </p:notesMasterIdLst>
   <p:handoutMasterIdLst>
-    <p:handoutMasterId r:id="rId15"/>
+    <p:handoutMasterId r:id="rId14"/>
   </p:handoutMasterIdLst>
   <p:sldIdLst>
     <p:sldId id="256" r:id="rId5"/>
@@ -17,9 +17,8 @@
     <p:sldId id="263" r:id="rId8"/>
     <p:sldId id="267" r:id="rId9"/>
     <p:sldId id="264" r:id="rId10"/>
-    <p:sldId id="265" r:id="rId11"/>
-    <p:sldId id="266" r:id="rId12"/>
-    <p:sldId id="260" r:id="rId13"/>
+    <p:sldId id="266" r:id="rId11"/>
+    <p:sldId id="260" r:id="rId12"/>
   </p:sldIdLst>
   <p:sldSz cx="12192000" cy="6858000"/>
   <p:notesSz cx="6858000" cy="9144000"/>
@@ -223,7 +222,7 @@
           <a:p>
             <a:fld id="{5F74F37C-98E3-412F-A35C-7471F7294D92}" type="datetimeFigureOut">
               <a:rPr lang="uk-UA" smtClean="0"/>
-              <a:t>16.05.2024</a:t>
+              <a:t>22.05.2024</a:t>
             </a:fld>
             <a:endParaRPr lang="uk-UA" dirty="0"/>
           </a:p>
@@ -400,7 +399,7 @@
           <a:p>
             <a:fld id="{59565208-CF09-4A44-A663-78C7B33DBD2F}" type="datetimeFigureOut">
               <a:rPr lang="uk-UA" smtClean="0"/>
-              <a:t>16.05.2024</a:t>
+              <a:t>22.05.2024</a:t>
             </a:fld>
             <a:endParaRPr lang="uk-UA" dirty="0"/>
           </a:p>
@@ -816,7 +815,7 @@
           <a:p>
             <a:fld id="{8FA1084C-1EEB-4972-B6B0-38F58FF93479}" type="slidenum">
               <a:rPr lang="uk-UA" smtClean="0"/>
-              <a:t>9</a:t>
+              <a:t>8</a:t>
             </a:fld>
             <a:endParaRPr lang="uk-UA" dirty="0"/>
           </a:p>
@@ -1090,7 +1089,7 @@
             <a:pPr rtl="0"/>
             <a:fld id="{DAC99A6E-032B-4CB6-8CD9-55CA8F04A702}" type="datetime1">
               <a:rPr lang="uk-UA" smtClean="0"/>
-              <a:t>16.05.2024</a:t>
+              <a:t>22.05.2024</a:t>
             </a:fld>
             <a:endParaRPr lang="uk-UA" dirty="0"/>
           </a:p>
@@ -1364,7 +1363,7 @@
             <a:pPr rtl="0"/>
             <a:fld id="{4F2ECFDB-0BF4-48F3-8DB1-8C195F7AB40E}" type="datetime1">
               <a:rPr lang="uk-UA" smtClean="0"/>
-              <a:t>16.05.2024</a:t>
+              <a:t>22.05.2024</a:t>
             </a:fld>
             <a:endParaRPr lang="uk-UA" dirty="0"/>
           </a:p>
@@ -1611,7 +1610,7 @@
             <a:pPr rtl="0"/>
             <a:fld id="{94779907-BF1B-417B-8654-43330472825B}" type="datetime1">
               <a:rPr lang="uk-UA" smtClean="0"/>
-              <a:t>16.05.2024</a:t>
+              <a:t>22.05.2024</a:t>
             </a:fld>
             <a:endParaRPr lang="uk-UA" dirty="0"/>
           </a:p>
@@ -1863,7 +1862,7 @@
             <a:pPr rtl="0"/>
             <a:fld id="{CBDE2BE2-2E65-4D7E-BE55-FB3A839C5DF4}" type="datetime1">
               <a:rPr lang="uk-UA" smtClean="0"/>
-              <a:t>16.05.2024</a:t>
+              <a:t>22.05.2024</a:t>
             </a:fld>
             <a:endParaRPr lang="uk-UA" dirty="0"/>
           </a:p>
@@ -2182,7 +2181,7 @@
             <a:pPr rtl="0"/>
             <a:fld id="{5C608984-9B96-4952-861D-7860396CCD38}" type="datetime1">
               <a:rPr lang="uk-UA" smtClean="0"/>
-              <a:t>16.05.2024</a:t>
+              <a:t>22.05.2024</a:t>
             </a:fld>
             <a:endParaRPr lang="uk-UA" dirty="0"/>
           </a:p>
@@ -2496,7 +2495,7 @@
             <a:pPr rtl="0"/>
             <a:fld id="{814056BD-1950-4F9C-9C9F-3A3FA4F35AE2}" type="datetime1">
               <a:rPr lang="uk-UA" smtClean="0"/>
-              <a:t>16.05.2024</a:t>
+              <a:t>22.05.2024</a:t>
             </a:fld>
             <a:endParaRPr lang="uk-UA" dirty="0"/>
           </a:p>
@@ -2932,7 +2931,7 @@
             <a:pPr rtl="0"/>
             <a:fld id="{509D2646-490E-4A78-8039-4B1A6476AFA2}" type="datetime1">
               <a:rPr lang="uk-UA" smtClean="0"/>
-              <a:t>16.05.2024</a:t>
+              <a:t>22.05.2024</a:t>
             </a:fld>
             <a:endParaRPr lang="uk-UA" dirty="0"/>
           </a:p>
@@ -3031,7 +3030,7 @@
             <a:pPr rtl="0"/>
             <a:fld id="{07EA9FB3-2DCA-4CAB-B91B-7DEF0114FDF3}" type="datetime1">
               <a:rPr lang="uk-UA" smtClean="0"/>
-              <a:t>16.05.2024</a:t>
+              <a:t>22.05.2024</a:t>
             </a:fld>
             <a:endParaRPr lang="uk-UA" dirty="0"/>
           </a:p>
@@ -3205,7 +3204,7 @@
             <a:pPr rtl="0"/>
             <a:fld id="{3767AE29-5ECE-4105-882B-0D5E1EBB7150}" type="datetime1">
               <a:rPr lang="uk-UA" smtClean="0"/>
-              <a:t>16.05.2024</a:t>
+              <a:t>22.05.2024</a:t>
             </a:fld>
             <a:endParaRPr lang="uk-UA" dirty="0"/>
           </a:p>
@@ -3596,7 +3595,7 @@
             <a:pPr rtl="0"/>
             <a:fld id="{13058907-C203-47FF-9A8D-C65C17B5DAF4}" type="datetime1">
               <a:rPr lang="uk-UA" smtClean="0"/>
-              <a:t>16.05.2024</a:t>
+              <a:t>22.05.2024</a:t>
             </a:fld>
             <a:endParaRPr lang="uk-UA" dirty="0"/>
           </a:p>
@@ -3892,7 +3891,7 @@
             <a:pPr rtl="0"/>
             <a:fld id="{2F7A4F20-7A7D-4C7B-84F4-51B486B4BA97}" type="datetime1">
               <a:rPr lang="uk-UA" smtClean="0"/>
-              <a:t>16.05.2024</a:t>
+              <a:t>22.05.2024</a:t>
             </a:fld>
             <a:endParaRPr lang="uk-UA" dirty="0"/>
           </a:p>
@@ -4108,7 +4107,7 @@
             <a:pPr rtl="0"/>
             <a:fld id="{F2F1A5F0-8F49-4709-8BD0-BECD0576185C}" type="datetime1">
               <a:rPr lang="uk-UA" noProof="0" smtClean="0"/>
-              <a:t>16.05.2024</a:t>
+              <a:t>22.05.2024</a:t>
             </a:fld>
             <a:endParaRPr lang="uk-UA" noProof="0"/>
           </a:p>
@@ -5223,138 +5222,258 @@
           <a:p>
             <a:r>
               <a:rPr lang="uk-UA" dirty="0"/>
-              <a:t>Вступ</a:t>
+              <a:t>ПОСТАНОВКА ЗАДАЧІ</a:t>
             </a:r>
           </a:p>
         </p:txBody>
       </p:sp>
-      <p:sp>
-        <p:nvSpPr>
-          <p:cNvPr id="3" name="Місце для вмісту 2">
-            <a:extLst>
-              <a:ext uri="{FF2B5EF4-FFF2-40B4-BE49-F238E27FC236}">
-                <a16:creationId xmlns:a16="http://schemas.microsoft.com/office/drawing/2014/main" id="{06BE9431-1ECD-4856-AA19-6D7AE8DD7A25}"/>
-              </a:ext>
-            </a:extLst>
-          </p:cNvPr>
-          <p:cNvSpPr>
-            <a:spLocks noGrp="1"/>
-          </p:cNvSpPr>
-          <p:nvPr>
-            <p:ph idx="1"/>
-          </p:nvPr>
-        </p:nvSpPr>
-        <p:spPr/>
-        <p:txBody>
-          <a:bodyPr/>
-          <a:lstStyle/>
-          <a:p>
-            <a:pPr marL="0" indent="0">
-              <a:buNone/>
-            </a:pPr>
-            <a:r>
-              <a:rPr lang="uk-UA" dirty="0"/>
-              <a:t>Гострий </a:t>
-            </a:r>
-            <a:r>
-              <a:rPr lang="uk-UA" dirty="0" err="1"/>
-              <a:t>лімфобластний</a:t>
-            </a:r>
-            <a:r>
-              <a:rPr lang="uk-UA" dirty="0"/>
-              <a:t> лейкоз (</a:t>
-            </a:r>
-            <a:r>
-              <a:rPr lang="de-DE" dirty="0" err="1"/>
-              <a:t>Acute</a:t>
-            </a:r>
-            <a:r>
-              <a:rPr lang="de-DE" dirty="0"/>
-              <a:t> </a:t>
-            </a:r>
-            <a:r>
-              <a:rPr lang="de-DE" dirty="0" err="1"/>
-              <a:t>lymphoblastic</a:t>
-            </a:r>
-            <a:r>
-              <a:rPr lang="de-DE" dirty="0"/>
-              <a:t> </a:t>
-            </a:r>
-            <a:r>
-              <a:rPr lang="de-DE" dirty="0" err="1"/>
-              <a:t>leukemia</a:t>
-            </a:r>
-            <a:r>
-              <a:rPr lang="de-DE" dirty="0"/>
-              <a:t>, </a:t>
-            </a:r>
-            <a:r>
-              <a:rPr lang="uk-UA" dirty="0"/>
-              <a:t>ГЛЛ, </a:t>
-            </a:r>
-            <a:r>
-              <a:rPr lang="de-DE" dirty="0"/>
-              <a:t>ALL) – </a:t>
-            </a:r>
-            <a:r>
-              <a:rPr lang="uk-UA" dirty="0"/>
-              <a:t>онкологічне захворювання клітин крови (зокрема, </a:t>
-            </a:r>
-            <a:r>
-              <a:rPr lang="en-US" dirty="0"/>
-              <a:t>T-</a:t>
-            </a:r>
-            <a:r>
-              <a:rPr lang="uk-UA" dirty="0"/>
-              <a:t>лімфоцитів та </a:t>
-            </a:r>
-            <a:r>
-              <a:rPr lang="en-US" dirty="0"/>
-              <a:t>B-</a:t>
-            </a:r>
-            <a:r>
-              <a:rPr lang="uk-UA" dirty="0"/>
-              <a:t>лімфоцитів).</a:t>
-            </a:r>
-          </a:p>
-          <a:p>
-            <a:pPr marL="0" indent="0">
-              <a:buNone/>
-            </a:pPr>
-            <a:r>
-              <a:rPr lang="uk-UA" dirty="0"/>
-              <a:t>Об’єкт</a:t>
-            </a:r>
-          </a:p>
-          <a:p>
-            <a:pPr marL="0" indent="0">
-              <a:buNone/>
-            </a:pPr>
-            <a:r>
-              <a:rPr lang="uk-UA" dirty="0"/>
-              <a:t>Предмет</a:t>
-            </a:r>
-          </a:p>
-          <a:p>
-            <a:pPr marL="0" indent="0">
-              <a:buNone/>
-            </a:pPr>
-            <a:r>
-              <a:rPr lang="uk-UA" dirty="0"/>
-              <a:t>Мета</a:t>
-            </a:r>
-          </a:p>
-          <a:p>
-            <a:pPr marL="0" indent="0">
-              <a:buNone/>
-            </a:pPr>
-            <a:r>
-              <a:rPr lang="uk-UA" dirty="0"/>
-              <a:t>Завдання</a:t>
-            </a:r>
-          </a:p>
-        </p:txBody>
-      </p:sp>
+      <mc:AlternateContent xmlns:mc="http://schemas.openxmlformats.org/markup-compatibility/2006">
+        <mc:Choice xmlns:a14="http://schemas.microsoft.com/office/drawing/2010/main" Requires="a14">
+          <p:sp>
+            <p:nvSpPr>
+              <p:cNvPr id="3" name="Місце для вмісту 2">
+                <a:extLst>
+                  <a:ext uri="{FF2B5EF4-FFF2-40B4-BE49-F238E27FC236}">
+                    <a16:creationId xmlns:a16="http://schemas.microsoft.com/office/drawing/2014/main" id="{06BE9431-1ECD-4856-AA19-6D7AE8DD7A25}"/>
+                  </a:ext>
+                </a:extLst>
+              </p:cNvPr>
+              <p:cNvSpPr>
+                <a:spLocks noGrp="1"/>
+              </p:cNvSpPr>
+              <p:nvPr>
+                <p:ph idx="1"/>
+              </p:nvPr>
+            </p:nvSpPr>
+            <p:spPr>
+              <a:xfrm>
+                <a:off x="581192" y="2477541"/>
+                <a:ext cx="11029615" cy="3678303"/>
+              </a:xfrm>
+            </p:spPr>
+            <p:txBody>
+              <a:bodyPr>
+                <a:noAutofit/>
+              </a:bodyPr>
+              <a:lstStyle/>
+              <a:p>
+                <a:pPr marL="0" indent="0">
+                  <a:buNone/>
+                </a:pPr>
+                <a:r>
+                  <a:rPr lang="uk-UA" sz="2400" dirty="0"/>
+                  <a:t>Гострий </a:t>
+                </a:r>
+                <a:r>
+                  <a:rPr lang="uk-UA" sz="2400" dirty="0" err="1"/>
+                  <a:t>лімфобластний</a:t>
+                </a:r>
+                <a:r>
+                  <a:rPr lang="uk-UA" sz="2400" dirty="0"/>
+                  <a:t> лейкоз (</a:t>
+                </a:r>
+                <a:r>
+                  <a:rPr lang="de-DE" sz="2400" dirty="0" err="1"/>
+                  <a:t>Acute</a:t>
+                </a:r>
+                <a:r>
+                  <a:rPr lang="de-DE" sz="2400" dirty="0"/>
+                  <a:t> </a:t>
+                </a:r>
+                <a:r>
+                  <a:rPr lang="de-DE" sz="2400" dirty="0" err="1"/>
+                  <a:t>lymphoblastic</a:t>
+                </a:r>
+                <a:r>
+                  <a:rPr lang="de-DE" sz="2400" dirty="0"/>
+                  <a:t> </a:t>
+                </a:r>
+                <a:r>
+                  <a:rPr lang="de-DE" sz="2400" dirty="0" err="1"/>
+                  <a:t>leukemia</a:t>
+                </a:r>
+                <a:r>
+                  <a:rPr lang="de-DE" sz="2400" dirty="0"/>
+                  <a:t>, </a:t>
+                </a:r>
+                <a:r>
+                  <a:rPr lang="uk-UA" sz="2400" dirty="0"/>
+                  <a:t>ГЛЛ, </a:t>
+                </a:r>
+                <a:r>
+                  <a:rPr lang="de-DE" sz="2400" dirty="0"/>
+                  <a:t>ALL) – </a:t>
+                </a:r>
+                <a:r>
+                  <a:rPr lang="uk-UA" sz="2400" dirty="0"/>
+                  <a:t>онкологічне захворювання клітин крови (зокрема, </a:t>
+                </a:r>
+                <a:r>
+                  <a:rPr lang="en-US" sz="2400" dirty="0"/>
+                  <a:t>T-</a:t>
+                </a:r>
+                <a:r>
+                  <a:rPr lang="uk-UA" sz="2400" dirty="0"/>
+                  <a:t>лімфоцитів та </a:t>
+                </a:r>
+                <a:r>
+                  <a:rPr lang="en-US" sz="2400" dirty="0"/>
+                  <a:t>B-</a:t>
+                </a:r>
+                <a:r>
+                  <a:rPr lang="uk-UA" sz="2400" dirty="0"/>
+                  <a:t>лімфоцитів).</a:t>
+                </a:r>
+              </a:p>
+              <a:p>
+                <a:pPr marL="0" indent="0">
+                  <a:buNone/>
+                </a:pPr>
+                <a:r>
+                  <a:rPr lang="uk-UA" sz="2400" dirty="0"/>
+                  <a:t>Мета</a:t>
+                </a:r>
+                <a:r>
+                  <a:rPr lang="en-US" sz="2400" dirty="0"/>
+                  <a:t> </a:t>
+                </a:r>
+                <a:r>
+                  <a:rPr lang="uk-UA" sz="2400" dirty="0"/>
+                  <a:t>– застосувати методи статистичного аналізу для встановлення </a:t>
+                </a:r>
+                <a:r>
+                  <a:rPr lang="uk-UA" sz="2400" dirty="0" err="1"/>
+                  <a:t>істотности</a:t>
+                </a:r>
+                <a:r>
+                  <a:rPr lang="uk-UA" sz="2400" dirty="0"/>
+                  <a:t> різниці середніми рівнями експресії генів</a:t>
+                </a:r>
+                <a:r>
+                  <a:rPr lang="en-US" sz="2400" dirty="0"/>
+                  <a:t>.</a:t>
+                </a:r>
+                <a:endParaRPr lang="uk-UA" sz="2400" dirty="0"/>
+              </a:p>
+              <a:p>
+                <a:pPr marL="0" indent="0">
+                  <a:buNone/>
+                </a:pPr>
+                <a:r>
+                  <a:rPr lang="uk-UA" sz="2400" dirty="0"/>
+                  <a:t>Завдання</a:t>
+                </a:r>
+                <a:endParaRPr lang="en-US" sz="2400" dirty="0"/>
+              </a:p>
+              <a:p>
+                <a:pPr lvl="0"/>
+                <a:r>
+                  <a:rPr lang="uk-UA" sz="2400" dirty="0"/>
+                  <a:t>Огляд літератури щодо дослідження генної інформації.</a:t>
+                </a:r>
+              </a:p>
+              <a:p>
+                <a:pPr lvl="0"/>
+                <a:r>
+                  <a:rPr lang="uk-UA" sz="2400" dirty="0"/>
+                  <a:t>Розгляд основних методів статистичного аналізу генетичної інформації.</a:t>
+                </a:r>
+              </a:p>
+              <a:p>
+                <a:pPr lvl="0"/>
+                <a:r>
+                  <a:rPr lang="uk-UA" sz="2400" dirty="0"/>
+                  <a:t>Застосування </a:t>
+                </a:r>
+                <a14:m>
+                  <m:oMath xmlns:m="http://schemas.openxmlformats.org/officeDocument/2006/math">
+                    <m:sSub>
+                      <m:sSubPr>
+                        <m:ctrlPr>
+                          <a:rPr lang="uk-UA" sz="2400" i="1"/>
+                        </m:ctrlPr>
+                      </m:sSubPr>
+                      <m:e>
+                        <m:r>
+                          <a:rPr lang="en-US" sz="2400" i="1"/>
+                          <m:t>𝑇</m:t>
+                        </m:r>
+                      </m:e>
+                      <m:sub>
+                        <m:r>
+                          <a:rPr lang="en-US" sz="2400" i="1"/>
+                          <m:t>𝑛</m:t>
+                        </m:r>
+                      </m:sub>
+                    </m:sSub>
+                  </m:oMath>
+                </a14:m>
+                <a:r>
+                  <a:rPr lang="uk-UA" sz="2400" dirty="0"/>
+                  <a:t> критерію для виявлення статистичної </a:t>
+                </a:r>
+                <a:r>
+                  <a:rPr lang="uk-UA" sz="2400" dirty="0" err="1"/>
+                  <a:t>відмінности</a:t>
+                </a:r>
+                <a:r>
+                  <a:rPr lang="uk-UA" sz="2400" dirty="0"/>
+                  <a:t> між експресією істотних генів.</a:t>
+                </a:r>
+              </a:p>
+              <a:p>
+                <a:pPr marL="0" indent="0">
+                  <a:buNone/>
+                </a:pPr>
+                <a:endParaRPr lang="uk-UA" sz="2400" dirty="0"/>
+              </a:p>
+            </p:txBody>
+          </p:sp>
+        </mc:Choice>
+        <mc:Fallback>
+          <p:sp>
+            <p:nvSpPr>
+              <p:cNvPr id="3" name="Місце для вмісту 2">
+                <a:extLst>
+                  <a:ext uri="{FF2B5EF4-FFF2-40B4-BE49-F238E27FC236}">
+                    <a16:creationId xmlns:a16="http://schemas.microsoft.com/office/drawing/2014/main" id="{06BE9431-1ECD-4856-AA19-6D7AE8DD7A25}"/>
+                  </a:ext>
+                </a:extLst>
+              </p:cNvPr>
+              <p:cNvSpPr>
+                <a:spLocks noGrp="1" noRot="1" noChangeAspect="1" noMove="1" noResize="1" noEditPoints="1" noAdjustHandles="1" noChangeArrowheads="1" noChangeShapeType="1" noTextEdit="1"/>
+              </p:cNvSpPr>
+              <p:nvPr>
+                <p:ph idx="1"/>
+              </p:nvPr>
+            </p:nvSpPr>
+            <p:spPr>
+              <a:xfrm>
+                <a:off x="581192" y="2477541"/>
+                <a:ext cx="11029615" cy="3678303"/>
+              </a:xfrm>
+              <a:blipFill>
+                <a:blip r:embed="rId2"/>
+                <a:stretch>
+                  <a:fillRect l="-829" t="-14570" b="-2815"/>
+                </a:stretch>
+              </a:blipFill>
+            </p:spPr>
+            <p:txBody>
+              <a:bodyPr/>
+              <a:lstStyle/>
+              <a:p>
+                <a:r>
+                  <a:rPr lang="uk-UA">
+                    <a:noFill/>
+                  </a:rPr>
+                  <a:t> </a:t>
+                </a:r>
+              </a:p>
+            </p:txBody>
+          </p:sp>
+        </mc:Fallback>
+      </mc:AlternateContent>
     </p:spTree>
     <p:extLst>
       <p:ext uri="{BB962C8B-B14F-4D97-AF65-F5344CB8AC3E}">
@@ -5436,30 +5555,32 @@
         </p:nvSpPr>
         <p:spPr/>
         <p:txBody>
-          <a:bodyPr/>
+          <a:bodyPr>
+            <a:noAutofit/>
+          </a:bodyPr>
           <a:lstStyle/>
           <a:p>
             <a:pPr marL="0" indent="0">
               <a:buNone/>
             </a:pPr>
             <a:r>
-              <a:rPr lang="uk-UA" dirty="0"/>
+              <a:rPr lang="uk-UA" sz="2400" dirty="0"/>
               <a:t>Містить інформацію про 128 пацієнтів із </a:t>
             </a:r>
             <a:r>
-              <a:rPr lang="en-US" dirty="0"/>
+              <a:rPr lang="en-US" sz="2400" dirty="0"/>
               <a:t>T</a:t>
             </a:r>
             <a:r>
-              <a:rPr lang="uk-UA" dirty="0"/>
+              <a:rPr lang="uk-UA" sz="2400" dirty="0"/>
               <a:t>-лейкемією та </a:t>
             </a:r>
             <a:r>
-              <a:rPr lang="en-US" dirty="0"/>
+              <a:rPr lang="en-US" sz="2400" dirty="0"/>
               <a:t>B</a:t>
             </a:r>
             <a:r>
-              <a:rPr lang="uk-UA" dirty="0"/>
+              <a:rPr lang="uk-UA" sz="2400" dirty="0"/>
               <a:t>-лейкемією та рівень експресії в них 12 625 генів.</a:t>
             </a:r>
           </a:p>
@@ -5468,7 +5589,7 @@
               <a:buNone/>
             </a:pPr>
             <a:r>
-              <a:rPr lang="uk-UA" dirty="0"/>
+              <a:rPr lang="uk-UA" sz="2400" dirty="0"/>
               <a:t>Релевантних для розгляду – 2391 ген.</a:t>
             </a:r>
           </a:p>
@@ -5477,71 +5598,71 @@
               <a:buNone/>
             </a:pPr>
             <a:r>
-              <a:rPr lang="uk-UA" dirty="0"/>
+              <a:rPr lang="uk-UA" sz="2400" dirty="0"/>
               <a:t>Вилучено гени з низьким рівнем експресії для обох типів хвороби та низькою мінливістю (за </a:t>
             </a:r>
             <a:r>
-              <a:rPr lang="en-US" dirty="0"/>
+              <a:rPr lang="en-US" sz="2400" dirty="0"/>
               <a:t>IQR</a:t>
             </a:r>
             <a:r>
-              <a:rPr lang="uk-UA" dirty="0"/>
+              <a:rPr lang="uk-UA" sz="2400" dirty="0"/>
               <a:t>)</a:t>
             </a:r>
             <a:r>
-              <a:rPr lang="en-US" dirty="0"/>
+              <a:rPr lang="en-US" sz="2400" dirty="0"/>
               <a:t>.</a:t>
             </a:r>
-            <a:endParaRPr lang="uk-UA" dirty="0"/>
+            <a:endParaRPr lang="uk-UA" sz="2400" dirty="0"/>
           </a:p>
           <a:p>
             <a:pPr marL="0" indent="0">
               <a:buNone/>
             </a:pPr>
             <a:r>
-              <a:rPr lang="uk-UA" dirty="0"/>
+              <a:rPr lang="uk-UA" sz="2400" dirty="0"/>
               <a:t>37 пацієнтів із </a:t>
             </a:r>
             <a:r>
-              <a:rPr lang="en-US" dirty="0"/>
+              <a:rPr lang="en-US" sz="2400" dirty="0"/>
               <a:t>BCR/ABL, 42 </a:t>
             </a:r>
             <a:r>
-              <a:rPr lang="uk-UA" dirty="0"/>
+              <a:rPr lang="uk-UA" sz="2400" dirty="0"/>
               <a:t>пацієнти з </a:t>
             </a:r>
             <a:r>
-              <a:rPr lang="en-US" dirty="0"/>
+              <a:rPr lang="en-US" sz="2400" dirty="0"/>
               <a:t>NEG (B-</a:t>
             </a:r>
             <a:r>
-              <a:rPr lang="uk-UA" dirty="0"/>
+              <a:rPr lang="uk-UA" sz="2400" dirty="0"/>
               <a:t>лейкемія</a:t>
             </a:r>
             <a:r>
-              <a:rPr lang="en-US" dirty="0"/>
+              <a:rPr lang="en-US" sz="2400" dirty="0"/>
               <a:t>).</a:t>
             </a:r>
-            <a:endParaRPr lang="uk-UA" dirty="0"/>
+            <a:endParaRPr lang="uk-UA" sz="2400" dirty="0"/>
           </a:p>
           <a:p>
             <a:pPr marL="0" indent="0">
               <a:buNone/>
             </a:pPr>
             <a:r>
-              <a:rPr lang="en-US" dirty="0"/>
+              <a:rPr lang="en-US" sz="2400" dirty="0"/>
               <a:t>BCR/ABL – </a:t>
             </a:r>
             <a:r>
-              <a:rPr lang="uk-UA" dirty="0"/>
+              <a:rPr lang="uk-UA" sz="2400" dirty="0"/>
               <a:t>генетична </a:t>
             </a:r>
             <a:r>
-              <a:rPr lang="uk-UA" dirty="0" err="1"/>
+              <a:rPr lang="uk-UA" sz="2400" dirty="0" err="1"/>
               <a:t>абнормалія</a:t>
             </a:r>
             <a:r>
-              <a:rPr lang="uk-UA" dirty="0"/>
+              <a:rPr lang="uk-UA" sz="2400" dirty="0"/>
               <a:t> 22 хромосоми (філадельфійська хромосома).</a:t>
             </a:r>
           </a:p>
@@ -5550,19 +5671,19 @@
               <a:buNone/>
             </a:pPr>
             <a:r>
-              <a:rPr lang="en-US" dirty="0"/>
+              <a:rPr lang="en-US" sz="2400" dirty="0"/>
               <a:t>NEG </a:t>
             </a:r>
             <a:r>
-              <a:rPr lang="uk-UA" dirty="0"/>
+              <a:rPr lang="uk-UA" sz="2400" dirty="0"/>
               <a:t>– відсутність виявлених генетичних </a:t>
             </a:r>
             <a:r>
-              <a:rPr lang="uk-UA" dirty="0" err="1"/>
+              <a:rPr lang="uk-UA" sz="2400" dirty="0" err="1"/>
               <a:t>абнормалій</a:t>
             </a:r>
             <a:r>
-              <a:rPr lang="uk-UA" dirty="0"/>
+              <a:rPr lang="uk-UA" sz="2400" dirty="0"/>
               <a:t>.</a:t>
             </a:r>
           </a:p>
@@ -5652,7 +5773,7 @@
             </p:spPr>
             <p:txBody>
               <a:bodyPr>
-                <a:normAutofit/>
+                <a:normAutofit fontScale="85000" lnSpcReduction="10000"/>
               </a:bodyPr>
               <a:lstStyle/>
               <a:p>
@@ -5660,22 +5781,19 @@
                   <a:buNone/>
                 </a:pPr>
                 <a:r>
-                  <a:rPr lang="uk-UA" dirty="0">
-                    <a:latin typeface="Times New Roman" panose="02020603050405020304" pitchFamily="18" charset="0"/>
+                  <a:rPr lang="uk-UA" sz="2400" dirty="0">
                     <a:ea typeface="Calibri" panose="020F0502020204030204" pitchFamily="34" charset="0"/>
                   </a:rPr>
                   <a:t>Стандартно для порівняння середніх застосовують критерій </a:t>
                 </a:r>
                 <a:r>
-                  <a:rPr lang="uk-UA" dirty="0" err="1">
-                    <a:latin typeface="Times New Roman" panose="02020603050405020304" pitchFamily="18" charset="0"/>
+                  <a:rPr lang="uk-UA" sz="2400" dirty="0" err="1">
                     <a:ea typeface="Calibri" panose="020F0502020204030204" pitchFamily="34" charset="0"/>
                   </a:rPr>
                   <a:t>Готелінґа</a:t>
                 </a:r>
                 <a:r>
-                  <a:rPr lang="uk-UA" dirty="0">
-                    <a:latin typeface="Times New Roman" panose="02020603050405020304" pitchFamily="18" charset="0"/>
+                  <a:rPr lang="uk-UA" sz="2400" dirty="0">
                     <a:ea typeface="Calibri" panose="020F0502020204030204" pitchFamily="34" charset="0"/>
                   </a:rPr>
                   <a:t> </a:t>
@@ -5685,27 +5803,23 @@
                     <m:sSup>
                       <m:sSupPr>
                         <m:ctrlPr>
-                          <a:rPr lang="uk-UA" i="1">
-                            <a:latin typeface="Cambria Math" panose="02040503050406030204" pitchFamily="18" charset="0"/>
+                          <a:rPr lang="uk-UA" sz="2400">
+                            <a:ea typeface="Calibri" panose="020F0502020204030204" pitchFamily="34" charset="0"/>
                           </a:rPr>
                         </m:ctrlPr>
                       </m:sSupPr>
                       <m:e>
                         <m:r>
-                          <a:rPr lang="uk-UA" i="1">
-                            <a:latin typeface="Cambria Math" panose="02040503050406030204" pitchFamily="18" charset="0"/>
+                          <a:rPr lang="uk-UA" sz="2400">
                             <a:ea typeface="Calibri" panose="020F0502020204030204" pitchFamily="34" charset="0"/>
-                            <a:cs typeface="Times New Roman" panose="02020603050405020304" pitchFamily="18" charset="0"/>
                           </a:rPr>
                           <m:t>𝑇</m:t>
                         </m:r>
                       </m:e>
                       <m:sup>
                         <m:r>
-                          <a:rPr lang="uk-UA" i="1">
-                            <a:latin typeface="Cambria Math" panose="02040503050406030204" pitchFamily="18" charset="0"/>
+                          <a:rPr lang="uk-UA" sz="2400">
                             <a:ea typeface="Calibri" panose="020F0502020204030204" pitchFamily="34" charset="0"/>
-                            <a:cs typeface="Times New Roman" panose="02020603050405020304" pitchFamily="18" charset="0"/>
                           </a:rPr>
                           <m:t>2</m:t>
                         </m:r>
@@ -5714,8 +5828,7 @@
                   </m:oMath>
                 </a14:m>
                 <a:r>
-                  <a:rPr lang="uk-UA" dirty="0">
-                    <a:latin typeface="Times New Roman" panose="02020603050405020304" pitchFamily="18" charset="0"/>
+                  <a:rPr lang="uk-UA" sz="2400" dirty="0">
                     <a:ea typeface="Calibri" panose="020F0502020204030204" pitchFamily="34" charset="0"/>
                   </a:rPr>
                   <a:t> з фіксованим </a:t>
@@ -5723,18 +5836,15 @@
                 <a14:m>
                   <m:oMath xmlns:m="http://schemas.openxmlformats.org/officeDocument/2006/math">
                     <m:r>
-                      <a:rPr lang="uk-UA" i="1">
-                        <a:latin typeface="Cambria Math" panose="02040503050406030204" pitchFamily="18" charset="0"/>
+                      <a:rPr lang="uk-UA" sz="2400">
                         <a:ea typeface="Calibri" panose="020F0502020204030204" pitchFamily="34" charset="0"/>
-                        <a:cs typeface="Times New Roman" panose="02020603050405020304" pitchFamily="18" charset="0"/>
                       </a:rPr>
                       <m:t>𝑝</m:t>
                     </m:r>
                   </m:oMath>
                 </a14:m>
                 <a:r>
-                  <a:rPr lang="en-US" dirty="0">
-                    <a:latin typeface="Times New Roman" panose="02020603050405020304" pitchFamily="18" charset="0"/>
+                  <a:rPr lang="en-US" sz="2400" dirty="0">
                     <a:ea typeface="Calibri" panose="020F0502020204030204" pitchFamily="34" charset="0"/>
                   </a:rPr>
                   <a:t>.</a:t>
@@ -5745,7 +5855,7 @@
                   <a:buNone/>
                 </a:pPr>
                 <a:r>
-                  <a:rPr lang="uk-UA" dirty="0">
+                  <a:rPr lang="uk-UA" sz="2400" dirty="0">
                     <a:latin typeface="Times New Roman" panose="02020603050405020304" pitchFamily="18" charset="0"/>
                     <a:ea typeface="Calibri" panose="020F0502020204030204" pitchFamily="34" charset="0"/>
                   </a:rPr>
@@ -5757,14 +5867,14 @@
                       <m:fPr>
                         <m:type m:val="lin"/>
                         <m:ctrlPr>
-                          <a:rPr lang="uk-UA" i="1">
+                          <a:rPr lang="uk-UA" sz="2400" i="1">
                             <a:latin typeface="Cambria Math" panose="02040503050406030204" pitchFamily="18" charset="0"/>
                           </a:rPr>
                         </m:ctrlPr>
                       </m:fPr>
                       <m:num>
                         <m:r>
-                          <a:rPr lang="uk-UA" i="1">
+                          <a:rPr lang="uk-UA" sz="2400" i="1">
                             <a:latin typeface="Cambria Math" panose="02040503050406030204" pitchFamily="18" charset="0"/>
                           </a:rPr>
                           <m:t>𝑝</m:t>
@@ -5772,7 +5882,7 @@
                       </m:num>
                       <m:den>
                         <m:r>
-                          <a:rPr lang="uk-UA" i="1">
+                          <a:rPr lang="uk-UA" sz="2400" i="1">
                             <a:latin typeface="Cambria Math" panose="02040503050406030204" pitchFamily="18" charset="0"/>
                           </a:rPr>
                           <m:t>𝑛</m:t>
@@ -5780,7 +5890,7 @@
                       </m:den>
                     </m:f>
                     <m:r>
-                      <a:rPr lang="uk-UA">
+                      <a:rPr lang="uk-UA" sz="2400">
                         <a:latin typeface="Cambria Math" panose="02040503050406030204" pitchFamily="18" charset="0"/>
                       </a:rPr>
                       <m:t> →∞</m:t>
@@ -5788,39 +5898,39 @@
                   </m:oMath>
                 </a14:m>
                 <a:r>
-                  <a:rPr lang="uk-UA" dirty="0"/>
+                  <a:rPr lang="uk-UA" sz="2400" dirty="0"/>
                   <a:t> критерій </a:t>
                 </a:r>
                 <a:r>
-                  <a:rPr lang="uk-UA" dirty="0" err="1"/>
+                  <a:rPr lang="uk-UA" sz="2400" dirty="0" err="1"/>
                   <a:t>Готелінґа</a:t>
                 </a:r>
                 <a:r>
-                  <a:rPr lang="uk-UA" dirty="0"/>
+                  <a:rPr lang="uk-UA" sz="2400" dirty="0"/>
                   <a:t> незастосовний, а за </a:t>
                 </a:r>
                 <a14:m>
                   <m:oMath xmlns:m="http://schemas.openxmlformats.org/officeDocument/2006/math">
                     <m:r>
-                      <a:rPr lang="uk-UA" i="1">
+                      <a:rPr lang="uk-UA" sz="2400" i="1">
                         <a:latin typeface="Cambria Math" panose="02040503050406030204" pitchFamily="18" charset="0"/>
                       </a:rPr>
                       <m:t>𝑝</m:t>
                     </m:r>
                     <m:r>
-                      <a:rPr lang="uk-UA">
+                      <a:rPr lang="uk-UA" sz="2400">
                         <a:latin typeface="Cambria Math" panose="02040503050406030204" pitchFamily="18" charset="0"/>
                       </a:rPr>
                       <m:t>→</m:t>
                     </m:r>
                     <m:r>
-                      <a:rPr lang="uk-UA" i="1">
+                      <a:rPr lang="uk-UA" sz="2400" i="1">
                         <a:latin typeface="Cambria Math" panose="02040503050406030204" pitchFamily="18" charset="0"/>
                       </a:rPr>
                       <m:t>𝑐</m:t>
                     </m:r>
                     <m:r>
-                      <a:rPr lang="uk-UA">
+                      <a:rPr lang="uk-UA" sz="2400">
                         <a:latin typeface="Cambria Math" panose="02040503050406030204" pitchFamily="18" charset="0"/>
                       </a:rPr>
                       <m:t>∈</m:t>
@@ -5829,14 +5939,14 @@
                       <m:dPr>
                         <m:begChr m:val="["/>
                         <m:ctrlPr>
-                          <a:rPr lang="uk-UA" i="1">
+                          <a:rPr lang="uk-UA" sz="2400" i="1">
                             <a:latin typeface="Cambria Math" panose="02040503050406030204" pitchFamily="18" charset="0"/>
                           </a:rPr>
                         </m:ctrlPr>
                       </m:dPr>
                       <m:e>
                         <m:r>
-                          <a:rPr lang="uk-UA">
+                          <a:rPr lang="uk-UA" sz="2400">
                             <a:latin typeface="Cambria Math" panose="02040503050406030204" pitchFamily="18" charset="0"/>
                           </a:rPr>
                           <m:t>0,1</m:t>
@@ -5846,20 +5956,20 @@
                   </m:oMath>
                 </a14:m>
                 <a:r>
-                  <a:rPr lang="uk-UA" dirty="0"/>
+                  <a:rPr lang="uk-UA" sz="2400" dirty="0"/>
                   <a:t> його точність зменшується зі збільшенням </a:t>
                 </a:r>
                 <a14:m>
                   <m:oMath xmlns:m="http://schemas.openxmlformats.org/officeDocument/2006/math">
                     <m:r>
-                      <a:rPr lang="en-US" b="0" i="1" smtClean="0">
+                      <a:rPr lang="en-US" sz="2400" b="0" i="1" smtClean="0">
                         <a:latin typeface="Cambria Math" panose="02040503050406030204" pitchFamily="18" charset="0"/>
                       </a:rPr>
                       <m:t>𝑐</m:t>
                     </m:r>
                   </m:oMath>
                 </a14:m>
-                <a:endParaRPr lang="en-US" dirty="0">
+                <a:endParaRPr lang="en-US" sz="2400" dirty="0">
                   <a:latin typeface="Times New Roman" panose="02020603050405020304" pitchFamily="18" charset="0"/>
                   <a:ea typeface="Calibri" panose="020F0502020204030204" pitchFamily="34" charset="0"/>
                 </a:endParaRPr>
@@ -5869,14 +5979,36 @@
                   <a:buNone/>
                 </a:pPr>
                 <a:r>
-                  <a:rPr lang="uk-UA" dirty="0">
-                    <a:latin typeface="Times New Roman" panose="02020603050405020304" pitchFamily="18" charset="0"/>
+                  <a:rPr lang="uk-UA" sz="2400" dirty="0">
                     <a:ea typeface="Calibri" panose="020F0502020204030204" pitchFamily="34" charset="0"/>
                   </a:rPr>
-                  <a:t>Альтернативні статистики:</a:t>
+                  <a:t>Альтернативні статистики</a:t>
                 </a:r>
-                <a:endParaRPr lang="en-US" dirty="0">
-                  <a:latin typeface="Times New Roman" panose="02020603050405020304" pitchFamily="18" charset="0"/>
+                <a:r>
+                  <a:rPr lang="en-US" sz="2400" dirty="0">
+                    <a:ea typeface="Calibri" panose="020F0502020204030204" pitchFamily="34" charset="0"/>
+                  </a:rPr>
+                  <a:t> (</a:t>
+                </a:r>
+                <a:r>
+                  <a:rPr lang="uk-UA" sz="2400" dirty="0">
+                    <a:ea typeface="Calibri" panose="020F0502020204030204" pitchFamily="34" charset="0"/>
+                  </a:rPr>
+                  <a:t>розбити формули</a:t>
+                </a:r>
+                <a:r>
+                  <a:rPr lang="en-US" sz="2400" dirty="0">
+                    <a:ea typeface="Calibri" panose="020F0502020204030204" pitchFamily="34" charset="0"/>
+                  </a:rPr>
+                  <a:t>)</a:t>
+                </a:r>
+                <a:r>
+                  <a:rPr lang="uk-UA" sz="2400" dirty="0">
+                    <a:ea typeface="Calibri" panose="020F0502020204030204" pitchFamily="34" charset="0"/>
+                  </a:rPr>
+                  <a:t>:</a:t>
+                </a:r>
+                <a:endParaRPr lang="en-US" sz="2400" dirty="0">
                   <a:ea typeface="Calibri" panose="020F0502020204030204" pitchFamily="34" charset="0"/>
                 </a:endParaRPr>
               </a:p>
@@ -5893,20 +6025,20 @@
                       <m:sSub>
                         <m:sSubPr>
                           <m:ctrlPr>
-                            <a:rPr lang="uk-UA" i="1">
+                            <a:rPr lang="uk-UA" sz="2400" i="1">
                               <a:latin typeface="Cambria Math" panose="02040503050406030204" pitchFamily="18" charset="0"/>
                             </a:rPr>
                           </m:ctrlPr>
                         </m:sSubPr>
                         <m:e>
                           <m:r>
-                            <a:rPr lang="uk-UA" b="0" i="1" smtClean="0">
+                            <a:rPr lang="uk-UA" sz="2400" b="0" i="1" smtClean="0">
                               <a:latin typeface="Cambria Math" panose="02040503050406030204" pitchFamily="18" charset="0"/>
                             </a:rPr>
                             <m:t>1) </m:t>
                           </m:r>
                           <m:r>
-                            <a:rPr lang="uk-UA" i="1" smtClean="0">
+                            <a:rPr lang="uk-UA" sz="2400" i="1" smtClean="0">
                               <a:latin typeface="Cambria Math" panose="02040503050406030204" pitchFamily="18" charset="0"/>
                             </a:rPr>
                             <m:t>𝑀</m:t>
@@ -5914,7 +6046,7 @@
                         </m:e>
                         <m:sub>
                           <m:r>
-                            <a:rPr lang="uk-UA" i="1">
+                            <a:rPr lang="uk-UA" sz="2400" i="1">
                               <a:latin typeface="Cambria Math" panose="02040503050406030204" pitchFamily="18" charset="0"/>
                             </a:rPr>
                             <m:t>𝑛</m:t>
@@ -5922,7 +6054,7 @@
                         </m:sub>
                       </m:sSub>
                       <m:r>
-                        <a:rPr lang="uk-UA">
+                        <a:rPr lang="uk-UA" sz="2400">
                           <a:latin typeface="Cambria Math" panose="02040503050406030204" pitchFamily="18" charset="0"/>
                         </a:rPr>
                         <m:t>=</m:t>
@@ -5930,7 +6062,7 @@
                       <m:sSup>
                         <m:sSupPr>
                           <m:ctrlPr>
-                            <a:rPr lang="uk-UA" i="1">
+                            <a:rPr lang="uk-UA" sz="2400" i="1">
                               <a:latin typeface="Cambria Math" panose="02040503050406030204" pitchFamily="18" charset="0"/>
                             </a:rPr>
                           </m:ctrlPr>
@@ -5939,7 +6071,7 @@
                           <m:d>
                             <m:dPr>
                               <m:ctrlPr>
-                                <a:rPr lang="uk-UA" i="1">
+                                <a:rPr lang="uk-UA" sz="2400" i="1">
                                   <a:latin typeface="Cambria Math" panose="02040503050406030204" pitchFamily="18" charset="0"/>
                                 </a:rPr>
                               </m:ctrlPr>
@@ -5948,7 +6080,7 @@
                               <m:sSub>
                                 <m:sSubPr>
                                   <m:ctrlPr>
-                                    <a:rPr lang="uk-UA" i="1">
+                                    <a:rPr lang="uk-UA" sz="2400" i="1">
                                       <a:latin typeface="Cambria Math" panose="02040503050406030204" pitchFamily="18" charset="0"/>
                                     </a:rPr>
                                   </m:ctrlPr>
@@ -5958,14 +6090,14 @@
                                     <m:barPr>
                                       <m:pos m:val="top"/>
                                       <m:ctrlPr>
-                                        <a:rPr lang="uk-UA" i="1">
+                                        <a:rPr lang="uk-UA" sz="2400" i="1">
                                           <a:latin typeface="Cambria Math" panose="02040503050406030204" pitchFamily="18" charset="0"/>
                                         </a:rPr>
                                       </m:ctrlPr>
                                     </m:barPr>
                                     <m:e>
                                       <m:r>
-                                        <a:rPr lang="uk-UA" i="1">
+                                        <a:rPr lang="uk-UA" sz="2400" i="1">
                                           <a:latin typeface="Cambria Math" panose="02040503050406030204" pitchFamily="18" charset="0"/>
                                         </a:rPr>
                                         <m:t>𝑋</m:t>
@@ -5975,7 +6107,7 @@
                                 </m:e>
                                 <m:sub>
                                   <m:r>
-                                    <a:rPr lang="uk-UA">
+                                    <a:rPr lang="uk-UA" sz="2400">
                                       <a:latin typeface="Cambria Math" panose="02040503050406030204" pitchFamily="18" charset="0"/>
                                     </a:rPr>
                                     <m:t>1</m:t>
@@ -5983,7 +6115,7 @@
                                 </m:sub>
                               </m:sSub>
                               <m:r>
-                                <a:rPr lang="uk-UA">
+                                <a:rPr lang="uk-UA" sz="2400">
                                   <a:latin typeface="Cambria Math" panose="02040503050406030204" pitchFamily="18" charset="0"/>
                                 </a:rPr>
                                 <m:t>−</m:t>
@@ -5991,7 +6123,7 @@
                               <m:sSub>
                                 <m:sSubPr>
                                   <m:ctrlPr>
-                                    <a:rPr lang="uk-UA" i="1">
+                                    <a:rPr lang="uk-UA" sz="2400" i="1">
                                       <a:latin typeface="Cambria Math" panose="02040503050406030204" pitchFamily="18" charset="0"/>
                                     </a:rPr>
                                   </m:ctrlPr>
@@ -6001,14 +6133,14 @@
                                     <m:barPr>
                                       <m:pos m:val="top"/>
                                       <m:ctrlPr>
-                                        <a:rPr lang="uk-UA" i="1">
+                                        <a:rPr lang="uk-UA" sz="2400" i="1">
                                           <a:latin typeface="Cambria Math" panose="02040503050406030204" pitchFamily="18" charset="0"/>
                                         </a:rPr>
                                       </m:ctrlPr>
                                     </m:barPr>
                                     <m:e>
                                       <m:r>
-                                        <a:rPr lang="uk-UA" i="1">
+                                        <a:rPr lang="uk-UA" sz="2400" i="1">
                                           <a:latin typeface="Cambria Math" panose="02040503050406030204" pitchFamily="18" charset="0"/>
                                         </a:rPr>
                                         <m:t>𝑋</m:t>
@@ -6018,7 +6150,7 @@
                                 </m:e>
                                 <m:sub>
                                   <m:r>
-                                    <a:rPr lang="uk-UA">
+                                    <a:rPr lang="uk-UA" sz="2400">
                                       <a:latin typeface="Cambria Math" panose="02040503050406030204" pitchFamily="18" charset="0"/>
                                     </a:rPr>
                                     <m:t>2</m:t>
@@ -6030,7 +6162,7 @@
                         </m:e>
                         <m:sup>
                           <m:r>
-                            <a:rPr lang="uk-UA">
+                            <a:rPr lang="uk-UA" sz="2400">
                               <a:latin typeface="Cambria Math" panose="02040503050406030204" pitchFamily="18" charset="0"/>
                             </a:rPr>
                             <m:t>′</m:t>
@@ -6040,7 +6172,7 @@
                       <m:d>
                         <m:dPr>
                           <m:ctrlPr>
-                            <a:rPr lang="uk-UA" i="1">
+                            <a:rPr lang="uk-UA" sz="2400" i="1">
                               <a:latin typeface="Cambria Math" panose="02040503050406030204" pitchFamily="18" charset="0"/>
                             </a:rPr>
                           </m:ctrlPr>
@@ -6049,7 +6181,7 @@
                           <m:sSub>
                             <m:sSubPr>
                               <m:ctrlPr>
-                                <a:rPr lang="uk-UA" i="1">
+                                <a:rPr lang="uk-UA" sz="2400" i="1">
                                   <a:latin typeface="Cambria Math" panose="02040503050406030204" pitchFamily="18" charset="0"/>
                                 </a:rPr>
                               </m:ctrlPr>
@@ -6059,14 +6191,14 @@
                                 <m:barPr>
                                   <m:pos m:val="top"/>
                                   <m:ctrlPr>
-                                    <a:rPr lang="uk-UA" i="1">
+                                    <a:rPr lang="uk-UA" sz="2400" i="1">
                                       <a:latin typeface="Cambria Math" panose="02040503050406030204" pitchFamily="18" charset="0"/>
                                     </a:rPr>
                                   </m:ctrlPr>
                                 </m:barPr>
                                 <m:e>
                                   <m:r>
-                                    <a:rPr lang="uk-UA" i="1">
+                                    <a:rPr lang="uk-UA" sz="2400" i="1">
                                       <a:latin typeface="Cambria Math" panose="02040503050406030204" pitchFamily="18" charset="0"/>
                                     </a:rPr>
                                     <m:t>𝑋</m:t>
@@ -6076,7 +6208,7 @@
                             </m:e>
                             <m:sub>
                               <m:r>
-                                <a:rPr lang="uk-UA">
+                                <a:rPr lang="uk-UA" sz="2400">
                                   <a:latin typeface="Cambria Math" panose="02040503050406030204" pitchFamily="18" charset="0"/>
                                 </a:rPr>
                                 <m:t>1</m:t>
@@ -6084,7 +6216,7 @@
                             </m:sub>
                           </m:sSub>
                           <m:r>
-                            <a:rPr lang="uk-UA">
+                            <a:rPr lang="uk-UA" sz="2400">
                               <a:latin typeface="Cambria Math" panose="02040503050406030204" pitchFamily="18" charset="0"/>
                             </a:rPr>
                             <m:t>−</m:t>
@@ -6092,7 +6224,7 @@
                           <m:sSub>
                             <m:sSubPr>
                               <m:ctrlPr>
-                                <a:rPr lang="uk-UA" i="1">
+                                <a:rPr lang="uk-UA" sz="2400" i="1">
                                   <a:latin typeface="Cambria Math" panose="02040503050406030204" pitchFamily="18" charset="0"/>
                                 </a:rPr>
                               </m:ctrlPr>
@@ -6102,14 +6234,14 @@
                                 <m:barPr>
                                   <m:pos m:val="top"/>
                                   <m:ctrlPr>
-                                    <a:rPr lang="uk-UA" i="1">
+                                    <a:rPr lang="uk-UA" sz="2400" i="1">
                                       <a:latin typeface="Cambria Math" panose="02040503050406030204" pitchFamily="18" charset="0"/>
                                     </a:rPr>
                                   </m:ctrlPr>
                                 </m:barPr>
                                 <m:e>
                                   <m:r>
-                                    <a:rPr lang="uk-UA" i="1">
+                                    <a:rPr lang="uk-UA" sz="2400" i="1">
                                       <a:latin typeface="Cambria Math" panose="02040503050406030204" pitchFamily="18" charset="0"/>
                                     </a:rPr>
                                     <m:t>𝑋</m:t>
@@ -6119,7 +6251,7 @@
                             </m:e>
                             <m:sub>
                               <m:r>
-                                <a:rPr lang="uk-UA">
+                                <a:rPr lang="uk-UA" sz="2400">
                                   <a:latin typeface="Cambria Math" panose="02040503050406030204" pitchFamily="18" charset="0"/>
                                 </a:rPr>
                                 <m:t>2</m:t>
@@ -6129,7 +6261,7 @@
                         </m:e>
                       </m:d>
                       <m:r>
-                        <a:rPr lang="uk-UA">
+                        <a:rPr lang="uk-UA" sz="2400">
                           <a:latin typeface="Cambria Math" panose="02040503050406030204" pitchFamily="18" charset="0"/>
                         </a:rPr>
                         <m:t>−</m:t>
@@ -6138,13 +6270,13 @@
                         <m:rPr>
                           <m:sty m:val="p"/>
                         </m:rPr>
-                        <a:rPr lang="uk-UA">
+                        <a:rPr lang="uk-UA" sz="2400">
                           <a:latin typeface="Cambria Math" panose="02040503050406030204" pitchFamily="18" charset="0"/>
                         </a:rPr>
                         <m:t>τ</m:t>
                       </m:r>
                       <m:r>
-                        <a:rPr lang="uk-UA" i="1">
+                        <a:rPr lang="uk-UA" sz="2400" i="1">
                           <a:latin typeface="Cambria Math" panose="02040503050406030204" pitchFamily="18" charset="0"/>
                         </a:rPr>
                         <m:t>𝑡𝑟</m:t>
@@ -6152,7 +6284,7 @@
                       <m:d>
                         <m:dPr>
                           <m:ctrlPr>
-                            <a:rPr lang="uk-UA" i="1">
+                            <a:rPr lang="uk-UA" sz="2400" i="1">
                               <a:latin typeface="Cambria Math" panose="02040503050406030204" pitchFamily="18" charset="0"/>
                             </a:rPr>
                           </m:ctrlPr>
@@ -6161,14 +6293,14 @@
                           <m:sSub>
                             <m:sSubPr>
                               <m:ctrlPr>
-                                <a:rPr lang="uk-UA" i="1">
+                                <a:rPr lang="uk-UA" sz="2400" i="1">
                                   <a:latin typeface="Cambria Math" panose="02040503050406030204" pitchFamily="18" charset="0"/>
                                 </a:rPr>
                               </m:ctrlPr>
                             </m:sSubPr>
                             <m:e>
                               <m:r>
-                                <a:rPr lang="uk-UA" i="1">
+                                <a:rPr lang="uk-UA" sz="2400" i="1">
                                   <a:latin typeface="Cambria Math" panose="02040503050406030204" pitchFamily="18" charset="0"/>
                                 </a:rPr>
                                 <m:t>𝑆</m:t>
@@ -6176,7 +6308,7 @@
                             </m:e>
                             <m:sub>
                               <m:r>
-                                <a:rPr lang="uk-UA" i="1">
+                                <a:rPr lang="uk-UA" sz="2400" i="1">
                                   <a:latin typeface="Cambria Math" panose="02040503050406030204" pitchFamily="18" charset="0"/>
                                 </a:rPr>
                                 <m:t>𝑛</m:t>
@@ -6186,7 +6318,7 @@
                         </m:e>
                       </m:d>
                       <m:r>
-                        <a:rPr lang="uk-UA" b="0" i="0" smtClean="0">
+                        <a:rPr lang="uk-UA" sz="2400" b="0" i="0" smtClean="0">
                           <a:latin typeface="Cambria Math" panose="02040503050406030204" pitchFamily="18" charset="0"/>
                         </a:rPr>
                         <m:t>, де</m:t>
@@ -6194,7 +6326,7 @@
                     </m:oMath>
                   </m:oMathPara>
                 </a14:m>
-                <a:endParaRPr lang="en-US" dirty="0"/>
+                <a:endParaRPr lang="en-US" sz="2400" dirty="0"/>
               </a:p>
               <a:p>
                 <a:pPr marL="0" indent="0">
@@ -6209,14 +6341,14 @@
                       <m:sSub>
                         <m:sSubPr>
                           <m:ctrlPr>
-                            <a:rPr lang="uk-UA" i="1">
+                            <a:rPr lang="uk-UA" sz="2400" i="1">
                               <a:latin typeface="Cambria Math" panose="02040503050406030204" pitchFamily="18" charset="0"/>
                             </a:rPr>
                           </m:ctrlPr>
                         </m:sSubPr>
                         <m:e>
                           <m:r>
-                            <a:rPr lang="uk-UA" i="1">
+                            <a:rPr lang="uk-UA" sz="2400" i="1">
                               <a:latin typeface="Cambria Math" panose="02040503050406030204" pitchFamily="18" charset="0"/>
                             </a:rPr>
                             <m:t>𝑆</m:t>
@@ -6224,7 +6356,7 @@
                         </m:e>
                         <m:sub>
                           <m:r>
-                            <a:rPr lang="uk-UA" i="1">
+                            <a:rPr lang="uk-UA" sz="2400" i="1">
                               <a:latin typeface="Cambria Math" panose="02040503050406030204" pitchFamily="18" charset="0"/>
                             </a:rPr>
                             <m:t>𝑛</m:t>
@@ -6232,7 +6364,7 @@
                         </m:sub>
                       </m:sSub>
                       <m:r>
-                        <a:rPr lang="uk-UA">
+                        <a:rPr lang="uk-UA" sz="2400">
                           <a:latin typeface="Cambria Math" panose="02040503050406030204" pitchFamily="18" charset="0"/>
                         </a:rPr>
                         <m:t>=</m:t>
@@ -6240,14 +6372,14 @@
                       <m:f>
                         <m:fPr>
                           <m:ctrlPr>
-                            <a:rPr lang="uk-UA" i="1">
+                            <a:rPr lang="uk-UA" sz="2400" i="1">
                               <a:latin typeface="Cambria Math" panose="02040503050406030204" pitchFamily="18" charset="0"/>
                             </a:rPr>
                           </m:ctrlPr>
                         </m:fPr>
                         <m:num>
                           <m:r>
-                            <a:rPr lang="uk-UA">
+                            <a:rPr lang="uk-UA" sz="2400">
                               <a:latin typeface="Cambria Math" panose="02040503050406030204" pitchFamily="18" charset="0"/>
                             </a:rPr>
                             <m:t>1</m:t>
@@ -6255,7 +6387,7 @@
                         </m:num>
                         <m:den>
                           <m:r>
-                            <a:rPr lang="uk-UA" i="1">
+                            <a:rPr lang="uk-UA" sz="2400" i="1">
                               <a:latin typeface="Cambria Math" panose="02040503050406030204" pitchFamily="18" charset="0"/>
                             </a:rPr>
                             <m:t>𝑛</m:t>
@@ -6265,7 +6397,7 @@
                       <m:d>
                         <m:dPr>
                           <m:ctrlPr>
-                            <a:rPr lang="uk-UA" i="1">
+                            <a:rPr lang="uk-UA" sz="2400" i="1">
                               <a:latin typeface="Cambria Math" panose="02040503050406030204" pitchFamily="18" charset="0"/>
                             </a:rPr>
                           </m:ctrlPr>
@@ -6274,14 +6406,14 @@
                           <m:sSub>
                             <m:sSubPr>
                               <m:ctrlPr>
-                                <a:rPr lang="uk-UA" i="1">
+                                <a:rPr lang="uk-UA" sz="2400" i="1">
                                   <a:latin typeface="Cambria Math" panose="02040503050406030204" pitchFamily="18" charset="0"/>
                                 </a:rPr>
                               </m:ctrlPr>
                             </m:sSubPr>
                             <m:e>
                               <m:r>
-                                <a:rPr lang="uk-UA" i="1">
+                                <a:rPr lang="uk-UA" sz="2400" i="1">
                                   <a:latin typeface="Cambria Math" panose="02040503050406030204" pitchFamily="18" charset="0"/>
                                 </a:rPr>
                                 <m:t>𝑋</m:t>
@@ -6289,7 +6421,7 @@
                             </m:e>
                             <m:sub>
                               <m:r>
-                                <a:rPr lang="uk-UA" i="1">
+                                <a:rPr lang="uk-UA" sz="2400" i="1">
                                   <a:latin typeface="Cambria Math" panose="02040503050406030204" pitchFamily="18" charset="0"/>
                                 </a:rPr>
                                 <m:t>𝑖𝑗</m:t>
@@ -6297,7 +6429,7 @@
                             </m:sub>
                           </m:sSub>
                           <m:r>
-                            <a:rPr lang="uk-UA">
+                            <a:rPr lang="uk-UA" sz="2400">
                               <a:latin typeface="Cambria Math" panose="02040503050406030204" pitchFamily="18" charset="0"/>
                             </a:rPr>
                             <m:t>−</m:t>
@@ -6305,7 +6437,7 @@
                           <m:sSub>
                             <m:sSubPr>
                               <m:ctrlPr>
-                                <a:rPr lang="uk-UA" i="1">
+                                <a:rPr lang="uk-UA" sz="2400" i="1">
                                   <a:latin typeface="Cambria Math" panose="02040503050406030204" pitchFamily="18" charset="0"/>
                                 </a:rPr>
                               </m:ctrlPr>
@@ -6315,14 +6447,14 @@
                                 <m:barPr>
                                   <m:pos m:val="top"/>
                                   <m:ctrlPr>
-                                    <a:rPr lang="uk-UA" i="1">
+                                    <a:rPr lang="uk-UA" sz="2400" i="1">
                                       <a:latin typeface="Cambria Math" panose="02040503050406030204" pitchFamily="18" charset="0"/>
                                     </a:rPr>
                                   </m:ctrlPr>
                                 </m:barPr>
                                 <m:e>
                                   <m:r>
-                                    <a:rPr lang="uk-UA" i="1">
+                                    <a:rPr lang="uk-UA" sz="2400" i="1">
                                       <a:latin typeface="Cambria Math" panose="02040503050406030204" pitchFamily="18" charset="0"/>
                                     </a:rPr>
                                     <m:t>𝑋</m:t>
@@ -6332,7 +6464,7 @@
                             </m:e>
                             <m:sub>
                               <m:r>
-                                <a:rPr lang="uk-UA" i="1">
+                                <a:rPr lang="uk-UA" sz="2400" i="1">
                                   <a:latin typeface="Cambria Math" panose="02040503050406030204" pitchFamily="18" charset="0"/>
                                 </a:rPr>
                                 <m:t>𝑖</m:t>
@@ -6344,7 +6476,7 @@
                       <m:sSup>
                         <m:sSupPr>
                           <m:ctrlPr>
-                            <a:rPr lang="uk-UA" i="1">
+                            <a:rPr lang="uk-UA" sz="2400" i="1">
                               <a:latin typeface="Cambria Math" panose="02040503050406030204" pitchFamily="18" charset="0"/>
                             </a:rPr>
                           </m:ctrlPr>
@@ -6353,7 +6485,7 @@
                           <m:d>
                             <m:dPr>
                               <m:ctrlPr>
-                                <a:rPr lang="uk-UA" i="1">
+                                <a:rPr lang="uk-UA" sz="2400" i="1">
                                   <a:latin typeface="Cambria Math" panose="02040503050406030204" pitchFamily="18" charset="0"/>
                                 </a:rPr>
                               </m:ctrlPr>
@@ -6362,14 +6494,14 @@
                               <m:sSub>
                                 <m:sSubPr>
                                   <m:ctrlPr>
-                                    <a:rPr lang="uk-UA" i="1">
+                                    <a:rPr lang="uk-UA" sz="2400" i="1">
                                       <a:latin typeface="Cambria Math" panose="02040503050406030204" pitchFamily="18" charset="0"/>
                                     </a:rPr>
                                   </m:ctrlPr>
                                 </m:sSubPr>
                                 <m:e>
                                   <m:r>
-                                    <a:rPr lang="uk-UA" i="1">
+                                    <a:rPr lang="uk-UA" sz="2400" i="1">
                                       <a:latin typeface="Cambria Math" panose="02040503050406030204" pitchFamily="18" charset="0"/>
                                     </a:rPr>
                                     <m:t>𝑋</m:t>
@@ -6377,7 +6509,7 @@
                                 </m:e>
                                 <m:sub>
                                   <m:r>
-                                    <a:rPr lang="uk-UA" i="1">
+                                    <a:rPr lang="uk-UA" sz="2400" i="1">
                                       <a:latin typeface="Cambria Math" panose="02040503050406030204" pitchFamily="18" charset="0"/>
                                     </a:rPr>
                                     <m:t>𝑖𝑗</m:t>
@@ -6385,7 +6517,7 @@
                                 </m:sub>
                               </m:sSub>
                               <m:r>
-                                <a:rPr lang="uk-UA">
+                                <a:rPr lang="uk-UA" sz="2400">
                                   <a:latin typeface="Cambria Math" panose="02040503050406030204" pitchFamily="18" charset="0"/>
                                 </a:rPr>
                                 <m:t>−</m:t>
@@ -6393,7 +6525,7 @@
                               <m:sSub>
                                 <m:sSubPr>
                                   <m:ctrlPr>
-                                    <a:rPr lang="uk-UA" i="1">
+                                    <a:rPr lang="uk-UA" sz="2400" i="1">
                                       <a:latin typeface="Cambria Math" panose="02040503050406030204" pitchFamily="18" charset="0"/>
                                     </a:rPr>
                                   </m:ctrlPr>
@@ -6403,14 +6535,14 @@
                                     <m:barPr>
                                       <m:pos m:val="top"/>
                                       <m:ctrlPr>
-                                        <a:rPr lang="uk-UA" i="1">
+                                        <a:rPr lang="uk-UA" sz="2400" i="1">
                                           <a:latin typeface="Cambria Math" panose="02040503050406030204" pitchFamily="18" charset="0"/>
                                         </a:rPr>
                                       </m:ctrlPr>
                                     </m:barPr>
                                     <m:e>
                                       <m:r>
-                                        <a:rPr lang="uk-UA" i="1">
+                                        <a:rPr lang="uk-UA" sz="2400" i="1">
                                           <a:latin typeface="Cambria Math" panose="02040503050406030204" pitchFamily="18" charset="0"/>
                                         </a:rPr>
                                         <m:t>𝑋</m:t>
@@ -6420,7 +6552,7 @@
                                 </m:e>
                                 <m:sub>
                                   <m:r>
-                                    <a:rPr lang="uk-UA" i="1">
+                                    <a:rPr lang="uk-UA" sz="2400" i="1">
                                       <a:latin typeface="Cambria Math" panose="02040503050406030204" pitchFamily="18" charset="0"/>
                                     </a:rPr>
                                     <m:t>𝑖</m:t>
@@ -6432,7 +6564,7 @@
                         </m:e>
                         <m:sup>
                           <m:r>
-                            <a:rPr lang="uk-UA">
+                            <a:rPr lang="uk-UA" sz="2400">
                               <a:latin typeface="Cambria Math" panose="02040503050406030204" pitchFamily="18" charset="0"/>
                             </a:rPr>
                             <m:t>′</m:t>
@@ -6442,7 +6574,7 @@
                     </m:oMath>
                   </m:oMathPara>
                 </a14:m>
-                <a:endParaRPr lang="en-US" dirty="0"/>
+                <a:endParaRPr lang="en-US" sz="2400" dirty="0"/>
               </a:p>
               <a:p>
                 <a:pPr marL="0" indent="0">
@@ -6458,13 +6590,13 @@
                         <m:rPr>
                           <m:sty m:val="p"/>
                         </m:rPr>
-                        <a:rPr lang="uk-UA">
+                        <a:rPr lang="uk-UA" sz="2400">
                           <a:latin typeface="Cambria Math" panose="02040503050406030204" pitchFamily="18" charset="0"/>
                         </a:rPr>
                         <m:t>τ</m:t>
                       </m:r>
                       <m:r>
-                        <a:rPr lang="uk-UA">
+                        <a:rPr lang="uk-UA" sz="2400">
                           <a:latin typeface="Cambria Math" panose="02040503050406030204" pitchFamily="18" charset="0"/>
                         </a:rPr>
                         <m:t>=</m:t>
@@ -6472,7 +6604,7 @@
                       <m:f>
                         <m:fPr>
                           <m:ctrlPr>
-                            <a:rPr lang="uk-UA" i="1">
+                            <a:rPr lang="uk-UA" sz="2400" i="1">
                               <a:latin typeface="Cambria Math" panose="02040503050406030204" pitchFamily="18" charset="0"/>
                             </a:rPr>
                           </m:ctrlPr>
@@ -6481,14 +6613,14 @@
                           <m:sSub>
                             <m:sSubPr>
                               <m:ctrlPr>
-                                <a:rPr lang="uk-UA" i="1">
+                                <a:rPr lang="uk-UA" sz="2400" i="1">
                                   <a:latin typeface="Cambria Math" panose="02040503050406030204" pitchFamily="18" charset="0"/>
                                 </a:rPr>
                               </m:ctrlPr>
                             </m:sSubPr>
                             <m:e>
                               <m:r>
-                                <a:rPr lang="uk-UA" i="1">
+                                <a:rPr lang="uk-UA" sz="2400" i="1">
                                   <a:latin typeface="Cambria Math" panose="02040503050406030204" pitchFamily="18" charset="0"/>
                                 </a:rPr>
                                 <m:t>𝑛</m:t>
@@ -6496,7 +6628,7 @@
                             </m:e>
                             <m:sub>
                               <m:r>
-                                <a:rPr lang="uk-UA">
+                                <a:rPr lang="uk-UA" sz="2400">
                                   <a:latin typeface="Cambria Math" panose="02040503050406030204" pitchFamily="18" charset="0"/>
                                 </a:rPr>
                                 <m:t>1</m:t>
@@ -6504,7 +6636,7 @@
                             </m:sub>
                           </m:sSub>
                           <m:r>
-                            <a:rPr lang="uk-UA">
+                            <a:rPr lang="uk-UA" sz="2400">
                               <a:latin typeface="Cambria Math" panose="02040503050406030204" pitchFamily="18" charset="0"/>
                             </a:rPr>
                             <m:t>+</m:t>
@@ -6512,14 +6644,14 @@
                           <m:sSub>
                             <m:sSubPr>
                               <m:ctrlPr>
-                                <a:rPr lang="uk-UA" i="1">
+                                <a:rPr lang="uk-UA" sz="2400" i="1">
                                   <a:latin typeface="Cambria Math" panose="02040503050406030204" pitchFamily="18" charset="0"/>
                                 </a:rPr>
                               </m:ctrlPr>
                             </m:sSubPr>
                             <m:e>
                               <m:r>
-                                <a:rPr lang="uk-UA" i="1">
+                                <a:rPr lang="uk-UA" sz="2400" i="1">
                                   <a:latin typeface="Cambria Math" panose="02040503050406030204" pitchFamily="18" charset="0"/>
                                 </a:rPr>
                                 <m:t>𝑛</m:t>
@@ -6527,7 +6659,7 @@
                             </m:e>
                             <m:sub>
                               <m:r>
-                                <a:rPr lang="uk-UA">
+                                <a:rPr lang="uk-UA" sz="2400">
                                   <a:latin typeface="Cambria Math" panose="02040503050406030204" pitchFamily="18" charset="0"/>
                                 </a:rPr>
                                 <m:t>2</m:t>
@@ -6539,14 +6671,14 @@
                           <m:sSub>
                             <m:sSubPr>
                               <m:ctrlPr>
-                                <a:rPr lang="uk-UA" i="1">
+                                <a:rPr lang="uk-UA" sz="2400" i="1">
                                   <a:latin typeface="Cambria Math" panose="02040503050406030204" pitchFamily="18" charset="0"/>
                                 </a:rPr>
                               </m:ctrlPr>
                             </m:sSubPr>
                             <m:e>
                               <m:r>
-                                <a:rPr lang="uk-UA" i="1">
+                                <a:rPr lang="uk-UA" sz="2400" i="1">
                                   <a:latin typeface="Cambria Math" panose="02040503050406030204" pitchFamily="18" charset="0"/>
                                 </a:rPr>
                                 <m:t>𝑛</m:t>
@@ -6554,7 +6686,7 @@
                             </m:e>
                             <m:sub>
                               <m:r>
-                                <a:rPr lang="uk-UA">
+                                <a:rPr lang="uk-UA" sz="2400">
                                   <a:latin typeface="Cambria Math" panose="02040503050406030204" pitchFamily="18" charset="0"/>
                                 </a:rPr>
                                 <m:t>1</m:t>
@@ -6564,14 +6696,14 @@
                           <m:sSub>
                             <m:sSubPr>
                               <m:ctrlPr>
-                                <a:rPr lang="uk-UA" i="1">
+                                <a:rPr lang="uk-UA" sz="2400" i="1">
                                   <a:latin typeface="Cambria Math" panose="02040503050406030204" pitchFamily="18" charset="0"/>
                                 </a:rPr>
                               </m:ctrlPr>
                             </m:sSubPr>
                             <m:e>
                               <m:r>
-                                <a:rPr lang="uk-UA" i="1">
+                                <a:rPr lang="uk-UA" sz="2400" i="1">
                                   <a:latin typeface="Cambria Math" panose="02040503050406030204" pitchFamily="18" charset="0"/>
                                 </a:rPr>
                                 <m:t>𝑛</m:t>
@@ -6579,7 +6711,7 @@
                             </m:e>
                             <m:sub>
                               <m:r>
-                                <a:rPr lang="uk-UA">
+                                <a:rPr lang="uk-UA" sz="2400">
                                   <a:latin typeface="Cambria Math" panose="02040503050406030204" pitchFamily="18" charset="0"/>
                                 </a:rPr>
                                 <m:t>2</m:t>
@@ -6591,7 +6723,7 @@
                     </m:oMath>
                   </m:oMathPara>
                 </a14:m>
-                <a:endParaRPr lang="uk-UA" dirty="0"/>
+                <a:endParaRPr lang="uk-UA" sz="2400" dirty="0"/>
               </a:p>
               <a:p>
                 <a:pPr marL="0" indent="0">
@@ -6606,20 +6738,20 @@
                       <m:sSub>
                         <m:sSubPr>
                           <m:ctrlPr>
-                            <a:rPr lang="uk-UA" i="1">
+                            <a:rPr lang="uk-UA" sz="2400" i="1">
                               <a:latin typeface="Cambria Math" panose="02040503050406030204" pitchFamily="18" charset="0"/>
                             </a:rPr>
                           </m:ctrlPr>
                         </m:sSubPr>
                         <m:e>
                           <m:r>
-                            <a:rPr lang="uk-UA" i="1">
+                            <a:rPr lang="uk-UA" sz="2400" i="1">
                               <a:latin typeface="Cambria Math" panose="02040503050406030204" pitchFamily="18" charset="0"/>
                             </a:rPr>
                             <m:t>2) </m:t>
                           </m:r>
                           <m:r>
-                            <a:rPr lang="uk-UA" i="1">
+                            <a:rPr lang="uk-UA" sz="2400" i="1">
                               <a:latin typeface="Cambria Math" panose="02040503050406030204" pitchFamily="18" charset="0"/>
                             </a:rPr>
                             <m:t>𝑇</m:t>
@@ -6627,7 +6759,7 @@
                         </m:e>
                         <m:sub>
                           <m:r>
-                            <a:rPr lang="uk-UA" i="1">
+                            <a:rPr lang="uk-UA" sz="2400" i="1">
                               <a:latin typeface="Cambria Math" panose="02040503050406030204" pitchFamily="18" charset="0"/>
                             </a:rPr>
                             <m:t>𝑛</m:t>
@@ -6635,7 +6767,7 @@
                         </m:sub>
                       </m:sSub>
                       <m:r>
-                        <a:rPr lang="uk-UA">
+                        <a:rPr lang="uk-UA" sz="2400">
                           <a:latin typeface="Cambria Math" panose="02040503050406030204" pitchFamily="18" charset="0"/>
                         </a:rPr>
                         <m:t>=:</m:t>
@@ -6643,7 +6775,7 @@
                       <m:f>
                         <m:fPr>
                           <m:ctrlPr>
-                            <a:rPr lang="uk-UA" i="1">
+                            <a:rPr lang="uk-UA" sz="2400" i="1">
                               <a:latin typeface="Cambria Math" panose="02040503050406030204" pitchFamily="18" charset="0"/>
                             </a:rPr>
                           </m:ctrlPr>
@@ -6654,26 +6786,26 @@
                               <m:chr m:val="∑"/>
                               <m:limLoc m:val="subSup"/>
                               <m:ctrlPr>
-                                <a:rPr lang="uk-UA" i="1">
+                                <a:rPr lang="uk-UA" sz="2400" i="1">
                                   <a:latin typeface="Cambria Math" panose="02040503050406030204" pitchFamily="18" charset="0"/>
                                 </a:rPr>
                               </m:ctrlPr>
                             </m:naryPr>
                             <m:sub>
                               <m:r>
-                                <a:rPr lang="uk-UA" i="1">
+                                <a:rPr lang="uk-UA" sz="2400" i="1">
                                   <a:latin typeface="Cambria Math" panose="02040503050406030204" pitchFamily="18" charset="0"/>
                                 </a:rPr>
                                 <m:t>𝑖</m:t>
                               </m:r>
                               <m:r>
-                                <a:rPr lang="uk-UA">
+                                <a:rPr lang="uk-UA" sz="2400">
                                   <a:latin typeface="Cambria Math" panose="02040503050406030204" pitchFamily="18" charset="0"/>
                                 </a:rPr>
                                 <m:t>≠</m:t>
                               </m:r>
                               <m:r>
-                                <a:rPr lang="uk-UA" i="1">
+                                <a:rPr lang="uk-UA" sz="2400" i="1">
                                   <a:latin typeface="Cambria Math" panose="02040503050406030204" pitchFamily="18" charset="0"/>
                                 </a:rPr>
                                 <m:t>𝑗</m:t>
@@ -6683,14 +6815,14 @@
                               <m:sSub>
                                 <m:sSubPr>
                                   <m:ctrlPr>
-                                    <a:rPr lang="uk-UA" i="1">
+                                    <a:rPr lang="uk-UA" sz="2400" i="1">
                                       <a:latin typeface="Cambria Math" panose="02040503050406030204" pitchFamily="18" charset="0"/>
                                     </a:rPr>
                                   </m:ctrlPr>
                                 </m:sSubPr>
                                 <m:e>
                                   <m:r>
-                                    <a:rPr lang="uk-UA" i="1">
+                                    <a:rPr lang="uk-UA" sz="2400" i="1">
                                       <a:latin typeface="Cambria Math" panose="02040503050406030204" pitchFamily="18" charset="0"/>
                                     </a:rPr>
                                     <m:t>𝑛</m:t>
@@ -6698,7 +6830,7 @@
                                 </m:e>
                                 <m:sub>
                                   <m:r>
-                                    <a:rPr lang="uk-UA">
+                                    <a:rPr lang="uk-UA" sz="2400">
                                       <a:latin typeface="Cambria Math" panose="02040503050406030204" pitchFamily="18" charset="0"/>
                                     </a:rPr>
                                     <m:t>1</m:t>
@@ -6710,14 +6842,14 @@
                               <m:sSubSup>
                                 <m:sSubSupPr>
                                   <m:ctrlPr>
-                                    <a:rPr lang="uk-UA" i="1">
+                                    <a:rPr lang="uk-UA" sz="2400" i="1">
                                       <a:latin typeface="Cambria Math" panose="02040503050406030204" pitchFamily="18" charset="0"/>
                                     </a:rPr>
                                   </m:ctrlPr>
                                 </m:sSubSupPr>
                                 <m:e>
                                   <m:r>
-                                    <a:rPr lang="uk-UA" i="1">
+                                    <a:rPr lang="uk-UA" sz="2400" i="1">
                                       <a:latin typeface="Cambria Math" panose="02040503050406030204" pitchFamily="18" charset="0"/>
                                     </a:rPr>
                                     <m:t>𝑋</m:t>
@@ -6725,13 +6857,13 @@
                                 </m:e>
                                 <m:sub>
                                   <m:r>
-                                    <a:rPr lang="uk-UA">
+                                    <a:rPr lang="uk-UA" sz="2400">
                                       <a:latin typeface="Cambria Math" panose="02040503050406030204" pitchFamily="18" charset="0"/>
                                     </a:rPr>
                                     <m:t>1</m:t>
                                   </m:r>
                                   <m:r>
-                                    <a:rPr lang="uk-UA" i="1">
+                                    <a:rPr lang="uk-UA" sz="2400" i="1">
                                       <a:latin typeface="Cambria Math" panose="02040503050406030204" pitchFamily="18" charset="0"/>
                                     </a:rPr>
                                     <m:t>𝑖</m:t>
@@ -6739,7 +6871,7 @@
                                 </m:sub>
                                 <m:sup>
                                   <m:r>
-                                    <a:rPr lang="uk-UA">
+                                    <a:rPr lang="uk-UA" sz="2400">
                                       <a:latin typeface="Cambria Math" panose="02040503050406030204" pitchFamily="18" charset="0"/>
                                     </a:rPr>
                                     <m:t>′</m:t>
@@ -6749,14 +6881,14 @@
                               <m:sSub>
                                 <m:sSubPr>
                                   <m:ctrlPr>
-                                    <a:rPr lang="uk-UA" i="1">
+                                    <a:rPr lang="uk-UA" sz="2400" i="1">
                                       <a:latin typeface="Cambria Math" panose="02040503050406030204" pitchFamily="18" charset="0"/>
                                     </a:rPr>
                                   </m:ctrlPr>
                                 </m:sSubPr>
                                 <m:e>
                                   <m:r>
-                                    <a:rPr lang="uk-UA" i="1">
+                                    <a:rPr lang="uk-UA" sz="2400" i="1">
                                       <a:latin typeface="Cambria Math" panose="02040503050406030204" pitchFamily="18" charset="0"/>
                                     </a:rPr>
                                     <m:t>𝑋</m:t>
@@ -6764,13 +6896,13 @@
                                 </m:e>
                                 <m:sub>
                                   <m:r>
-                                    <a:rPr lang="uk-UA">
+                                    <a:rPr lang="uk-UA" sz="2400">
                                       <a:latin typeface="Cambria Math" panose="02040503050406030204" pitchFamily="18" charset="0"/>
                                     </a:rPr>
                                     <m:t>1</m:t>
                                   </m:r>
                                   <m:r>
-                                    <a:rPr lang="uk-UA" i="1">
+                                    <a:rPr lang="uk-UA" sz="2400" i="1">
                                       <a:latin typeface="Cambria Math" panose="02040503050406030204" pitchFamily="18" charset="0"/>
                                     </a:rPr>
                                     <m:t>𝑗</m:t>
@@ -6784,14 +6916,14 @@
                           <m:sSub>
                             <m:sSubPr>
                               <m:ctrlPr>
-                                <a:rPr lang="uk-UA" i="1">
+                                <a:rPr lang="uk-UA" sz="2400" i="1">
                                   <a:latin typeface="Cambria Math" panose="02040503050406030204" pitchFamily="18" charset="0"/>
                                 </a:rPr>
                               </m:ctrlPr>
                             </m:sSubPr>
                             <m:e>
                               <m:r>
-                                <a:rPr lang="uk-UA" i="1">
+                                <a:rPr lang="uk-UA" sz="2400" i="1">
                                   <a:latin typeface="Cambria Math" panose="02040503050406030204" pitchFamily="18" charset="0"/>
                                 </a:rPr>
                                 <m:t>𝑛</m:t>
@@ -6799,7 +6931,7 @@
                             </m:e>
                             <m:sub>
                               <m:r>
-                                <a:rPr lang="uk-UA">
+                                <a:rPr lang="uk-UA" sz="2400">
                                   <a:latin typeface="Cambria Math" panose="02040503050406030204" pitchFamily="18" charset="0"/>
                                 </a:rPr>
                                 <m:t>1</m:t>
@@ -6809,7 +6941,7 @@
                           <m:d>
                             <m:dPr>
                               <m:ctrlPr>
-                                <a:rPr lang="uk-UA" i="1">
+                                <a:rPr lang="uk-UA" sz="2400" i="1">
                                   <a:latin typeface="Cambria Math" panose="02040503050406030204" pitchFamily="18" charset="0"/>
                                 </a:rPr>
                               </m:ctrlPr>
@@ -6818,14 +6950,14 @@
                               <m:sSub>
                                 <m:sSubPr>
                                   <m:ctrlPr>
-                                    <a:rPr lang="uk-UA" i="1">
+                                    <a:rPr lang="uk-UA" sz="2400" i="1">
                                       <a:latin typeface="Cambria Math" panose="02040503050406030204" pitchFamily="18" charset="0"/>
                                     </a:rPr>
                                   </m:ctrlPr>
                                 </m:sSubPr>
                                 <m:e>
                                   <m:r>
-                                    <a:rPr lang="uk-UA" i="1">
+                                    <a:rPr lang="uk-UA" sz="2400" i="1">
                                       <a:latin typeface="Cambria Math" panose="02040503050406030204" pitchFamily="18" charset="0"/>
                                     </a:rPr>
                                     <m:t>𝑛</m:t>
@@ -6833,7 +6965,7 @@
                                 </m:e>
                                 <m:sub>
                                   <m:r>
-                                    <a:rPr lang="uk-UA">
+                                    <a:rPr lang="uk-UA" sz="2400">
                                       <a:latin typeface="Cambria Math" panose="02040503050406030204" pitchFamily="18" charset="0"/>
                                     </a:rPr>
                                     <m:t>1</m:t>
@@ -6841,7 +6973,7 @@
                                 </m:sub>
                               </m:sSub>
                               <m:r>
-                                <a:rPr lang="uk-UA">
+                                <a:rPr lang="uk-UA" sz="2400">
                                   <a:latin typeface="Cambria Math" panose="02040503050406030204" pitchFamily="18" charset="0"/>
                                 </a:rPr>
                                 <m:t>−1</m:t>
@@ -6851,7 +6983,7 @@
                         </m:den>
                       </m:f>
                       <m:r>
-                        <a:rPr lang="uk-UA">
+                        <a:rPr lang="uk-UA" sz="2400">
                           <a:latin typeface="Cambria Math" panose="02040503050406030204" pitchFamily="18" charset="0"/>
                         </a:rPr>
                         <m:t>+</m:t>
@@ -6859,7 +6991,7 @@
                       <m:f>
                         <m:fPr>
                           <m:ctrlPr>
-                            <a:rPr lang="uk-UA" i="1">
+                            <a:rPr lang="uk-UA" sz="2400" i="1">
                               <a:latin typeface="Cambria Math" panose="02040503050406030204" pitchFamily="18" charset="0"/>
                             </a:rPr>
                           </m:ctrlPr>
@@ -6870,26 +7002,26 @@
                               <m:chr m:val="∑"/>
                               <m:limLoc m:val="subSup"/>
                               <m:ctrlPr>
-                                <a:rPr lang="uk-UA" i="1">
+                                <a:rPr lang="uk-UA" sz="2400" i="1">
                                   <a:latin typeface="Cambria Math" panose="02040503050406030204" pitchFamily="18" charset="0"/>
                                 </a:rPr>
                               </m:ctrlPr>
                             </m:naryPr>
                             <m:sub>
                               <m:r>
-                                <a:rPr lang="uk-UA" i="1">
+                                <a:rPr lang="uk-UA" sz="2400" i="1">
                                   <a:latin typeface="Cambria Math" panose="02040503050406030204" pitchFamily="18" charset="0"/>
                                 </a:rPr>
                                 <m:t>𝑖</m:t>
                               </m:r>
                               <m:r>
-                                <a:rPr lang="uk-UA">
+                                <a:rPr lang="uk-UA" sz="2400">
                                   <a:latin typeface="Cambria Math" panose="02040503050406030204" pitchFamily="18" charset="0"/>
                                 </a:rPr>
                                 <m:t>≠</m:t>
                               </m:r>
                               <m:r>
-                                <a:rPr lang="uk-UA" i="1">
+                                <a:rPr lang="uk-UA" sz="2400" i="1">
                                   <a:latin typeface="Cambria Math" panose="02040503050406030204" pitchFamily="18" charset="0"/>
                                 </a:rPr>
                                 <m:t>𝑗</m:t>
@@ -6899,14 +7031,14 @@
                               <m:sSub>
                                 <m:sSubPr>
                                   <m:ctrlPr>
-                                    <a:rPr lang="uk-UA" i="1">
+                                    <a:rPr lang="uk-UA" sz="2400" i="1">
                                       <a:latin typeface="Cambria Math" panose="02040503050406030204" pitchFamily="18" charset="0"/>
                                     </a:rPr>
                                   </m:ctrlPr>
                                 </m:sSubPr>
                                 <m:e>
                                   <m:r>
-                                    <a:rPr lang="uk-UA" i="1">
+                                    <a:rPr lang="uk-UA" sz="2400" i="1">
                                       <a:latin typeface="Cambria Math" panose="02040503050406030204" pitchFamily="18" charset="0"/>
                                     </a:rPr>
                                     <m:t>𝑛</m:t>
@@ -6914,7 +7046,7 @@
                                 </m:e>
                                 <m:sub>
                                   <m:r>
-                                    <a:rPr lang="uk-UA">
+                                    <a:rPr lang="uk-UA" sz="2400">
                                       <a:latin typeface="Cambria Math" panose="02040503050406030204" pitchFamily="18" charset="0"/>
                                     </a:rPr>
                                     <m:t>2</m:t>
@@ -6926,14 +7058,14 @@
                               <m:sSubSup>
                                 <m:sSubSupPr>
                                   <m:ctrlPr>
-                                    <a:rPr lang="uk-UA" i="1">
+                                    <a:rPr lang="uk-UA" sz="2400" i="1">
                                       <a:latin typeface="Cambria Math" panose="02040503050406030204" pitchFamily="18" charset="0"/>
                                     </a:rPr>
                                   </m:ctrlPr>
                                 </m:sSubSupPr>
                                 <m:e>
                                   <m:r>
-                                    <a:rPr lang="uk-UA" i="1">
+                                    <a:rPr lang="uk-UA" sz="2400" i="1">
                                       <a:latin typeface="Cambria Math" panose="02040503050406030204" pitchFamily="18" charset="0"/>
                                     </a:rPr>
                                     <m:t>𝑋</m:t>
@@ -6941,13 +7073,13 @@
                                 </m:e>
                                 <m:sub>
                                   <m:r>
-                                    <a:rPr lang="uk-UA">
+                                    <a:rPr lang="uk-UA" sz="2400">
                                       <a:latin typeface="Cambria Math" panose="02040503050406030204" pitchFamily="18" charset="0"/>
                                     </a:rPr>
                                     <m:t>2</m:t>
                                   </m:r>
                                   <m:r>
-                                    <a:rPr lang="uk-UA" i="1">
+                                    <a:rPr lang="uk-UA" sz="2400" i="1">
                                       <a:latin typeface="Cambria Math" panose="02040503050406030204" pitchFamily="18" charset="0"/>
                                     </a:rPr>
                                     <m:t>𝑖</m:t>
@@ -6955,7 +7087,7 @@
                                 </m:sub>
                                 <m:sup>
                                   <m:r>
-                                    <a:rPr lang="uk-UA">
+                                    <a:rPr lang="uk-UA" sz="2400">
                                       <a:latin typeface="Cambria Math" panose="02040503050406030204" pitchFamily="18" charset="0"/>
                                     </a:rPr>
                                     <m:t>′</m:t>
@@ -6965,14 +7097,14 @@
                               <m:sSub>
                                 <m:sSubPr>
                                   <m:ctrlPr>
-                                    <a:rPr lang="uk-UA" i="1">
+                                    <a:rPr lang="uk-UA" sz="2400" i="1">
                                       <a:latin typeface="Cambria Math" panose="02040503050406030204" pitchFamily="18" charset="0"/>
                                     </a:rPr>
                                   </m:ctrlPr>
                                 </m:sSubPr>
                                 <m:e>
                                   <m:r>
-                                    <a:rPr lang="uk-UA" i="1">
+                                    <a:rPr lang="uk-UA" sz="2400" i="1">
                                       <a:latin typeface="Cambria Math" panose="02040503050406030204" pitchFamily="18" charset="0"/>
                                     </a:rPr>
                                     <m:t>𝑋</m:t>
@@ -6980,13 +7112,13 @@
                                 </m:e>
                                 <m:sub>
                                   <m:r>
-                                    <a:rPr lang="uk-UA">
+                                    <a:rPr lang="uk-UA" sz="2400">
                                       <a:latin typeface="Cambria Math" panose="02040503050406030204" pitchFamily="18" charset="0"/>
                                     </a:rPr>
                                     <m:t>2</m:t>
                                   </m:r>
                                   <m:r>
-                                    <a:rPr lang="uk-UA" i="1">
+                                    <a:rPr lang="uk-UA" sz="2400" i="1">
                                       <a:latin typeface="Cambria Math" panose="02040503050406030204" pitchFamily="18" charset="0"/>
                                     </a:rPr>
                                     <m:t>𝑗</m:t>
@@ -7000,14 +7132,14 @@
                           <m:sSub>
                             <m:sSubPr>
                               <m:ctrlPr>
-                                <a:rPr lang="uk-UA" i="1">
+                                <a:rPr lang="uk-UA" sz="2400" i="1">
                                   <a:latin typeface="Cambria Math" panose="02040503050406030204" pitchFamily="18" charset="0"/>
                                 </a:rPr>
                               </m:ctrlPr>
                             </m:sSubPr>
                             <m:e>
                               <m:r>
-                                <a:rPr lang="uk-UA" i="1">
+                                <a:rPr lang="uk-UA" sz="2400" i="1">
                                   <a:latin typeface="Cambria Math" panose="02040503050406030204" pitchFamily="18" charset="0"/>
                                 </a:rPr>
                                 <m:t>𝑛</m:t>
@@ -7015,7 +7147,7 @@
                             </m:e>
                             <m:sub>
                               <m:r>
-                                <a:rPr lang="uk-UA">
+                                <a:rPr lang="uk-UA" sz="2400">
                                   <a:latin typeface="Cambria Math" panose="02040503050406030204" pitchFamily="18" charset="0"/>
                                 </a:rPr>
                                 <m:t>2</m:t>
@@ -7025,7 +7157,7 @@
                           <m:d>
                             <m:dPr>
                               <m:ctrlPr>
-                                <a:rPr lang="uk-UA" i="1">
+                                <a:rPr lang="uk-UA" sz="2400" i="1">
                                   <a:latin typeface="Cambria Math" panose="02040503050406030204" pitchFamily="18" charset="0"/>
                                 </a:rPr>
                               </m:ctrlPr>
@@ -7034,14 +7166,14 @@
                               <m:sSub>
                                 <m:sSubPr>
                                   <m:ctrlPr>
-                                    <a:rPr lang="uk-UA" i="1">
+                                    <a:rPr lang="uk-UA" sz="2400" i="1">
                                       <a:latin typeface="Cambria Math" panose="02040503050406030204" pitchFamily="18" charset="0"/>
                                     </a:rPr>
                                   </m:ctrlPr>
                                 </m:sSubPr>
                                 <m:e>
                                   <m:r>
-                                    <a:rPr lang="uk-UA" i="1">
+                                    <a:rPr lang="uk-UA" sz="2400" i="1">
                                       <a:latin typeface="Cambria Math" panose="02040503050406030204" pitchFamily="18" charset="0"/>
                                     </a:rPr>
                                     <m:t>𝑛</m:t>
@@ -7049,7 +7181,7 @@
                                 </m:e>
                                 <m:sub>
                                   <m:r>
-                                    <a:rPr lang="uk-UA">
+                                    <a:rPr lang="uk-UA" sz="2400">
                                       <a:latin typeface="Cambria Math" panose="02040503050406030204" pitchFamily="18" charset="0"/>
                                     </a:rPr>
                                     <m:t>2</m:t>
@@ -7057,7 +7189,7 @@
                                 </m:sub>
                               </m:sSub>
                               <m:r>
-                                <a:rPr lang="uk-UA">
+                                <a:rPr lang="uk-UA" sz="2400">
                                   <a:latin typeface="Cambria Math" panose="02040503050406030204" pitchFamily="18" charset="0"/>
                                 </a:rPr>
                                 <m:t>−1</m:t>
@@ -7067,7 +7199,7 @@
                         </m:den>
                       </m:f>
                       <m:r>
-                        <a:rPr lang="uk-UA">
+                        <a:rPr lang="uk-UA" sz="2400">
                           <a:latin typeface="Cambria Math" panose="02040503050406030204" pitchFamily="18" charset="0"/>
                         </a:rPr>
                         <m:t>−2</m:t>
@@ -7075,7 +7207,7 @@
                       <m:f>
                         <m:fPr>
                           <m:ctrlPr>
-                            <a:rPr lang="uk-UA" i="1">
+                            <a:rPr lang="uk-UA" sz="2400" i="1">
                               <a:latin typeface="Cambria Math" panose="02040503050406030204" pitchFamily="18" charset="0"/>
                             </a:rPr>
                           </m:ctrlPr>
@@ -7086,20 +7218,20 @@
                               <m:chr m:val="∑"/>
                               <m:limLoc m:val="subSup"/>
                               <m:ctrlPr>
-                                <a:rPr lang="uk-UA" i="1">
+                                <a:rPr lang="uk-UA" sz="2400" i="1">
                                   <a:latin typeface="Cambria Math" panose="02040503050406030204" pitchFamily="18" charset="0"/>
                                 </a:rPr>
                               </m:ctrlPr>
                             </m:naryPr>
                             <m:sub>
                               <m:r>
-                                <a:rPr lang="uk-UA" i="1">
+                                <a:rPr lang="uk-UA" sz="2400" i="1">
                                   <a:latin typeface="Cambria Math" panose="02040503050406030204" pitchFamily="18" charset="0"/>
                                 </a:rPr>
                                 <m:t>𝑖</m:t>
                               </m:r>
                               <m:r>
-                                <a:rPr lang="uk-UA">
+                                <a:rPr lang="uk-UA" sz="2400">
                                   <a:latin typeface="Cambria Math" panose="02040503050406030204" pitchFamily="18" charset="0"/>
                                 </a:rPr>
                                 <m:t>=1</m:t>
@@ -7109,14 +7241,14 @@
                               <m:sSub>
                                 <m:sSubPr>
                                   <m:ctrlPr>
-                                    <a:rPr lang="uk-UA" i="1">
+                                    <a:rPr lang="uk-UA" sz="2400" i="1">
                                       <a:latin typeface="Cambria Math" panose="02040503050406030204" pitchFamily="18" charset="0"/>
                                     </a:rPr>
                                   </m:ctrlPr>
                                 </m:sSubPr>
                                 <m:e>
                                   <m:r>
-                                    <a:rPr lang="uk-UA" i="1">
+                                    <a:rPr lang="uk-UA" sz="2400" i="1">
                                       <a:latin typeface="Cambria Math" panose="02040503050406030204" pitchFamily="18" charset="0"/>
                                     </a:rPr>
                                     <m:t>𝑛</m:t>
@@ -7124,7 +7256,7 @@
                                 </m:e>
                                 <m:sub>
                                   <m:r>
-                                    <a:rPr lang="uk-UA">
+                                    <a:rPr lang="uk-UA" sz="2400">
                                       <a:latin typeface="Cambria Math" panose="02040503050406030204" pitchFamily="18" charset="0"/>
                                     </a:rPr>
                                     <m:t>1</m:t>
@@ -7138,20 +7270,20 @@
                                   <m:chr m:val="∑"/>
                                   <m:limLoc m:val="subSup"/>
                                   <m:ctrlPr>
-                                    <a:rPr lang="uk-UA" i="1">
+                                    <a:rPr lang="uk-UA" sz="2400" i="1">
                                       <a:latin typeface="Cambria Math" panose="02040503050406030204" pitchFamily="18" charset="0"/>
                                     </a:rPr>
                                   </m:ctrlPr>
                                 </m:naryPr>
                                 <m:sub>
                                   <m:r>
-                                    <a:rPr lang="uk-UA" i="1">
+                                    <a:rPr lang="uk-UA" sz="2400" i="1">
                                       <a:latin typeface="Cambria Math" panose="02040503050406030204" pitchFamily="18" charset="0"/>
                                     </a:rPr>
                                     <m:t>𝑗</m:t>
                                   </m:r>
                                   <m:r>
-                                    <a:rPr lang="uk-UA">
+                                    <a:rPr lang="uk-UA" sz="2400">
                                       <a:latin typeface="Cambria Math" panose="02040503050406030204" pitchFamily="18" charset="0"/>
                                     </a:rPr>
                                     <m:t>=1</m:t>
@@ -7161,14 +7293,14 @@
                                   <m:sSub>
                                     <m:sSubPr>
                                       <m:ctrlPr>
-                                        <a:rPr lang="uk-UA" i="1">
+                                        <a:rPr lang="uk-UA" sz="2400" i="1">
                                           <a:latin typeface="Cambria Math" panose="02040503050406030204" pitchFamily="18" charset="0"/>
                                         </a:rPr>
                                       </m:ctrlPr>
                                     </m:sSubPr>
                                     <m:e>
                                       <m:r>
-                                        <a:rPr lang="uk-UA" i="1">
+                                        <a:rPr lang="uk-UA" sz="2400" i="1">
                                           <a:latin typeface="Cambria Math" panose="02040503050406030204" pitchFamily="18" charset="0"/>
                                         </a:rPr>
                                         <m:t>𝑛</m:t>
@@ -7176,7 +7308,7 @@
                                     </m:e>
                                     <m:sub>
                                       <m:r>
-                                        <a:rPr lang="uk-UA">
+                                        <a:rPr lang="uk-UA" sz="2400">
                                           <a:latin typeface="Cambria Math" panose="02040503050406030204" pitchFamily="18" charset="0"/>
                                         </a:rPr>
                                         <m:t>2</m:t>
@@ -7188,14 +7320,14 @@
                                   <m:sSubSup>
                                     <m:sSubSupPr>
                                       <m:ctrlPr>
-                                        <a:rPr lang="uk-UA" i="1">
+                                        <a:rPr lang="uk-UA" sz="2400" i="1">
                                           <a:latin typeface="Cambria Math" panose="02040503050406030204" pitchFamily="18" charset="0"/>
                                         </a:rPr>
                                       </m:ctrlPr>
                                     </m:sSubSupPr>
                                     <m:e>
                                       <m:r>
-                                        <a:rPr lang="uk-UA" i="1">
+                                        <a:rPr lang="uk-UA" sz="2400" i="1">
                                           <a:latin typeface="Cambria Math" panose="02040503050406030204" pitchFamily="18" charset="0"/>
                                         </a:rPr>
                                         <m:t>𝑋</m:t>
@@ -7203,13 +7335,13 @@
                                     </m:e>
                                     <m:sub>
                                       <m:r>
-                                        <a:rPr lang="uk-UA">
+                                        <a:rPr lang="uk-UA" sz="2400">
                                           <a:latin typeface="Cambria Math" panose="02040503050406030204" pitchFamily="18" charset="0"/>
                                         </a:rPr>
                                         <m:t>1</m:t>
                                       </m:r>
                                       <m:r>
-                                        <a:rPr lang="uk-UA" i="1">
+                                        <a:rPr lang="uk-UA" sz="2400" i="1">
                                           <a:latin typeface="Cambria Math" panose="02040503050406030204" pitchFamily="18" charset="0"/>
                                         </a:rPr>
                                         <m:t>𝑖</m:t>
@@ -7217,7 +7349,7 @@
                                     </m:sub>
                                     <m:sup>
                                       <m:r>
-                                        <a:rPr lang="uk-UA">
+                                        <a:rPr lang="uk-UA" sz="2400">
                                           <a:latin typeface="Cambria Math" panose="02040503050406030204" pitchFamily="18" charset="0"/>
                                         </a:rPr>
                                         <m:t>′</m:t>
@@ -7227,14 +7359,14 @@
                                   <m:sSub>
                                     <m:sSubPr>
                                       <m:ctrlPr>
-                                        <a:rPr lang="uk-UA" i="1">
+                                        <a:rPr lang="uk-UA" sz="2400" i="1">
                                           <a:latin typeface="Cambria Math" panose="02040503050406030204" pitchFamily="18" charset="0"/>
                                         </a:rPr>
                                       </m:ctrlPr>
                                     </m:sSubPr>
                                     <m:e>
                                       <m:r>
-                                        <a:rPr lang="uk-UA" i="1">
+                                        <a:rPr lang="uk-UA" sz="2400" i="1">
                                           <a:latin typeface="Cambria Math" panose="02040503050406030204" pitchFamily="18" charset="0"/>
                                         </a:rPr>
                                         <m:t>𝑋</m:t>
@@ -7242,13 +7374,13 @@
                                     </m:e>
                                     <m:sub>
                                       <m:r>
-                                        <a:rPr lang="uk-UA">
+                                        <a:rPr lang="uk-UA" sz="2400">
                                           <a:latin typeface="Cambria Math" panose="02040503050406030204" pitchFamily="18" charset="0"/>
                                         </a:rPr>
                                         <m:t>2</m:t>
                                       </m:r>
                                       <m:r>
-                                        <a:rPr lang="uk-UA" i="1">
+                                        <a:rPr lang="uk-UA" sz="2400" i="1">
                                           <a:latin typeface="Cambria Math" panose="02040503050406030204" pitchFamily="18" charset="0"/>
                                         </a:rPr>
                                         <m:t>𝑗</m:t>
@@ -7264,14 +7396,14 @@
                           <m:sSub>
                             <m:sSubPr>
                               <m:ctrlPr>
-                                <a:rPr lang="uk-UA" i="1">
+                                <a:rPr lang="uk-UA" sz="2400" i="1">
                                   <a:latin typeface="Cambria Math" panose="02040503050406030204" pitchFamily="18" charset="0"/>
                                 </a:rPr>
                               </m:ctrlPr>
                             </m:sSubPr>
                             <m:e>
                               <m:r>
-                                <a:rPr lang="uk-UA" i="1">
+                                <a:rPr lang="uk-UA" sz="2400" i="1">
                                   <a:latin typeface="Cambria Math" panose="02040503050406030204" pitchFamily="18" charset="0"/>
                                 </a:rPr>
                                 <m:t>𝑛</m:t>
@@ -7279,7 +7411,7 @@
                             </m:e>
                             <m:sub>
                               <m:r>
-                                <a:rPr lang="uk-UA">
+                                <a:rPr lang="uk-UA" sz="2400">
                                   <a:latin typeface="Cambria Math" panose="02040503050406030204" pitchFamily="18" charset="0"/>
                                 </a:rPr>
                                 <m:t>1</m:t>
@@ -7289,14 +7421,14 @@
                           <m:sSub>
                             <m:sSubPr>
                               <m:ctrlPr>
-                                <a:rPr lang="uk-UA" i="1">
+                                <a:rPr lang="uk-UA" sz="2400" i="1">
                                   <a:latin typeface="Cambria Math" panose="02040503050406030204" pitchFamily="18" charset="0"/>
                                 </a:rPr>
                               </m:ctrlPr>
                             </m:sSubPr>
                             <m:e>
                               <m:r>
-                                <a:rPr lang="uk-UA" i="1">
+                                <a:rPr lang="uk-UA" sz="2400" i="1">
                                   <a:latin typeface="Cambria Math" panose="02040503050406030204" pitchFamily="18" charset="0"/>
                                 </a:rPr>
                                 <m:t>𝑛</m:t>
@@ -7304,7 +7436,7 @@
                             </m:e>
                             <m:sub>
                               <m:r>
-                                <a:rPr lang="uk-UA">
+                                <a:rPr lang="uk-UA" sz="2400">
                                   <a:latin typeface="Cambria Math" panose="02040503050406030204" pitchFamily="18" charset="0"/>
                                 </a:rPr>
                                 <m:t>2</m:t>
@@ -7316,7 +7448,7 @@
                     </m:oMath>
                   </m:oMathPara>
                 </a14:m>
-                <a:endParaRPr lang="uk-UA" dirty="0"/>
+                <a:endParaRPr lang="uk-UA" sz="2400" dirty="0"/>
               </a:p>
               <a:p>
                 <a:pPr marL="0" indent="0">
@@ -7331,7 +7463,7 @@
                       <m:f>
                         <m:fPr>
                           <m:ctrlPr>
-                            <a:rPr lang="uk-UA" i="1">
+                            <a:rPr lang="uk-UA" sz="2400" i="1">
                               <a:latin typeface="Cambria Math" panose="02040503050406030204" pitchFamily="18" charset="0"/>
                             </a:rPr>
                           </m:ctrlPr>
@@ -7340,14 +7472,14 @@
                           <m:sSub>
                             <m:sSubPr>
                               <m:ctrlPr>
-                                <a:rPr lang="uk-UA" i="1">
+                                <a:rPr lang="uk-UA" sz="2400" i="1">
                                   <a:latin typeface="Cambria Math" panose="02040503050406030204" pitchFamily="18" charset="0"/>
                                 </a:rPr>
                               </m:ctrlPr>
                             </m:sSubPr>
                             <m:e>
                               <m:r>
-                                <a:rPr lang="uk-UA" i="1">
+                                <a:rPr lang="uk-UA" sz="2400" i="1">
                                   <a:latin typeface="Cambria Math" panose="02040503050406030204" pitchFamily="18" charset="0"/>
                                 </a:rPr>
                                 <m:t>𝑇</m:t>
@@ -7355,7 +7487,7 @@
                             </m:e>
                             <m:sub>
                               <m:r>
-                                <a:rPr lang="uk-UA" i="1">
+                                <a:rPr lang="uk-UA" sz="2400" i="1">
                                   <a:latin typeface="Cambria Math" panose="02040503050406030204" pitchFamily="18" charset="0"/>
                                 </a:rPr>
                                 <m:t>𝑛</m:t>
@@ -7363,7 +7495,7 @@
                             </m:sub>
                           </m:sSub>
                           <m:r>
-                            <a:rPr lang="uk-UA">
+                            <a:rPr lang="uk-UA" sz="2400">
                               <a:latin typeface="Cambria Math" panose="02040503050406030204" pitchFamily="18" charset="0"/>
                             </a:rPr>
                             <m:t>−</m:t>
@@ -7371,7 +7503,7 @@
                           <m:sSup>
                             <m:sSupPr>
                               <m:ctrlPr>
-                                <a:rPr lang="uk-UA" i="1">
+                                <a:rPr lang="uk-UA" sz="2400" i="1">
                                   <a:latin typeface="Cambria Math" panose="02040503050406030204" pitchFamily="18" charset="0"/>
                                 </a:rPr>
                               </m:ctrlPr>
@@ -7382,7 +7514,7 @@
                                   <m:begChr m:val="|"/>
                                   <m:endChr m:val="|"/>
                                   <m:ctrlPr>
-                                    <a:rPr lang="uk-UA" i="1">
+                                    <a:rPr lang="uk-UA" sz="2400" i="1">
                                       <a:latin typeface="Cambria Math" panose="02040503050406030204" pitchFamily="18" charset="0"/>
                                     </a:rPr>
                                   </m:ctrlPr>
@@ -7393,7 +7525,7 @@
                                       <m:begChr m:val="|"/>
                                       <m:endChr m:val="|"/>
                                       <m:ctrlPr>
-                                        <a:rPr lang="uk-UA" i="1">
+                                        <a:rPr lang="uk-UA" sz="2400" i="1">
                                           <a:latin typeface="Cambria Math" panose="02040503050406030204" pitchFamily="18" charset="0"/>
                                         </a:rPr>
                                       </m:ctrlPr>
@@ -7402,7 +7534,7 @@
                                       <m:sSub>
                                         <m:sSubPr>
                                           <m:ctrlPr>
-                                            <a:rPr lang="uk-UA" i="1">
+                                            <a:rPr lang="uk-UA" sz="2400" i="1">
                                               <a:latin typeface="Cambria Math" panose="02040503050406030204" pitchFamily="18" charset="0"/>
                                             </a:rPr>
                                           </m:ctrlPr>
@@ -7412,7 +7544,7 @@
                                             <m:rPr>
                                               <m:sty m:val="p"/>
                                             </m:rPr>
-                                            <a:rPr lang="uk-UA">
+                                            <a:rPr lang="uk-UA" sz="2400">
                                               <a:latin typeface="Cambria Math" panose="02040503050406030204" pitchFamily="18" charset="0"/>
                                             </a:rPr>
                                             <m:t>μ</m:t>
@@ -7420,7 +7552,7 @@
                                         </m:e>
                                         <m:sub>
                                           <m:r>
-                                            <a:rPr lang="uk-UA">
+                                            <a:rPr lang="uk-UA" sz="2400">
                                               <a:latin typeface="Cambria Math" panose="02040503050406030204" pitchFamily="18" charset="0"/>
                                             </a:rPr>
                                             <m:t>1</m:t>
@@ -7428,7 +7560,7 @@
                                         </m:sub>
                                       </m:sSub>
                                       <m:r>
-                                        <a:rPr lang="uk-UA">
+                                        <a:rPr lang="uk-UA" sz="2400">
                                           <a:latin typeface="Cambria Math" panose="02040503050406030204" pitchFamily="18" charset="0"/>
                                         </a:rPr>
                                         <m:t>−</m:t>
@@ -7436,7 +7568,7 @@
                                       <m:sSub>
                                         <m:sSubPr>
                                           <m:ctrlPr>
-                                            <a:rPr lang="uk-UA" i="1">
+                                            <a:rPr lang="uk-UA" sz="2400" i="1">
                                               <a:latin typeface="Cambria Math" panose="02040503050406030204" pitchFamily="18" charset="0"/>
                                             </a:rPr>
                                           </m:ctrlPr>
@@ -7446,7 +7578,7 @@
                                             <m:rPr>
                                               <m:sty m:val="p"/>
                                             </m:rPr>
-                                            <a:rPr lang="uk-UA">
+                                            <a:rPr lang="uk-UA" sz="2400">
                                               <a:latin typeface="Cambria Math" panose="02040503050406030204" pitchFamily="18" charset="0"/>
                                             </a:rPr>
                                             <m:t>μ</m:t>
@@ -7454,7 +7586,7 @@
                                         </m:e>
                                         <m:sub>
                                           <m:r>
-                                            <a:rPr lang="uk-UA">
+                                            <a:rPr lang="uk-UA" sz="2400">
                                               <a:latin typeface="Cambria Math" panose="02040503050406030204" pitchFamily="18" charset="0"/>
                                             </a:rPr>
                                             <m:t>2</m:t>
@@ -7468,7 +7600,7 @@
                             </m:e>
                             <m:sup>
                               <m:r>
-                                <a:rPr lang="uk-UA">
+                                <a:rPr lang="uk-UA" sz="2400">
                                   <a:latin typeface="Cambria Math" panose="02040503050406030204" pitchFamily="18" charset="0"/>
                                 </a:rPr>
                                 <m:t>2</m:t>
@@ -7481,7 +7613,7 @@
                             <m:radPr>
                               <m:degHide m:val="on"/>
                               <m:ctrlPr>
-                                <a:rPr lang="uk-UA" i="1">
+                                <a:rPr lang="uk-UA" sz="2400" i="1">
                                   <a:latin typeface="Cambria Math" panose="02040503050406030204" pitchFamily="18" charset="0"/>
                                 </a:rPr>
                               </m:ctrlPr>
@@ -7489,7 +7621,7 @@
                             <m:deg/>
                             <m:e>
                               <m:r>
-                                <a:rPr lang="uk-UA" i="1">
+                                <a:rPr lang="uk-UA" sz="2400" i="1">
                                   <a:latin typeface="Cambria Math" panose="02040503050406030204" pitchFamily="18" charset="0"/>
                                 </a:rPr>
                                 <m:t>𝑉𝑎𝑟</m:t>
@@ -7497,7 +7629,7 @@
                               <m:d>
                                 <m:dPr>
                                   <m:ctrlPr>
-                                    <a:rPr lang="uk-UA" i="1">
+                                    <a:rPr lang="uk-UA" sz="2400" i="1">
                                       <a:latin typeface="Cambria Math" panose="02040503050406030204" pitchFamily="18" charset="0"/>
                                     </a:rPr>
                                   </m:ctrlPr>
@@ -7506,14 +7638,14 @@
                                   <m:sSub>
                                     <m:sSubPr>
                                       <m:ctrlPr>
-                                        <a:rPr lang="uk-UA" i="1">
+                                        <a:rPr lang="uk-UA" sz="2400" i="1">
                                           <a:latin typeface="Cambria Math" panose="02040503050406030204" pitchFamily="18" charset="0"/>
                                         </a:rPr>
                                       </m:ctrlPr>
                                     </m:sSubPr>
                                     <m:e>
                                       <m:r>
-                                        <a:rPr lang="uk-UA" i="1">
+                                        <a:rPr lang="uk-UA" sz="2400" i="1">
                                           <a:latin typeface="Cambria Math" panose="02040503050406030204" pitchFamily="18" charset="0"/>
                                         </a:rPr>
                                         <m:t>𝑇</m:t>
@@ -7521,7 +7653,7 @@
                                     </m:e>
                                     <m:sub>
                                       <m:r>
-                                        <a:rPr lang="uk-UA" i="1">
+                                        <a:rPr lang="uk-UA" sz="2400" i="1">
                                           <a:latin typeface="Cambria Math" panose="02040503050406030204" pitchFamily="18" charset="0"/>
                                         </a:rPr>
                                         <m:t>𝑛</m:t>
@@ -7535,34 +7667,16 @@
                         </m:den>
                       </m:f>
                       <m:r>
-                        <a:rPr lang="uk-UA">
+                        <a:rPr lang="uk-UA" sz="2400" smtClean="0">
                           <a:solidFill>
-                            <a:srgbClr val="FF0000"/>
+                            <a:schemeClr val="tx1"/>
                           </a:solidFill>
                           <a:latin typeface="Cambria Math" panose="02040503050406030204" pitchFamily="18" charset="0"/>
                         </a:rPr>
-                        <m:t>→</m:t>
+                        <m:t>→ </m:t>
                       </m:r>
                       <m:r>
-                        <a:rPr lang="uk-UA" i="1">
-                          <a:solidFill>
-                            <a:srgbClr val="FF0000"/>
-                          </a:solidFill>
-                          <a:latin typeface="Cambria Math" panose="02040503050406030204" pitchFamily="18" charset="0"/>
-                        </a:rPr>
-                        <m:t>𝑑</m:t>
-                      </m:r>
-                      <m:r>
-                        <a:rPr lang="uk-UA">
-                          <a:solidFill>
-                            <a:srgbClr val="FF0000"/>
-                          </a:solidFill>
-                          <a:latin typeface="Cambria Math" panose="02040503050406030204" pitchFamily="18" charset="0"/>
-                        </a:rPr>
-                        <m:t>  </m:t>
-                      </m:r>
-                      <m:r>
-                        <a:rPr lang="uk-UA" i="1">
+                        <a:rPr lang="uk-UA" sz="2400" i="1">
                           <a:latin typeface="Cambria Math" panose="02040503050406030204" pitchFamily="18" charset="0"/>
                         </a:rPr>
                         <m:t>𝑁</m:t>
@@ -7570,14 +7684,14 @@
                       <m:d>
                         <m:dPr>
                           <m:ctrlPr>
-                            <a:rPr lang="uk-UA" i="1">
+                            <a:rPr lang="uk-UA" sz="2400" i="1">
                               <a:latin typeface="Cambria Math" panose="02040503050406030204" pitchFamily="18" charset="0"/>
                             </a:rPr>
                           </m:ctrlPr>
                         </m:dPr>
                         <m:e>
                           <m:r>
-                            <a:rPr lang="uk-UA">
+                            <a:rPr lang="uk-UA" sz="2400">
                               <a:latin typeface="Cambria Math" panose="02040503050406030204" pitchFamily="18" charset="0"/>
                             </a:rPr>
                             <m:t>0,1</m:t>
@@ -7585,31 +7699,31 @@
                         </m:e>
                       </m:d>
                       <m:r>
-                        <a:rPr lang="uk-UA" i="1">
+                        <a:rPr lang="uk-UA" sz="2400" i="1">
                           <a:latin typeface="Cambria Math" panose="02040503050406030204" pitchFamily="18" charset="0"/>
                         </a:rPr>
                         <m:t>, </m:t>
                       </m:r>
                       <m:r>
-                        <a:rPr lang="en-US" i="1">
+                        <a:rPr lang="en-US" sz="2400" i="1">
                           <a:latin typeface="Cambria Math" panose="02040503050406030204" pitchFamily="18" charset="0"/>
                         </a:rPr>
                         <m:t>𝑝</m:t>
                       </m:r>
                       <m:r>
-                        <a:rPr lang="en-US" i="1">
+                        <a:rPr lang="en-US" sz="2400" i="1">
                           <a:latin typeface="Cambria Math" panose="02040503050406030204" pitchFamily="18" charset="0"/>
                         </a:rPr>
                         <m:t>→∞, </m:t>
                       </m:r>
                       <m:r>
-                        <a:rPr lang="en-US" i="1">
+                        <a:rPr lang="en-US" sz="2400" i="1">
                           <a:latin typeface="Cambria Math" panose="02040503050406030204" pitchFamily="18" charset="0"/>
                         </a:rPr>
                         <m:t>𝑛</m:t>
                       </m:r>
                       <m:r>
-                        <a:rPr lang="en-US" i="1">
+                        <a:rPr lang="en-US" sz="2400" i="1">
                           <a:latin typeface="Cambria Math" panose="02040503050406030204" pitchFamily="18" charset="0"/>
                         </a:rPr>
                         <m:t>→∞</m:t>
@@ -7617,7 +7731,7 @@
                     </m:oMath>
                   </m:oMathPara>
                 </a14:m>
-                <a:endParaRPr lang="uk-UA" dirty="0"/>
+                <a:endParaRPr lang="uk-UA" sz="2400" dirty="0"/>
               </a:p>
               <a:p>
                 <a:pPr marL="0" indent="0">
@@ -7653,7 +7767,7 @@
               <a:blipFill>
                 <a:blip r:embed="rId2"/>
                 <a:stretch>
-                  <a:fillRect l="-442" r="-55"/>
+                  <a:fillRect l="-552" t="-2715"/>
                 </a:stretch>
               </a:blipFill>
             </p:spPr>
@@ -7888,29 +8002,11 @@
                     <m:r>
                       <a:rPr lang="uk-UA" smtClean="0">
                         <a:solidFill>
-                          <a:srgbClr val="FF0000"/>
+                          <a:schemeClr val="tx1"/>
                         </a:solidFill>
                         <a:latin typeface="Cambria Math" panose="02040503050406030204" pitchFamily="18" charset="0"/>
                       </a:rPr>
                       <m:t>→</m:t>
-                    </m:r>
-                    <m:r>
-                      <a:rPr lang="uk-UA" i="1">
-                        <a:solidFill>
-                          <a:srgbClr val="FF0000"/>
-                        </a:solidFill>
-                        <a:latin typeface="Cambria Math" panose="02040503050406030204" pitchFamily="18" charset="0"/>
-                      </a:rPr>
-                      <m:t>𝑑</m:t>
-                    </m:r>
-                    <m:r>
-                      <a:rPr lang="uk-UA">
-                        <a:solidFill>
-                          <a:srgbClr val="FF0000"/>
-                        </a:solidFill>
-                        <a:latin typeface="Cambria Math" panose="02040503050406030204" pitchFamily="18" charset="0"/>
-                      </a:rPr>
-                      <m:t> </m:t>
                     </m:r>
                     <m:r>
                       <a:rPr lang="uk-UA" i="1">
@@ -9849,7 +9945,6 @@
                   <m:oMath xmlns:m="http://schemas.openxmlformats.org/officeDocument/2006/math">
                     <m:r>
                       <a:rPr lang="uk-UA" i="1">
-                        <a:latin typeface="Cambria Math" panose="02040503050406030204" pitchFamily="18" charset="0"/>
                         <a:ea typeface="Calibri" panose="020F0502020204030204" pitchFamily="34" charset="0"/>
                         <a:cs typeface="Times New Roman" panose="02020603050405020304" pitchFamily="18" charset="0"/>
                       </a:rPr>
@@ -9859,7 +9954,6 @@
                 </a14:m>
                 <a:r>
                   <a:rPr lang="uk-UA" dirty="0">
-                    <a:latin typeface="Times New Roman" panose="02020603050405020304" pitchFamily="18" charset="0"/>
                     <a:ea typeface="Calibri" panose="020F0502020204030204" pitchFamily="34" charset="0"/>
                   </a:rPr>
                   <a:t>-е вибіркове середнє після вилучення </a:t>
@@ -10019,7 +10113,6 @@
                   <m:oMath xmlns:m="http://schemas.openxmlformats.org/officeDocument/2006/math">
                     <m:r>
                       <a:rPr lang="uk-UA" i="1">
-                        <a:latin typeface="Cambria Math" panose="02040503050406030204" pitchFamily="18" charset="0"/>
                         <a:ea typeface="Calibri" panose="020F0502020204030204" pitchFamily="34" charset="0"/>
                         <a:cs typeface="Times New Roman" panose="02020603050405020304" pitchFamily="18" charset="0"/>
                       </a:rPr>
@@ -10029,7 +10122,6 @@
                 </a14:m>
                 <a:r>
                   <a:rPr lang="uk-UA" dirty="0">
-                    <a:latin typeface="Times New Roman" panose="02020603050405020304" pitchFamily="18" charset="0"/>
                     <a:ea typeface="Calibri" panose="020F0502020204030204" pitchFamily="34" charset="0"/>
                   </a:rPr>
                   <a:t>-е вибіркове середнє після вилучення </a:t>
@@ -10085,10 +10177,16 @@
                 </a:pPr>
                 <a:r>
                   <a:rPr lang="uk-UA" dirty="0">
+                    <a:ea typeface="Calibri" panose="020F0502020204030204" pitchFamily="34" charset="0"/>
+                  </a:rPr>
+                  <a:t>Якщо</a:t>
+                </a:r>
+                <a:r>
+                  <a:rPr lang="uk-UA" dirty="0">
                     <a:latin typeface="Times New Roman" panose="02020603050405020304" pitchFamily="18" charset="0"/>
                     <a:ea typeface="Calibri" panose="020F0502020204030204" pitchFamily="34" charset="0"/>
                   </a:rPr>
-                  <a:t>Якщо </a:t>
+                  <a:t> </a:t>
                 </a:r>
                 <a14:m>
                   <m:oMath xmlns:m="http://schemas.openxmlformats.org/officeDocument/2006/math">
@@ -10217,7 +10315,20 @@
                     <a:latin typeface="Times New Roman" panose="02020603050405020304" pitchFamily="18" charset="0"/>
                     <a:ea typeface="Calibri" panose="020F0502020204030204" pitchFamily="34" charset="0"/>
                   </a:rPr>
-                  <a:t> – верхній </a:t>
+                  <a:t> – в</a:t>
+                </a:r>
+                <a:r>
+                  <a:rPr lang="uk-UA" dirty="0">
+                    <a:ea typeface="Calibri" panose="020F0502020204030204" pitchFamily="34" charset="0"/>
+                  </a:rPr>
+                  <a:t>ерхній</a:t>
+                </a:r>
+                <a:r>
+                  <a:rPr lang="uk-UA" dirty="0">
+                    <a:latin typeface="Times New Roman" panose="02020603050405020304" pitchFamily="18" charset="0"/>
+                    <a:ea typeface="Calibri" panose="020F0502020204030204" pitchFamily="34" charset="0"/>
+                  </a:rPr>
+                  <a:t> </a:t>
                 </a:r>
                 <a14:m>
                   <m:oMath xmlns:m="http://schemas.openxmlformats.org/officeDocument/2006/math">
@@ -10243,14 +10354,12 @@
                 </a:r>
                 <a:r>
                   <a:rPr lang="uk-UA" dirty="0" err="1">
-                    <a:latin typeface="Times New Roman" panose="02020603050405020304" pitchFamily="18" charset="0"/>
                     <a:ea typeface="Calibri" panose="020F0502020204030204" pitchFamily="34" charset="0"/>
                   </a:rPr>
                   <a:t>квантиль</a:t>
                 </a:r>
                 <a:r>
                   <a:rPr lang="uk-UA" dirty="0">
-                    <a:latin typeface="Times New Roman" panose="02020603050405020304" pitchFamily="18" charset="0"/>
                     <a:ea typeface="Calibri" panose="020F0502020204030204" pitchFamily="34" charset="0"/>
                   </a:rPr>
                   <a:t> розподілу </a:t>
@@ -10488,68 +10597,582 @@
           </a:p>
         </p:txBody>
       </p:sp>
-      <p:sp>
-        <p:nvSpPr>
-          <p:cNvPr id="3" name="Місце для вмісту 2">
-            <a:extLst>
-              <a:ext uri="{FF2B5EF4-FFF2-40B4-BE49-F238E27FC236}">
-                <a16:creationId xmlns:a16="http://schemas.microsoft.com/office/drawing/2014/main" id="{852CEBC4-E91A-499B-8CAD-B2ACF41C93DC}"/>
-              </a:ext>
-            </a:extLst>
-          </p:cNvPr>
-          <p:cNvSpPr>
-            <a:spLocks noGrp="1"/>
-          </p:cNvSpPr>
-          <p:nvPr>
-            <p:ph idx="1"/>
-          </p:nvPr>
-        </p:nvSpPr>
-        <p:spPr/>
-        <p:txBody>
-          <a:bodyPr/>
-          <a:lstStyle/>
-          <a:p>
-            <a:pPr marL="0" indent="0">
-              <a:buNone/>
-            </a:pPr>
-            <a:r>
-              <a:rPr lang="uk-UA" dirty="0">
-                <a:latin typeface="Times New Roman" panose="02020603050405020304" pitchFamily="18" charset="0"/>
-                <a:ea typeface="Calibri" panose="020F0502020204030204" pitchFamily="34" charset="0"/>
-              </a:rPr>
-              <a:t>Рівень </a:t>
-            </a:r>
-            <a:r>
-              <a:rPr lang="uk-UA" dirty="0" err="1">
-                <a:latin typeface="Times New Roman" panose="02020603050405020304" pitchFamily="18" charset="0"/>
-                <a:ea typeface="Calibri" panose="020F0502020204030204" pitchFamily="34" charset="0"/>
-              </a:rPr>
-              <a:t>значущости</a:t>
-            </a:r>
-            <a:r>
-              <a:rPr lang="uk-UA" dirty="0">
-                <a:latin typeface="Times New Roman" panose="02020603050405020304" pitchFamily="18" charset="0"/>
-                <a:ea typeface="Calibri" panose="020F0502020204030204" pitchFamily="34" charset="0"/>
-              </a:rPr>
-              <a:t> було встановлено </a:t>
-            </a:r>
-            <a:r>
-              <a:rPr lang="uk-UA">
-                <a:latin typeface="Times New Roman" panose="02020603050405020304" pitchFamily="18" charset="0"/>
-                <a:ea typeface="Calibri" panose="020F0502020204030204" pitchFamily="34" charset="0"/>
-              </a:rPr>
-              <a:t>як 0.05.</a:t>
-            </a:r>
-            <a:endParaRPr lang="uk-UA" dirty="0"/>
-          </a:p>
-          <a:p>
-            <a:pPr marL="0" indent="0">
-              <a:buNone/>
-            </a:pPr>
-            <a:endParaRPr lang="uk-UA" dirty="0"/>
-          </a:p>
-        </p:txBody>
-      </p:sp>
+      <mc:AlternateContent xmlns:mc="http://schemas.openxmlformats.org/markup-compatibility/2006">
+        <mc:Choice xmlns:a14="http://schemas.microsoft.com/office/drawing/2010/main" Requires="a14">
+          <p:sp>
+            <p:nvSpPr>
+              <p:cNvPr id="3" name="Місце для вмісту 2">
+                <a:extLst>
+                  <a:ext uri="{FF2B5EF4-FFF2-40B4-BE49-F238E27FC236}">
+                    <a16:creationId xmlns:a16="http://schemas.microsoft.com/office/drawing/2014/main" id="{852CEBC4-E91A-499B-8CAD-B2ACF41C93DC}"/>
+                  </a:ext>
+                </a:extLst>
+              </p:cNvPr>
+              <p:cNvSpPr>
+                <a:spLocks noGrp="1"/>
+              </p:cNvSpPr>
+              <p:nvPr>
+                <p:ph idx="1"/>
+              </p:nvPr>
+            </p:nvSpPr>
+            <p:spPr>
+              <a:xfrm>
+                <a:off x="581192" y="2774054"/>
+                <a:ext cx="11029615" cy="3678303"/>
+              </a:xfrm>
+            </p:spPr>
+            <p:txBody>
+              <a:bodyPr>
+                <a:noAutofit/>
+              </a:bodyPr>
+              <a:lstStyle/>
+              <a:p>
+                <a:pPr marL="0" indent="0">
+                  <a:buNone/>
+                </a:pPr>
+                <a:r>
+                  <a:rPr lang="uk-UA" sz="2400" dirty="0">
+                    <a:ea typeface="Calibri" panose="020F0502020204030204" pitchFamily="34" charset="0"/>
+                  </a:rPr>
+                  <a:t>Рівень </a:t>
+                </a:r>
+                <a:r>
+                  <a:rPr lang="uk-UA" sz="2400" dirty="0" err="1">
+                    <a:ea typeface="Calibri" panose="020F0502020204030204" pitchFamily="34" charset="0"/>
+                  </a:rPr>
+                  <a:t>значущости</a:t>
+                </a:r>
+                <a:r>
+                  <a:rPr lang="uk-UA" sz="2400" dirty="0">
+                    <a:ea typeface="Calibri" panose="020F0502020204030204" pitchFamily="34" charset="0"/>
+                  </a:rPr>
+                  <a:t> було встановлено як 0.05.</a:t>
+                </a:r>
+              </a:p>
+              <a:p>
+                <a:pPr marL="0" indent="0">
+                  <a:buNone/>
+                </a:pPr>
+                <a:r>
+                  <a:rPr lang="uk-UA" sz="2400" dirty="0">
+                    <a:ea typeface="Calibri" panose="020F0502020204030204" pitchFamily="34" charset="0"/>
+                  </a:rPr>
+                  <a:t>Містить три модулі:</a:t>
+                </a:r>
+              </a:p>
+              <a:p>
+                <a:r>
+                  <a:rPr lang="en-US" sz="2400" dirty="0">
+                    <a:ea typeface="Calibri" panose="020F0502020204030204" pitchFamily="34" charset="0"/>
+                  </a:rPr>
+                  <a:t>main – </a:t>
+                </a:r>
+                <a:r>
+                  <a:rPr lang="uk-UA" sz="2400" dirty="0">
+                    <a:ea typeface="Calibri" panose="020F0502020204030204" pitchFamily="34" charset="0"/>
+                  </a:rPr>
+                  <a:t>завантаження та аналіз даних, ділення сум для статистики </a:t>
+                </a:r>
+                <a14:m>
+                  <m:oMath xmlns:m="http://schemas.openxmlformats.org/officeDocument/2006/math">
+                    <m:sSub>
+                      <m:sSubPr>
+                        <m:ctrlPr>
+                          <a:rPr lang="en-US" sz="2400" b="0" i="1" smtClean="0">
+                            <a:ea typeface="Calibri" panose="020F0502020204030204" pitchFamily="34" charset="0"/>
+                          </a:rPr>
+                        </m:ctrlPr>
+                      </m:sSubPr>
+                      <m:e>
+                        <m:r>
+                          <a:rPr lang="en-US" sz="2400" b="0" i="1" smtClean="0">
+                            <a:ea typeface="Calibri" panose="020F0502020204030204" pitchFamily="34" charset="0"/>
+                          </a:rPr>
+                          <m:t>𝑇</m:t>
+                        </m:r>
+                      </m:e>
+                      <m:sub>
+                        <m:r>
+                          <a:rPr lang="en-US" sz="2400" b="0" i="1" smtClean="0">
+                            <a:ea typeface="Calibri" panose="020F0502020204030204" pitchFamily="34" charset="0"/>
+                          </a:rPr>
+                          <m:t>𝑛</m:t>
+                        </m:r>
+                      </m:sub>
+                    </m:sSub>
+                  </m:oMath>
+                </a14:m>
+                <a:r>
+                  <a:rPr lang="en-US" sz="2400" dirty="0">
+                    <a:ea typeface="Calibri" panose="020F0502020204030204" pitchFamily="34" charset="0"/>
+                  </a:rPr>
+                  <a:t>, </a:t>
+                </a:r>
+                <a:r>
+                  <a:rPr lang="uk-UA" sz="2400" dirty="0">
+                    <a:ea typeface="Calibri" panose="020F0502020204030204" pitchFamily="34" charset="0"/>
+                  </a:rPr>
+                  <a:t>обчислення оцінки </a:t>
+                </a:r>
+                <a14:m>
+                  <m:oMath xmlns:m="http://schemas.openxmlformats.org/officeDocument/2006/math">
+                    <m:sSubSup>
+                      <m:sSubSupPr>
+                        <m:ctrlPr>
+                          <a:rPr lang="en-US" sz="2400" b="0" i="1" smtClean="0">
+                            <a:ea typeface="Calibri" panose="020F0502020204030204" pitchFamily="34" charset="0"/>
+                          </a:rPr>
+                        </m:ctrlPr>
+                      </m:sSubSupPr>
+                      <m:e>
+                        <m:r>
+                          <a:rPr lang="en-US" sz="2400" b="0" i="1" smtClean="0">
+                            <a:ea typeface="Calibri" panose="020F0502020204030204" pitchFamily="34" charset="0"/>
+                          </a:rPr>
+                          <m:t>𝜎</m:t>
+                        </m:r>
+                      </m:e>
+                      <m:sub>
+                        <m:r>
+                          <a:rPr lang="en-US" sz="2400" b="0" i="1" smtClean="0">
+                            <a:ea typeface="Calibri" panose="020F0502020204030204" pitchFamily="34" charset="0"/>
+                          </a:rPr>
+                          <m:t>𝑛</m:t>
+                        </m:r>
+                        <m:r>
+                          <a:rPr lang="uk-UA" sz="2400" b="0" i="1" smtClean="0">
+                            <a:ea typeface="Calibri" panose="020F0502020204030204" pitchFamily="34" charset="0"/>
+                          </a:rPr>
+                          <m:t>1</m:t>
+                        </m:r>
+                      </m:sub>
+                      <m:sup>
+                        <m:r>
+                          <a:rPr lang="en-US" sz="2400" b="0" i="1" smtClean="0">
+                            <a:ea typeface="Calibri" panose="020F0502020204030204" pitchFamily="34" charset="0"/>
+                          </a:rPr>
+                          <m:t>2</m:t>
+                        </m:r>
+                      </m:sup>
+                    </m:sSubSup>
+                  </m:oMath>
+                </a14:m>
+                <a:r>
+                  <a:rPr lang="en-US" sz="2400" dirty="0">
+                    <a:ea typeface="Calibri" panose="020F0502020204030204" pitchFamily="34" charset="0"/>
+                  </a:rPr>
+                  <a:t> </a:t>
+                </a:r>
+                <a:r>
+                  <a:rPr lang="uk-UA" sz="2400" dirty="0">
+                    <a:ea typeface="Calibri" panose="020F0502020204030204" pitchFamily="34" charset="0"/>
+                  </a:rPr>
+                  <a:t>та статистики </a:t>
+                </a:r>
+                <a14:m>
+                  <m:oMath xmlns:m="http://schemas.openxmlformats.org/officeDocument/2006/math">
+                    <m:sSub>
+                      <m:sSubPr>
+                        <m:ctrlPr>
+                          <a:rPr lang="en-US" sz="2400" b="0" i="1" smtClean="0">
+                            <a:ea typeface="Calibri" panose="020F0502020204030204" pitchFamily="34" charset="0"/>
+                          </a:rPr>
+                        </m:ctrlPr>
+                      </m:sSubPr>
+                      <m:e>
+                        <m:r>
+                          <a:rPr lang="en-US" sz="2400" b="0" i="1" smtClean="0">
+                            <a:ea typeface="Calibri" panose="020F0502020204030204" pitchFamily="34" charset="0"/>
+                          </a:rPr>
+                          <m:t>𝑄</m:t>
+                        </m:r>
+                      </m:e>
+                      <m:sub>
+                        <m:r>
+                          <a:rPr lang="en-US" sz="2400" b="0" i="1" smtClean="0">
+                            <a:ea typeface="Calibri" panose="020F0502020204030204" pitchFamily="34" charset="0"/>
+                          </a:rPr>
+                          <m:t>𝑛</m:t>
+                        </m:r>
+                      </m:sub>
+                    </m:sSub>
+                    <m:r>
+                      <a:rPr lang="uk-UA" sz="2400" b="0" i="0" smtClean="0">
+                        <a:ea typeface="Calibri" panose="020F0502020204030204" pitchFamily="34" charset="0"/>
+                      </a:rPr>
+                      <m:t>, </m:t>
+                    </m:r>
+                  </m:oMath>
+                </a14:m>
+                <a:r>
+                  <a:rPr lang="uk-UA" sz="2400" dirty="0">
+                    <a:ea typeface="Calibri" panose="020F0502020204030204" pitchFamily="34" charset="0"/>
+                  </a:rPr>
+                  <a:t>обчислення </a:t>
+                </a:r>
+                <a:r>
+                  <a:rPr lang="en-US" sz="2400" dirty="0" err="1"/>
+                  <a:t>qnorm</a:t>
+                </a:r>
+                <a:r>
+                  <a:rPr lang="uk-UA" sz="2400" dirty="0"/>
+                  <a:t>(1-</a:t>
+                </a:r>
+                <a:r>
+                  <a:rPr lang="en-US" sz="2400" dirty="0"/>
+                  <a:t>sign</a:t>
+                </a:r>
+                <a:r>
+                  <a:rPr lang="uk-UA" sz="2400" dirty="0"/>
+                  <a:t>_</a:t>
+                </a:r>
+                <a:r>
+                  <a:rPr lang="en-US" sz="2400" dirty="0"/>
+                  <a:t>level</a:t>
+                </a:r>
+                <a:r>
+                  <a:rPr lang="uk-UA" sz="2400" dirty="0"/>
+                  <a:t>/2).</a:t>
+                </a:r>
+                <a:endParaRPr lang="uk-UA" sz="2400" dirty="0">
+                  <a:ea typeface="Calibri" panose="020F0502020204030204" pitchFamily="34" charset="0"/>
+                </a:endParaRPr>
+              </a:p>
+              <a:p>
+                <a:r>
+                  <a:rPr lang="en-US" sz="2400" dirty="0"/>
+                  <a:t>sum</a:t>
+                </a:r>
+                <a:r>
+                  <a:rPr lang="uk-UA" sz="2400" dirty="0"/>
+                  <a:t>_</a:t>
+                </a:r>
+                <a:r>
+                  <a:rPr lang="en-US" sz="2400" dirty="0"/>
+                  <a:t>for</a:t>
+                </a:r>
+                <a:r>
+                  <a:rPr lang="uk-UA" sz="2400" dirty="0"/>
+                  <a:t>_</a:t>
+                </a:r>
+                <a:r>
+                  <a:rPr lang="en-US" sz="2400" dirty="0"/>
+                  <a:t>T</a:t>
+                </a:r>
+                <a:r>
+                  <a:rPr lang="uk-UA" sz="2400" dirty="0"/>
+                  <a:t>_</a:t>
+                </a:r>
+                <a:r>
+                  <a:rPr lang="en-US" sz="2400" dirty="0"/>
+                  <a:t>stat </a:t>
+                </a:r>
+                <a:r>
+                  <a:rPr lang="uk-UA" sz="2400" dirty="0"/>
+                  <a:t>– обчислення сум для статистики </a:t>
+                </a:r>
+                <a14:m>
+                  <m:oMath xmlns:m="http://schemas.openxmlformats.org/officeDocument/2006/math">
+                    <m:sSub>
+                      <m:sSubPr>
+                        <m:ctrlPr>
+                          <a:rPr lang="en-US" sz="2400" i="1">
+                            <a:ea typeface="Calibri" panose="020F0502020204030204" pitchFamily="34" charset="0"/>
+                          </a:rPr>
+                        </m:ctrlPr>
+                      </m:sSubPr>
+                      <m:e>
+                        <m:r>
+                          <a:rPr lang="en-US" sz="2400" i="1">
+                            <a:ea typeface="Calibri" panose="020F0502020204030204" pitchFamily="34" charset="0"/>
+                          </a:rPr>
+                          <m:t>𝑇</m:t>
+                        </m:r>
+                      </m:e>
+                      <m:sub>
+                        <m:r>
+                          <a:rPr lang="en-US" sz="2400" i="1">
+                            <a:ea typeface="Calibri" panose="020F0502020204030204" pitchFamily="34" charset="0"/>
+                          </a:rPr>
+                          <m:t>𝑛</m:t>
+                        </m:r>
+                      </m:sub>
+                    </m:sSub>
+                  </m:oMath>
+                </a14:m>
+                <a:r>
+                  <a:rPr lang="uk-UA" sz="2400" dirty="0"/>
+                  <a:t> для векторів </a:t>
+                </a:r>
+                <a:r>
+                  <a:rPr lang="en-US" sz="2400" dirty="0"/>
+                  <a:t>X1, X2</a:t>
+                </a:r>
+                <a:r>
+                  <a:rPr lang="uk-UA" sz="2400" dirty="0"/>
+                  <a:t> та для їх комбінації.</a:t>
+                </a:r>
+              </a:p>
+              <a:p>
+                <a:r>
+                  <a:rPr lang="en-US" sz="2400" dirty="0"/>
+                  <a:t>trace</a:t>
+                </a:r>
+                <a:r>
+                  <a:rPr lang="uk-UA" sz="2400" dirty="0"/>
+                  <a:t>_</a:t>
+                </a:r>
+                <a:r>
+                  <a:rPr lang="en-US" sz="2400" dirty="0"/>
+                  <a:t>for</a:t>
+                </a:r>
+                <a:r>
+                  <a:rPr lang="uk-UA" sz="2400" dirty="0"/>
+                  <a:t>_</a:t>
+                </a:r>
+                <a:r>
+                  <a:rPr lang="en-US" sz="2400" dirty="0"/>
+                  <a:t>Q</a:t>
+                </a:r>
+                <a:r>
+                  <a:rPr lang="uk-UA" sz="2400" dirty="0"/>
+                  <a:t>_</a:t>
+                </a:r>
+                <a:r>
+                  <a:rPr lang="en-US" sz="2400" dirty="0"/>
+                  <a:t>stat </a:t>
+                </a:r>
+                <a:r>
+                  <a:rPr lang="uk-UA" sz="2400" dirty="0"/>
+                  <a:t>--</a:t>
+                </a:r>
+                <a:r>
+                  <a:rPr lang="en-US" sz="2400" dirty="0"/>
+                  <a:t> </a:t>
+                </a:r>
+                <a:r>
+                  <a:rPr lang="uk-UA" sz="2400" dirty="0"/>
+                  <a:t>обчислення оцінки сліду матриці для статистики </a:t>
+                </a:r>
+                <a14:m>
+                  <m:oMath xmlns:m="http://schemas.openxmlformats.org/officeDocument/2006/math">
+                    <m:sSub>
+                      <m:sSubPr>
+                        <m:ctrlPr>
+                          <a:rPr lang="en-US" sz="2400" i="1">
+                            <a:ea typeface="Calibri" panose="020F0502020204030204" pitchFamily="34" charset="0"/>
+                          </a:rPr>
+                        </m:ctrlPr>
+                      </m:sSubPr>
+                      <m:e>
+                        <m:r>
+                          <a:rPr lang="en-US" sz="2400" b="0" i="1" smtClean="0">
+                            <a:ea typeface="Calibri" panose="020F0502020204030204" pitchFamily="34" charset="0"/>
+                          </a:rPr>
+                          <m:t>𝑄</m:t>
+                        </m:r>
+                      </m:e>
+                      <m:sub>
+                        <m:r>
+                          <a:rPr lang="en-US" sz="2400" i="1">
+                            <a:ea typeface="Calibri" panose="020F0502020204030204" pitchFamily="34" charset="0"/>
+                          </a:rPr>
+                          <m:t>𝑛</m:t>
+                        </m:r>
+                      </m:sub>
+                    </m:sSub>
+                  </m:oMath>
+                </a14:m>
+                <a:r>
+                  <a:rPr lang="uk-UA" sz="2400" dirty="0"/>
+                  <a:t> для векторів </a:t>
+                </a:r>
+                <a:r>
+                  <a:rPr lang="en-US" sz="2400" dirty="0"/>
+                  <a:t>X1, X2</a:t>
+                </a:r>
+                <a:r>
+                  <a:rPr lang="uk-UA" sz="2400" dirty="0"/>
+                  <a:t> та для їх комбінації.</a:t>
+                </a:r>
+                <a:endParaRPr lang="en-US" sz="2400" dirty="0"/>
+              </a:p>
+              <a:p>
+                <a:pPr marL="0" indent="0">
+                  <a:buNone/>
+                </a:pPr>
+                <a:r>
+                  <a:rPr lang="uk-UA" sz="2400" dirty="0">
+                    <a:ea typeface="Calibri" panose="020F0502020204030204" pitchFamily="34" charset="0"/>
+                  </a:rPr>
+                  <a:t>У результаті обчислення було отримано значення </a:t>
+                </a:r>
+                <a14:m>
+                  <m:oMath xmlns:m="http://schemas.openxmlformats.org/officeDocument/2006/math">
+                    <m:sSub>
+                      <m:sSubPr>
+                        <m:ctrlPr>
+                          <a:rPr lang="uk-UA" sz="2400" i="1">
+                            <a:ea typeface="Calibri" panose="020F0502020204030204" pitchFamily="34" charset="0"/>
+                          </a:rPr>
+                        </m:ctrlPr>
+                      </m:sSubPr>
+                      <m:e>
+                        <m:r>
+                          <a:rPr lang="uk-UA" sz="2400" i="1">
+                            <a:ea typeface="Calibri" panose="020F0502020204030204" pitchFamily="34" charset="0"/>
+                          </a:rPr>
+                          <m:t>𝑄</m:t>
+                        </m:r>
+                      </m:e>
+                      <m:sub>
+                        <m:r>
+                          <a:rPr lang="uk-UA" sz="2400" i="1">
+                            <a:ea typeface="Calibri" panose="020F0502020204030204" pitchFamily="34" charset="0"/>
+                          </a:rPr>
+                          <m:t>𝑛</m:t>
+                        </m:r>
+                      </m:sub>
+                    </m:sSub>
+                  </m:oMath>
+                </a14:m>
+                <a:r>
+                  <a:rPr lang="uk-UA" sz="2400" dirty="0">
+                    <a:ea typeface="Calibri" panose="020F0502020204030204" pitchFamily="34" charset="0"/>
+                  </a:rPr>
+                  <a:t> – 0.458, тоді як значення </a:t>
+                </a:r>
+                <a14:m>
+                  <m:oMath xmlns:m="http://schemas.openxmlformats.org/officeDocument/2006/math">
+                    <m:sSub>
+                      <m:sSubPr>
+                        <m:ctrlPr>
+                          <a:rPr lang="uk-UA" sz="2400" i="1">
+                            <a:ea typeface="Calibri" panose="020F0502020204030204" pitchFamily="34" charset="0"/>
+                          </a:rPr>
+                        </m:ctrlPr>
+                      </m:sSubPr>
+                      <m:e>
+                        <m:r>
+                          <m:rPr>
+                            <m:sty m:val="p"/>
+                          </m:rPr>
+                          <a:rPr lang="uk-UA" sz="2400">
+                            <a:ea typeface="Calibri" panose="020F0502020204030204" pitchFamily="34" charset="0"/>
+                          </a:rPr>
+                          <m:t>ξ</m:t>
+                        </m:r>
+                      </m:e>
+                      <m:sub>
+                        <m:r>
+                          <m:rPr>
+                            <m:sty m:val="p"/>
+                          </m:rPr>
+                          <a:rPr lang="en-US" sz="2400">
+                            <a:ea typeface="Calibri" panose="020F0502020204030204" pitchFamily="34" charset="0"/>
+                          </a:rPr>
+                          <m:t>α</m:t>
+                        </m:r>
+                      </m:sub>
+                    </m:sSub>
+                  </m:oMath>
+                </a14:m>
+                <a:r>
+                  <a:rPr lang="uk-UA" sz="2400" dirty="0">
+                    <a:ea typeface="Calibri" panose="020F0502020204030204" pitchFamily="34" charset="0"/>
+                  </a:rPr>
+                  <a:t> – 1.959, що не дозволяє відкидати гіпотезу </a:t>
+                </a:r>
+                <a14:m>
+                  <m:oMath xmlns:m="http://schemas.openxmlformats.org/officeDocument/2006/math">
+                    <m:sSub>
+                      <m:sSubPr>
+                        <m:ctrlPr>
+                          <a:rPr lang="uk-UA" sz="2400" i="1">
+                            <a:ea typeface="Calibri" panose="020F0502020204030204" pitchFamily="34" charset="0"/>
+                          </a:rPr>
+                        </m:ctrlPr>
+                      </m:sSubPr>
+                      <m:e>
+                        <m:r>
+                          <a:rPr lang="uk-UA" sz="2400" i="1">
+                            <a:ea typeface="Calibri" panose="020F0502020204030204" pitchFamily="34" charset="0"/>
+                          </a:rPr>
+                          <m:t>𝐻</m:t>
+                        </m:r>
+                      </m:e>
+                      <m:sub>
+                        <m:r>
+                          <a:rPr lang="uk-UA" sz="2400" i="1">
+                            <a:ea typeface="Calibri" panose="020F0502020204030204" pitchFamily="34" charset="0"/>
+                          </a:rPr>
+                          <m:t>0</m:t>
+                        </m:r>
+                      </m:sub>
+                    </m:sSub>
+                  </m:oMath>
+                </a14:m>
+                <a:r>
+                  <a:rPr lang="uk-UA" sz="2400" dirty="0">
+                    <a:ea typeface="Calibri" panose="020F0502020204030204" pitchFamily="34" charset="0"/>
+                  </a:rPr>
+                  <a:t> про рівність середніх.</a:t>
+                </a:r>
+                <a:endParaRPr lang="uk-UA" sz="2400" dirty="0"/>
+              </a:p>
+              <a:p>
+                <a:pPr marL="0" indent="0">
+                  <a:buNone/>
+                </a:pPr>
+                <a:endParaRPr lang="uk-UA" sz="2400" dirty="0"/>
+              </a:p>
+            </p:txBody>
+          </p:sp>
+        </mc:Choice>
+        <mc:Fallback>
+          <p:sp>
+            <p:nvSpPr>
+              <p:cNvPr id="3" name="Місце для вмісту 2">
+                <a:extLst>
+                  <a:ext uri="{FF2B5EF4-FFF2-40B4-BE49-F238E27FC236}">
+                    <a16:creationId xmlns:a16="http://schemas.microsoft.com/office/drawing/2014/main" id="{852CEBC4-E91A-499B-8CAD-B2ACF41C93DC}"/>
+                  </a:ext>
+                </a:extLst>
+              </p:cNvPr>
+              <p:cNvSpPr>
+                <a:spLocks noGrp="1" noRot="1" noChangeAspect="1" noMove="1" noResize="1" noEditPoints="1" noAdjustHandles="1" noChangeArrowheads="1" noChangeShapeType="1" noTextEdit="1"/>
+              </p:cNvSpPr>
+              <p:nvPr>
+                <p:ph idx="1"/>
+              </p:nvPr>
+            </p:nvSpPr>
+            <p:spPr>
+              <a:xfrm>
+                <a:off x="581192" y="2774054"/>
+                <a:ext cx="11029615" cy="3678303"/>
+              </a:xfrm>
+              <a:blipFill>
+                <a:blip r:embed="rId2"/>
+                <a:stretch>
+                  <a:fillRect l="-829" t="-19735" b="-8458"/>
+                </a:stretch>
+              </a:blipFill>
+            </p:spPr>
+            <p:txBody>
+              <a:bodyPr/>
+              <a:lstStyle/>
+              <a:p>
+                <a:r>
+                  <a:rPr lang="uk-UA">
+                    <a:noFill/>
+                  </a:rPr>
+                  <a:t> </a:t>
+                </a:r>
+              </a:p>
+            </p:txBody>
+          </p:sp>
+        </mc:Fallback>
+      </mc:AlternateContent>
       <p:sp>
         <p:nvSpPr>
           <p:cNvPr id="5" name="Прямокутник 4">
@@ -10616,270 +11239,6 @@
           <p:cNvPr id="2" name="Заголовок 1">
             <a:extLst>
               <a:ext uri="{FF2B5EF4-FFF2-40B4-BE49-F238E27FC236}">
-                <a16:creationId xmlns:a16="http://schemas.microsoft.com/office/drawing/2014/main" id="{E2D25D2A-5B72-4591-9EB5-3C50E0A7DAAB}"/>
-              </a:ext>
-            </a:extLst>
-          </p:cNvPr>
-          <p:cNvSpPr>
-            <a:spLocks noGrp="1"/>
-          </p:cNvSpPr>
-          <p:nvPr>
-            <p:ph type="title"/>
-          </p:nvPr>
-        </p:nvSpPr>
-        <p:spPr/>
-        <p:txBody>
-          <a:bodyPr/>
-          <a:lstStyle/>
-          <a:p>
-            <a:r>
-              <a:rPr lang="uk-UA" dirty="0"/>
-              <a:t>РЕЗУЛЬТАТИ</a:t>
-            </a:r>
-          </a:p>
-        </p:txBody>
-      </p:sp>
-      <mc:AlternateContent xmlns:mc="http://schemas.openxmlformats.org/markup-compatibility/2006">
-        <mc:Choice xmlns:a14="http://schemas.microsoft.com/office/drawing/2010/main" Requires="a14">
-          <p:sp>
-            <p:nvSpPr>
-              <p:cNvPr id="3" name="Місце для вмісту 2">
-                <a:extLst>
-                  <a:ext uri="{FF2B5EF4-FFF2-40B4-BE49-F238E27FC236}">
-                    <a16:creationId xmlns:a16="http://schemas.microsoft.com/office/drawing/2014/main" id="{F6E2FE2D-7695-405C-98AC-5BA74AAEBE28}"/>
-                  </a:ext>
-                </a:extLst>
-              </p:cNvPr>
-              <p:cNvSpPr>
-                <a:spLocks noGrp="1"/>
-              </p:cNvSpPr>
-              <p:nvPr>
-                <p:ph idx="1"/>
-              </p:nvPr>
-            </p:nvSpPr>
-            <p:spPr/>
-            <p:txBody>
-              <a:bodyPr/>
-              <a:lstStyle/>
-              <a:p>
-                <a:pPr marL="0" indent="0">
-                  <a:buNone/>
-                </a:pPr>
-                <a:r>
-                  <a:rPr lang="uk-UA" dirty="0">
-                    <a:latin typeface="Times New Roman" panose="02020603050405020304" pitchFamily="18" charset="0"/>
-                    <a:ea typeface="Calibri" panose="020F0502020204030204" pitchFamily="34" charset="0"/>
-                  </a:rPr>
-                  <a:t>У результаті обчислення було отримано значення </a:t>
-                </a:r>
-                <a14:m>
-                  <m:oMath xmlns:m="http://schemas.openxmlformats.org/officeDocument/2006/math">
-                    <m:sSub>
-                      <m:sSubPr>
-                        <m:ctrlPr>
-                          <a:rPr lang="uk-UA" i="1">
-                            <a:latin typeface="Cambria Math" panose="02040503050406030204" pitchFamily="18" charset="0"/>
-                            <a:ea typeface="Calibri" panose="020F0502020204030204" pitchFamily="34" charset="0"/>
-                          </a:rPr>
-                        </m:ctrlPr>
-                      </m:sSubPr>
-                      <m:e>
-                        <m:r>
-                          <a:rPr lang="uk-UA" i="1">
-                            <a:latin typeface="Cambria Math" panose="02040503050406030204" pitchFamily="18" charset="0"/>
-                            <a:ea typeface="Calibri" panose="020F0502020204030204" pitchFamily="34" charset="0"/>
-                          </a:rPr>
-                          <m:t>𝑄</m:t>
-                        </m:r>
-                      </m:e>
-                      <m:sub>
-                        <m:r>
-                          <a:rPr lang="uk-UA" i="1">
-                            <a:latin typeface="Cambria Math" panose="02040503050406030204" pitchFamily="18" charset="0"/>
-                            <a:ea typeface="Calibri" panose="020F0502020204030204" pitchFamily="34" charset="0"/>
-                          </a:rPr>
-                          <m:t>𝑛</m:t>
-                        </m:r>
-                      </m:sub>
-                    </m:sSub>
-                  </m:oMath>
-                </a14:m>
-                <a:r>
-                  <a:rPr lang="uk-UA" dirty="0">
-                    <a:latin typeface="Times New Roman" panose="02020603050405020304" pitchFamily="18" charset="0"/>
-                    <a:ea typeface="Calibri" panose="020F0502020204030204" pitchFamily="34" charset="0"/>
-                  </a:rPr>
-                  <a:t> – 0.4584315, тоді як значення </a:t>
-                </a:r>
-                <a14:m>
-                  <m:oMath xmlns:m="http://schemas.openxmlformats.org/officeDocument/2006/math">
-                    <m:sSub>
-                      <m:sSubPr>
-                        <m:ctrlPr>
-                          <a:rPr lang="uk-UA" i="1">
-                            <a:latin typeface="Cambria Math" panose="02040503050406030204" pitchFamily="18" charset="0"/>
-                            <a:ea typeface="Calibri" panose="020F0502020204030204" pitchFamily="34" charset="0"/>
-                          </a:rPr>
-                        </m:ctrlPr>
-                      </m:sSubPr>
-                      <m:e>
-                        <m:r>
-                          <m:rPr>
-                            <m:sty m:val="p"/>
-                          </m:rPr>
-                          <a:rPr lang="uk-UA">
-                            <a:latin typeface="Cambria Math" panose="02040503050406030204" pitchFamily="18" charset="0"/>
-                            <a:ea typeface="Calibri" panose="020F0502020204030204" pitchFamily="34" charset="0"/>
-                          </a:rPr>
-                          <m:t>ξ</m:t>
-                        </m:r>
-                      </m:e>
-                      <m:sub>
-                        <m:r>
-                          <m:rPr>
-                            <m:sty m:val="p"/>
-                          </m:rPr>
-                          <a:rPr lang="en-US">
-                            <a:latin typeface="Cambria Math" panose="02040503050406030204" pitchFamily="18" charset="0"/>
-                            <a:ea typeface="Calibri" panose="020F0502020204030204" pitchFamily="34" charset="0"/>
-                          </a:rPr>
-                          <m:t>α</m:t>
-                        </m:r>
-                      </m:sub>
-                    </m:sSub>
-                  </m:oMath>
-                </a14:m>
-                <a:r>
-                  <a:rPr lang="uk-UA" dirty="0">
-                    <a:latin typeface="Times New Roman" panose="02020603050405020304" pitchFamily="18" charset="0"/>
-                    <a:ea typeface="Calibri" panose="020F0502020204030204" pitchFamily="34" charset="0"/>
-                  </a:rPr>
-                  <a:t> – 1.959964, що не дозволяє відкидати гіпотезу </a:t>
-                </a:r>
-                <a14:m>
-                  <m:oMath xmlns:m="http://schemas.openxmlformats.org/officeDocument/2006/math">
-                    <m:sSub>
-                      <m:sSubPr>
-                        <m:ctrlPr>
-                          <a:rPr lang="uk-UA" i="1">
-                            <a:latin typeface="Cambria Math" panose="02040503050406030204" pitchFamily="18" charset="0"/>
-                            <a:ea typeface="Calibri" panose="020F0502020204030204" pitchFamily="34" charset="0"/>
-                          </a:rPr>
-                        </m:ctrlPr>
-                      </m:sSubPr>
-                      <m:e>
-                        <m:r>
-                          <a:rPr lang="uk-UA" i="1">
-                            <a:latin typeface="Cambria Math" panose="02040503050406030204" pitchFamily="18" charset="0"/>
-                            <a:ea typeface="Calibri" panose="020F0502020204030204" pitchFamily="34" charset="0"/>
-                          </a:rPr>
-                          <m:t>𝐻</m:t>
-                        </m:r>
-                      </m:e>
-                      <m:sub>
-                        <m:r>
-                          <a:rPr lang="uk-UA" i="1">
-                            <a:latin typeface="Cambria Math" panose="02040503050406030204" pitchFamily="18" charset="0"/>
-                            <a:ea typeface="Calibri" panose="020F0502020204030204" pitchFamily="34" charset="0"/>
-                          </a:rPr>
-                          <m:t>0</m:t>
-                        </m:r>
-                      </m:sub>
-                    </m:sSub>
-                  </m:oMath>
-                </a14:m>
-                <a:r>
-                  <a:rPr lang="uk-UA" dirty="0">
-                    <a:latin typeface="Times New Roman" panose="02020603050405020304" pitchFamily="18" charset="0"/>
-                    <a:ea typeface="Calibri" panose="020F0502020204030204" pitchFamily="34" charset="0"/>
-                  </a:rPr>
-                  <a:t> про рівність середніх.</a:t>
-                </a:r>
-              </a:p>
-              <a:p>
-                <a:pPr marL="0" indent="0">
-                  <a:buNone/>
-                </a:pPr>
-                <a:endParaRPr lang="uk-UA" dirty="0"/>
-              </a:p>
-            </p:txBody>
-          </p:sp>
-        </mc:Choice>
-        <mc:Fallback>
-          <p:sp>
-            <p:nvSpPr>
-              <p:cNvPr id="3" name="Місце для вмісту 2">
-                <a:extLst>
-                  <a:ext uri="{FF2B5EF4-FFF2-40B4-BE49-F238E27FC236}">
-                    <a16:creationId xmlns:a16="http://schemas.microsoft.com/office/drawing/2014/main" id="{F6E2FE2D-7695-405C-98AC-5BA74AAEBE28}"/>
-                  </a:ext>
-                </a:extLst>
-              </p:cNvPr>
-              <p:cNvSpPr>
-                <a:spLocks noGrp="1" noRot="1" noChangeAspect="1" noMove="1" noResize="1" noEditPoints="1" noAdjustHandles="1" noChangeArrowheads="1" noChangeShapeType="1" noTextEdit="1"/>
-              </p:cNvSpPr>
-              <p:nvPr>
-                <p:ph idx="1"/>
-              </p:nvPr>
-            </p:nvSpPr>
-            <p:spPr>
-              <a:blipFill>
-                <a:blip r:embed="rId2"/>
-                <a:stretch>
-                  <a:fillRect l="-442"/>
-                </a:stretch>
-              </a:blipFill>
-            </p:spPr>
-            <p:txBody>
-              <a:bodyPr/>
-              <a:lstStyle/>
-              <a:p>
-                <a:r>
-                  <a:rPr lang="uk-UA">
-                    <a:noFill/>
-                  </a:rPr>
-                  <a:t> </a:t>
-                </a:r>
-              </a:p>
-            </p:txBody>
-          </p:sp>
-        </mc:Fallback>
-      </mc:AlternateContent>
-    </p:spTree>
-    <p:extLst>
-      <p:ext uri="{BB962C8B-B14F-4D97-AF65-F5344CB8AC3E}">
-        <p14:creationId xmlns:p14="http://schemas.microsoft.com/office/powerpoint/2010/main" val="3953708723"/>
-      </p:ext>
-    </p:extLst>
-  </p:cSld>
-  <p:clrMapOvr>
-    <a:masterClrMapping/>
-  </p:clrMapOvr>
-</p:sld>
-</file>
-
-<file path=ppt/slides/slide8.xml><?xml version="1.0" encoding="utf-8"?>
-<p:sld xmlns:a="http://schemas.openxmlformats.org/drawingml/2006/main" xmlns:r="http://schemas.openxmlformats.org/officeDocument/2006/relationships" xmlns:p="http://schemas.openxmlformats.org/presentationml/2006/main">
-  <p:cSld>
-    <p:spTree>
-      <p:nvGrpSpPr>
-        <p:cNvPr id="1" name=""/>
-        <p:cNvGrpSpPr/>
-        <p:nvPr/>
-      </p:nvGrpSpPr>
-      <p:grpSpPr>
-        <a:xfrm>
-          <a:off x="0" y="0"/>
-          <a:ext cx="0" cy="0"/>
-          <a:chOff x="0" y="0"/>
-          <a:chExt cx="0" cy="0"/>
-        </a:xfrm>
-      </p:grpSpPr>
-      <p:sp>
-        <p:nvSpPr>
-          <p:cNvPr id="2" name="Заголовок 1">
-            <a:extLst>
-              <a:ext uri="{FF2B5EF4-FFF2-40B4-BE49-F238E27FC236}">
                 <a16:creationId xmlns:a16="http://schemas.microsoft.com/office/drawing/2014/main" id="{6CB17B6A-C186-407B-ADD6-954DA3808E31}"/>
               </a:ext>
             </a:extLst>
@@ -10924,7 +11283,10 @@
           <a:bodyPr/>
           <a:lstStyle/>
           <a:p>
-            <a:endParaRPr lang="uk-UA"/>
+            <a:pPr marL="0" indent="0">
+              <a:buNone/>
+            </a:pPr>
+            <a:endParaRPr lang="uk-UA" dirty="0"/>
           </a:p>
         </p:txBody>
       </p:sp>
@@ -10941,7 +11303,7 @@
 </p:sld>
 </file>
 
-<file path=ppt/slides/slide9.xml><?xml version="1.0" encoding="utf-8"?>
+<file path=ppt/slides/slide8.xml><?xml version="1.0" encoding="utf-8"?>
 <p:sld xmlns:a="http://schemas.openxmlformats.org/drawingml/2006/main" xmlns:r="http://schemas.openxmlformats.org/officeDocument/2006/relationships" xmlns:p="http://schemas.openxmlformats.org/presentationml/2006/main">
   <p:cSld>
     <p:bg>
@@ -12253,23 +12615,6 @@
 </file>
 
 <file path=customXml/item1.xml><?xml version="1.0" encoding="utf-8"?>
-<?mso-contentType ?>
-<FormTemplates xmlns="http://schemas.microsoft.com/sharepoint/v3/contenttype/forms">
-  <Display>DocumentLibraryForm</Display>
-  <Edit>DocumentLibraryForm</Edit>
-  <New>DocumentLibraryForm</New>
-</FormTemplates>
-</file>
-
-<file path=customXml/item2.xml><?xml version="1.0" encoding="utf-8"?>
-<p:properties xmlns:p="http://schemas.microsoft.com/office/2006/metadata/properties" xmlns:xsi="http://www.w3.org/2001/XMLSchema-instance" xmlns:pc="http://schemas.microsoft.com/office/infopath/2007/PartnerControls">
-  <documentManagement>
-    <MediaServiceKeyPoints xmlns="71af3243-3dd4-4a8d-8c0d-dd76da1f02a5" xsi:nil="true"/>
-  </documentManagement>
-</p:properties>
-</file>
-
-<file path=customXml/item3.xml><?xml version="1.0" encoding="utf-8"?>
 <ct:contentTypeSchema xmlns:ct="http://schemas.microsoft.com/office/2006/metadata/contentType" xmlns:ma="http://schemas.microsoft.com/office/2006/metadata/properties/metaAttributes" ct:_="" ma:_="" ma:contentTypeName="Document" ma:contentTypeID="0x01010079F111ED35F8CC479449609E8A0923A6" ma:contentTypeVersion="11" ma:contentTypeDescription="Create a new document." ma:contentTypeScope="" ma:versionID="1c2eb7a32e66fb6e4260f3771546a5e2">
   <xsd:schema xmlns:xsd="http://www.w3.org/2001/XMLSchema" xmlns:xs="http://www.w3.org/2001/XMLSchema" xmlns:p="http://schemas.microsoft.com/office/2006/metadata/properties" xmlns:ns2="71af3243-3dd4-4a8d-8c0d-dd76da1f02a5" xmlns:ns3="16c05727-aa75-4e4a-9b5f-8a80a1165891" targetNamespace="http://schemas.microsoft.com/office/2006/metadata/properties" ma:root="true" ma:fieldsID="04e1f6479c48b08974ba73b5ca973489" ns2:_="" ns3:_="">
     <xsd:import namespace="71af3243-3dd4-4a8d-8c0d-dd76da1f02a5"/>
@@ -12480,25 +12825,24 @@
 </ct:contentTypeSchema>
 </file>
 
-<file path=customXml/itemProps1.xml><?xml version="1.0" encoding="utf-8"?>
-<ds:datastoreItem xmlns:ds="http://schemas.openxmlformats.org/officeDocument/2006/customXml" ds:itemID="{BA0CF3B2-1F0F-4FC5-8002-3E4869ABAD55}">
-  <ds:schemaRefs>
-    <ds:schemaRef ds:uri="http://schemas.microsoft.com/sharepoint/v3/contenttype/forms"/>
-  </ds:schemaRefs>
-</ds:datastoreItem>
+<file path=customXml/item2.xml><?xml version="1.0" encoding="utf-8"?>
+<p:properties xmlns:p="http://schemas.microsoft.com/office/2006/metadata/properties" xmlns:xsi="http://www.w3.org/2001/XMLSchema-instance" xmlns:pc="http://schemas.microsoft.com/office/infopath/2007/PartnerControls">
+  <documentManagement>
+    <MediaServiceKeyPoints xmlns="71af3243-3dd4-4a8d-8c0d-dd76da1f02a5" xsi:nil="true"/>
+  </documentManagement>
+</p:properties>
 </file>
 
-<file path=customXml/itemProps2.xml><?xml version="1.0" encoding="utf-8"?>
-<ds:datastoreItem xmlns:ds="http://schemas.openxmlformats.org/officeDocument/2006/customXml" ds:itemID="{1EBC12AA-1C15-4500-BC9C-8EE83A441DE9}">
-  <ds:schemaRefs>
-    <ds:schemaRef ds:uri="http://schemas.microsoft.com/office/2006/metadata/properties"/>
-    <ds:schemaRef ds:uri="http://schemas.microsoft.com/office/infopath/2007/PartnerControls"/>
-    <ds:schemaRef ds:uri="71af3243-3dd4-4a8d-8c0d-dd76da1f02a5"/>
-  </ds:schemaRefs>
-</ds:datastoreItem>
+<file path=customXml/item3.xml><?xml version="1.0" encoding="utf-8"?>
+<?mso-contentType ?>
+<FormTemplates xmlns="http://schemas.microsoft.com/sharepoint/v3/contenttype/forms">
+  <Display>DocumentLibraryForm</Display>
+  <Edit>DocumentLibraryForm</Edit>
+  <New>DocumentLibraryForm</New>
+</FormTemplates>
 </file>
 
-<file path=customXml/itemProps3.xml><?xml version="1.0" encoding="utf-8"?>
+<file path=customXml/itemProps1.xml><?xml version="1.0" encoding="utf-8"?>
 <ds:datastoreItem xmlns:ds="http://schemas.openxmlformats.org/officeDocument/2006/customXml" ds:itemID="{1F69AFF4-BB30-4BA0-AD22-82CC3C43276B}">
   <ds:schemaRefs>
     <ds:schemaRef ds:uri="http://schemas.microsoft.com/office/2006/metadata/contentType"/>
@@ -12515,4 +12859,22 @@
     <ds:schemaRef ds:uri="http://schemas.microsoft.com/internal/obd"/>
   </ds:schemaRefs>
 </ds:datastoreItem>
+</file>
+
+<file path=customXml/itemProps2.xml><?xml version="1.0" encoding="utf-8"?>
+<ds:datastoreItem xmlns:ds="http://schemas.openxmlformats.org/officeDocument/2006/customXml" ds:itemID="{1EBC12AA-1C15-4500-BC9C-8EE83A441DE9}">
+  <ds:schemaRefs>
+    <ds:schemaRef ds:uri="http://schemas.microsoft.com/office/2006/metadata/properties"/>
+    <ds:schemaRef ds:uri="http://schemas.microsoft.com/office/infopath/2007/PartnerControls"/>
+    <ds:schemaRef ds:uri="71af3243-3dd4-4a8d-8c0d-dd76da1f02a5"/>
+  </ds:schemaRefs>
+</ds:datastoreItem>
+</file>
+
+<file path=customXml/itemProps3.xml><?xml version="1.0" encoding="utf-8"?>
+<ds:datastoreItem xmlns:ds="http://schemas.openxmlformats.org/officeDocument/2006/customXml" ds:itemID="{BA0CF3B2-1F0F-4FC5-8002-3E4869ABAD55}">
+  <ds:schemaRefs>
+    <ds:schemaRef ds:uri="http://schemas.microsoft.com/sharepoint/v3/contenttype/forms"/>
+  </ds:schemaRefs>
+</ds:datastoreItem>
 </file>
</xml_diff>

<commit_message>
Changed contents, added slide number to the pres
</commit_message>
<xml_diff>
--- a/Презентація.pptx
+++ b/Презентація.pptx
@@ -1,6 +1,6 @@
 
 <file path=ppt/presentation.xml><?xml version="1.0" encoding="utf-8"?>
-<p:presentation xmlns:a="http://schemas.openxmlformats.org/drawingml/2006/main" xmlns:r="http://schemas.openxmlformats.org/officeDocument/2006/relationships" xmlns:p="http://schemas.openxmlformats.org/presentationml/2006/main" removePersonalInfoOnSave="1" autoCompressPictures="0">
+<p:presentation xmlns:a="http://schemas.openxmlformats.org/drawingml/2006/main" xmlns:r="http://schemas.openxmlformats.org/officeDocument/2006/relationships" xmlns:p="http://schemas.openxmlformats.org/presentationml/2006/main" showSpecialPlsOnTitleSld="0" removePersonalInfoOnSave="1" autoCompressPictures="0">
   <p:sldMasterIdLst>
     <p:sldMasterId id="2147483672" r:id="rId4"/>
   </p:sldMasterIdLst>
@@ -1089,9 +1089,9 @@
           </a:lstStyle>
           <a:p>
             <a:pPr rtl="0"/>
-            <a:fld id="{DAC99A6E-032B-4CB6-8CD9-55CA8F04A702}" type="datetime1">
+            <a:fld id="{B1918F5D-9E68-4B6C-B0DC-E05F222FD61D}" type="datetime1">
               <a:rPr lang="uk-UA" smtClean="0"/>
-              <a:t>05.06.2024</a:t>
+              <a:t>08.06.2024</a:t>
             </a:fld>
             <a:endParaRPr lang="uk-UA" dirty="0"/>
           </a:p>
@@ -1363,9 +1363,9 @@
           <a:lstStyle/>
           <a:p>
             <a:pPr rtl="0"/>
-            <a:fld id="{4F2ECFDB-0BF4-48F3-8DB1-8C195F7AB40E}" type="datetime1">
+            <a:fld id="{1EA87EAA-6CEA-480F-8463-564A2163D7C5}" type="datetime1">
               <a:rPr lang="uk-UA" smtClean="0"/>
-              <a:t>05.06.2024</a:t>
+              <a:t>08.06.2024</a:t>
             </a:fld>
             <a:endParaRPr lang="uk-UA" dirty="0"/>
           </a:p>
@@ -1610,9 +1610,9 @@
           </a:lstStyle>
           <a:p>
             <a:pPr rtl="0"/>
-            <a:fld id="{94779907-BF1B-417B-8654-43330472825B}" type="datetime1">
+            <a:fld id="{EE3039BC-10EB-4594-A369-BFAFEF1787B9}" type="datetime1">
               <a:rPr lang="uk-UA" smtClean="0"/>
-              <a:t>05.06.2024</a:t>
+              <a:t>08.06.2024</a:t>
             </a:fld>
             <a:endParaRPr lang="uk-UA" dirty="0"/>
           </a:p>
@@ -1862,9 +1862,9 @@
           <a:lstStyle/>
           <a:p>
             <a:pPr rtl="0"/>
-            <a:fld id="{CBDE2BE2-2E65-4D7E-BE55-FB3A839C5DF4}" type="datetime1">
+            <a:fld id="{C8D8E550-726E-4C4F-81F8-4357A63D22A3}" type="datetime1">
               <a:rPr lang="uk-UA" smtClean="0"/>
-              <a:t>05.06.2024</a:t>
+              <a:t>08.06.2024</a:t>
             </a:fld>
             <a:endParaRPr lang="uk-UA" dirty="0"/>
           </a:p>
@@ -1908,9 +1908,12 @@
         </p:spPr>
         <p:txBody>
           <a:bodyPr rtlCol="0"/>
-          <a:lstStyle/>
-          <a:p>
-            <a:pPr rtl="0"/>
+          <a:lstStyle>
+            <a:lvl1pPr>
+              <a:defRPr sz="1800"/>
+            </a:lvl1pPr>
+          </a:lstStyle>
+          <a:p>
             <a:fld id="{D57F1E4F-1CFF-5643-939E-217C01CDF565}" type="slidenum">
               <a:rPr lang="uk-UA" smtClean="0"/>
               <a:pPr/>
@@ -2181,9 +2184,9 @@
           </a:lstStyle>
           <a:p>
             <a:pPr rtl="0"/>
-            <a:fld id="{5C608984-9B96-4952-861D-7860396CCD38}" type="datetime1">
+            <a:fld id="{3B5F9B28-6BA9-4D2F-8A63-D67386E80924}" type="datetime1">
               <a:rPr lang="uk-UA" smtClean="0"/>
-              <a:t>05.06.2024</a:t>
+              <a:t>08.06.2024</a:t>
             </a:fld>
             <a:endParaRPr lang="uk-UA" dirty="0"/>
           </a:p>
@@ -2495,9 +2498,9 @@
           <a:lstStyle/>
           <a:p>
             <a:pPr rtl="0"/>
-            <a:fld id="{814056BD-1950-4F9C-9C9F-3A3FA4F35AE2}" type="datetime1">
+            <a:fld id="{B3495656-4014-4784-B9C0-EDBD0B33E7D3}" type="datetime1">
               <a:rPr lang="uk-UA" smtClean="0"/>
-              <a:t>05.06.2024</a:t>
+              <a:t>08.06.2024</a:t>
             </a:fld>
             <a:endParaRPr lang="uk-UA" dirty="0"/>
           </a:p>
@@ -2931,9 +2934,9 @@
           <a:lstStyle/>
           <a:p>
             <a:pPr rtl="0"/>
-            <a:fld id="{509D2646-490E-4A78-8039-4B1A6476AFA2}" type="datetime1">
+            <a:fld id="{866F50DF-742B-4218-8837-287D24220270}" type="datetime1">
               <a:rPr lang="uk-UA" smtClean="0"/>
-              <a:t>05.06.2024</a:t>
+              <a:t>08.06.2024</a:t>
             </a:fld>
             <a:endParaRPr lang="uk-UA" dirty="0"/>
           </a:p>
@@ -3030,9 +3033,9 @@
           <a:lstStyle/>
           <a:p>
             <a:pPr rtl="0"/>
-            <a:fld id="{07EA9FB3-2DCA-4CAB-B91B-7DEF0114FDF3}" type="datetime1">
+            <a:fld id="{3E47DFD9-0150-4436-B849-365838915EF8}" type="datetime1">
               <a:rPr lang="uk-UA" smtClean="0"/>
-              <a:t>05.06.2024</a:t>
+              <a:t>08.06.2024</a:t>
             </a:fld>
             <a:endParaRPr lang="uk-UA" dirty="0"/>
           </a:p>
@@ -3204,9 +3207,9 @@
           <a:lstStyle/>
           <a:p>
             <a:pPr rtl="0"/>
-            <a:fld id="{3767AE29-5ECE-4105-882B-0D5E1EBB7150}" type="datetime1">
+            <a:fld id="{3AC8EE65-9093-4E40-9231-37A7E0FE6C5A}" type="datetime1">
               <a:rPr lang="uk-UA" smtClean="0"/>
-              <a:t>05.06.2024</a:t>
+              <a:t>08.06.2024</a:t>
             </a:fld>
             <a:endParaRPr lang="uk-UA" dirty="0"/>
           </a:p>
@@ -3595,9 +3598,9 @@
           </a:lstStyle>
           <a:p>
             <a:pPr rtl="0"/>
-            <a:fld id="{13058907-C203-47FF-9A8D-C65C17B5DAF4}" type="datetime1">
+            <a:fld id="{C0D90E99-47FA-4536-A2E0-B7BF4AC16C7F}" type="datetime1">
               <a:rPr lang="uk-UA" smtClean="0"/>
-              <a:t>05.06.2024</a:t>
+              <a:t>08.06.2024</a:t>
             </a:fld>
             <a:endParaRPr lang="uk-UA" dirty="0"/>
           </a:p>
@@ -3891,9 +3894,9 @@
           <a:lstStyle/>
           <a:p>
             <a:pPr rtl="0"/>
-            <a:fld id="{2F7A4F20-7A7D-4C7B-84F4-51B486B4BA97}" type="datetime1">
+            <a:fld id="{7AA215BC-9CF9-494F-9274-8C3CBC213E10}" type="datetime1">
               <a:rPr lang="uk-UA" smtClean="0"/>
-              <a:t>05.06.2024</a:t>
+              <a:t>08.06.2024</a:t>
             </a:fld>
             <a:endParaRPr lang="uk-UA" dirty="0"/>
           </a:p>
@@ -4107,9 +4110,9 @@
           </a:lstStyle>
           <a:p>
             <a:pPr rtl="0"/>
-            <a:fld id="{F2F1A5F0-8F49-4709-8BD0-BECD0576185C}" type="datetime1">
+            <a:fld id="{46F85802-93CD-4E26-8B15-0CB92076C02A}" type="datetime1">
               <a:rPr lang="uk-UA" noProof="0" smtClean="0"/>
-              <a:t>05.06.2024</a:t>
+              <a:t>08.06.2024</a:t>
             </a:fld>
             <a:endParaRPr lang="uk-UA" noProof="0"/>
           </a:p>
@@ -4345,7 +4348,7 @@
     <p:sldLayoutId id="2147483682" r:id="rId10"/>
     <p:sldLayoutId id="2147483683" r:id="rId11"/>
   </p:sldLayoutIdLst>
-  <p:hf sldNum="0" hdr="0" ftr="0" dt="0"/>
+  <p:hf hdr="0" ftr="0" dt="0"/>
   <p:txStyles>
     <p:titleStyle>
       <a:lvl1pPr algn="l" defTabSz="457200" rtl="0" eaLnBrk="1" latinLnBrk="0" hangingPunct="1">
@@ -5199,8 +5202,28 @@
                 <a:ea typeface="Cambria" panose="02040503050406030204" pitchFamily="18" charset="0"/>
                 <a:cs typeface="Times New Roman" panose="02020603050405020304" pitchFamily="18" charset="0"/>
               </a:rPr>
-              <a:t>доцент каф. МСТ, к. ф.-м. н</a:t>
+              <a:t>доцент каф. МСТ, к. ф.-м. н.</a:t>
             </a:r>
+            <a:fld id="{7F6640C6-1A07-45A5-9BAE-98CEF719C095}" type="slidenum">
+              <a:rPr lang="ru-RU" smtClean="0">
+                <a:solidFill>
+                  <a:srgbClr val="FFFFF3"/>
+                </a:solidFill>
+                <a:ea typeface="Cambria" panose="02040503050406030204" pitchFamily="18" charset="0"/>
+                <a:cs typeface="Times New Roman" panose="02020603050405020304" pitchFamily="18" charset="0"/>
+              </a:rPr>
+              <a:t>1</a:t>
+            </a:fld>
+            <a:fld id="{4646129C-C09D-42F0-B6B1-674755D0B96B}" type="slidenum">
+              <a:rPr lang="ru-RU" smtClean="0">
+                <a:solidFill>
+                  <a:srgbClr val="FFFFF3"/>
+                </a:solidFill>
+                <a:ea typeface="Cambria" panose="02040503050406030204" pitchFamily="18" charset="0"/>
+                <a:cs typeface="Times New Roman" panose="02020603050405020304" pitchFamily="18" charset="0"/>
+              </a:rPr>
+              <a:t>1</a:t>
+            </a:fld>
             <a:br>
               <a:rPr lang="uk-UA" dirty="0">
                 <a:solidFill>
@@ -5742,8 +5765,8 @@
           </a:p>
         </p:txBody>
       </p:sp>
-      <mc:AlternateContent xmlns:mc="http://schemas.openxmlformats.org/markup-compatibility/2006" xmlns:a14="http://schemas.microsoft.com/office/drawing/2010/main">
-        <mc:Choice Requires="a14">
+      <mc:AlternateContent xmlns:mc="http://schemas.openxmlformats.org/markup-compatibility/2006">
+        <mc:Choice xmlns:a14="http://schemas.microsoft.com/office/drawing/2010/main" Requires="a14">
           <p:sp>
             <p:nvSpPr>
               <p:cNvPr id="3" name="Місце для вмісту 2">
@@ -5858,7 +5881,19 @@
                 </a:r>
                 <a:r>
                   <a:rPr lang="uk-UA" sz="2400" dirty="0" err="1"/>
-                  <a:t>істотности</a:t>
+                  <a:t>іс</a:t>
+                </a:r>
+                <a:fld id="{B58A5466-C6A5-4B30-857E-71D27DF599DB}" type="slidenum">
+                  <a:rPr lang="uk-UA" sz="2400" smtClean="0"/>
+                  <a:t>2</a:t>
+                </a:fld>
+                <a:fld id="{7F292E7C-D156-4B80-A676-2E8F4A586DFD}" type="slidenum">
+                  <a:rPr lang="uk-UA" sz="2400" smtClean="0"/>
+                  <a:t>2</a:t>
+                </a:fld>
+                <a:r>
+                  <a:rPr lang="uk-UA" sz="2400" dirty="0" err="1"/>
+                  <a:t>тотности</a:t>
                 </a:r>
                 <a:r>
                   <a:rPr lang="uk-UA" sz="2400" dirty="0"/>
@@ -5931,15 +5966,7 @@
                 </a14:m>
                 <a:r>
                   <a:rPr lang="uk-UA" sz="2400" dirty="0"/>
-                  <a:t> критерію для виявлення статистичної </a:t>
-                </a:r>
-                <a:r>
-                  <a:rPr lang="uk-UA" sz="2400" dirty="0" err="1"/>
-                  <a:t>відмінности</a:t>
-                </a:r>
-                <a:r>
-                  <a:rPr lang="uk-UA" sz="2400" dirty="0"/>
-                  <a:t> між експресією істотних генів.</a:t>
+                  <a:t> критерію для виявлення статистичної відмінности між експресією істотних генів.</a:t>
                 </a:r>
               </a:p>
               <a:p>
@@ -5951,7 +5978,7 @@
             </p:txBody>
           </p:sp>
         </mc:Choice>
-        <mc:Fallback xmlns="">
+        <mc:Fallback>
           <p:sp>
             <p:nvSpPr>
               <p:cNvPr id="3" name="Місце для вмісту 2">
@@ -5976,7 +6003,7 @@
               <a:blipFill>
                 <a:blip r:embed="rId2"/>
                 <a:stretch>
-                  <a:fillRect l="-829" t="-14570" b="-2815"/>
+                  <a:fillRect l="-829" t="-14570" r="-166" b="-2815"/>
                 </a:stretch>
               </a:blipFill>
             </p:spPr>
@@ -5995,6 +6022,37 @@
           </p:sp>
         </mc:Fallback>
       </mc:AlternateContent>
+      <p:sp>
+        <p:nvSpPr>
+          <p:cNvPr id="6" name="Місце для номера слайда 5">
+            <a:extLst>
+              <a:ext uri="{FF2B5EF4-FFF2-40B4-BE49-F238E27FC236}">
+                <a16:creationId xmlns:a16="http://schemas.microsoft.com/office/drawing/2014/main" id="{1C3A6F2C-E9CE-40AE-BB3D-25D26A0E41AC}"/>
+              </a:ext>
+            </a:extLst>
+          </p:cNvPr>
+          <p:cNvSpPr>
+            <a:spLocks noGrp="1"/>
+          </p:cNvSpPr>
+          <p:nvPr>
+            <p:ph type="sldNum" sz="quarter" idx="12"/>
+          </p:nvPr>
+        </p:nvSpPr>
+        <p:spPr/>
+        <p:txBody>
+          <a:bodyPr/>
+          <a:lstStyle/>
+          <a:p>
+            <a:pPr rtl="0"/>
+            <a:fld id="{D57F1E4F-1CFF-5643-939E-217C01CDF565}" type="slidenum">
+              <a:rPr lang="uk-UA" smtClean="0"/>
+              <a:pPr rtl="0"/>
+              <a:t>2</a:t>
+            </a:fld>
+            <a:endParaRPr lang="uk-UA" dirty="0"/>
+          </a:p>
+        </p:txBody>
+      </p:sp>
     </p:spTree>
     <p:extLst>
       <p:ext uri="{BB962C8B-B14F-4D97-AF65-F5344CB8AC3E}">
@@ -6207,6 +6265,37 @@
               <a:rPr lang="uk-UA" sz="2400" dirty="0"/>
               <a:t>.</a:t>
             </a:r>
+          </a:p>
+        </p:txBody>
+      </p:sp>
+      <p:sp>
+        <p:nvSpPr>
+          <p:cNvPr id="5" name="Місце для номера слайда 4">
+            <a:extLst>
+              <a:ext uri="{FF2B5EF4-FFF2-40B4-BE49-F238E27FC236}">
+                <a16:creationId xmlns:a16="http://schemas.microsoft.com/office/drawing/2014/main" id="{77AE9C64-7443-4992-9700-832FE43FC8DB}"/>
+              </a:ext>
+            </a:extLst>
+          </p:cNvPr>
+          <p:cNvSpPr>
+            <a:spLocks noGrp="1"/>
+          </p:cNvSpPr>
+          <p:nvPr>
+            <p:ph type="sldNum" sz="quarter" idx="12"/>
+          </p:nvPr>
+        </p:nvSpPr>
+        <p:spPr/>
+        <p:txBody>
+          <a:bodyPr/>
+          <a:lstStyle/>
+          <a:p>
+            <a:pPr rtl="0"/>
+            <a:fld id="{D57F1E4F-1CFF-5643-939E-217C01CDF565}" type="slidenum">
+              <a:rPr lang="uk-UA" smtClean="0"/>
+              <a:pPr rtl="0"/>
+              <a:t>3</a:t>
+            </a:fld>
+            <a:endParaRPr lang="uk-UA" dirty="0"/>
           </a:p>
         </p:txBody>
       </p:sp>
@@ -6405,8 +6494,8 @@
         </p:nvSpPr>
         <p:spPr bwMode="auto">
           <a:xfrm>
-            <a:off x="-605386" y="5551022"/>
-            <a:ext cx="6701385" cy="307777"/>
+            <a:off x="1055645" y="5848067"/>
+            <a:ext cx="9376799" cy="307777"/>
           </a:xfrm>
           <a:prstGeom prst="rect">
             <a:avLst/>
@@ -6524,7 +6613,63 @@
                 <a:ea typeface="Calibri" panose="020F0502020204030204" pitchFamily="34" charset="0"/>
                 <a:cs typeface="Times New Roman" panose="02020603050405020304" pitchFamily="18" charset="0"/>
               </a:rPr>
-              <a:t>ABL</a:t>
+              <a:t>ABL (</a:t>
+            </a:r>
+            <a:r>
+              <a:rPr kumimoji="0" lang="uk-UA" altLang="uk-UA" sz="1400" b="0" i="0" u="none" strike="noStrike" cap="none" normalizeH="0" baseline="0" dirty="0">
+                <a:ln>
+                  <a:noFill/>
+                </a:ln>
+                <a:solidFill>
+                  <a:schemeClr val="tx1"/>
+                </a:solidFill>
+                <a:effectLst/>
+                <a:ea typeface="Calibri" panose="020F0502020204030204" pitchFamily="34" charset="0"/>
+                <a:cs typeface="Times New Roman" panose="02020603050405020304" pitchFamily="18" charset="0"/>
+              </a:rPr>
+              <a:t>чорна лінія) та </a:t>
+            </a:r>
+            <a:r>
+              <a:rPr kumimoji="0" lang="en-US" altLang="uk-UA" sz="1400" b="0" i="0" u="none" strike="noStrike" cap="none" normalizeH="0" baseline="0" dirty="0">
+                <a:ln>
+                  <a:noFill/>
+                </a:ln>
+                <a:solidFill>
+                  <a:schemeClr val="tx1"/>
+                </a:solidFill>
+                <a:effectLst/>
+                <a:ea typeface="Calibri" panose="020F0502020204030204" pitchFamily="34" charset="0"/>
+                <a:cs typeface="Times New Roman" panose="02020603050405020304" pitchFamily="18" charset="0"/>
+              </a:rPr>
+              <a:t>NEG (</a:t>
+            </a:r>
+            <a:r>
+              <a:rPr kumimoji="0" lang="uk-UA" altLang="uk-UA" sz="1400" b="0" i="0" u="none" strike="noStrike" cap="none" normalizeH="0" baseline="0" dirty="0">
+                <a:ln>
+                  <a:noFill/>
+                </a:ln>
+                <a:solidFill>
+                  <a:schemeClr val="tx1"/>
+                </a:solidFill>
+                <a:effectLst/>
+                <a:ea typeface="Calibri" panose="020F0502020204030204" pitchFamily="34" charset="0"/>
+                <a:cs typeface="Times New Roman" panose="02020603050405020304" pitchFamily="18" charset="0"/>
+              </a:rPr>
+              <a:t>червона лінія</a:t>
+            </a:r>
+            <a:r>
+              <a:rPr kumimoji="0" lang="en-US" altLang="uk-UA" sz="1400" b="0" i="0" u="none" strike="noStrike" cap="none" normalizeH="0" baseline="0" dirty="0">
+                <a:ln>
+                  <a:noFill/>
+                </a:ln>
+                <a:solidFill>
+                  <a:schemeClr val="tx1"/>
+                </a:solidFill>
+                <a:effectLst/>
+                <a:ea typeface="Calibri" panose="020F0502020204030204" pitchFamily="34" charset="0"/>
+                <a:cs typeface="Times New Roman" panose="02020603050405020304" pitchFamily="18" charset="0"/>
+              </a:rPr>
+              <a:t>)</a:t>
             </a:r>
             <a:endParaRPr kumimoji="0" lang="en-US" altLang="uk-UA" sz="1800" b="0" i="0" u="none" strike="noStrike" cap="none" normalizeH="0" baseline="0" dirty="0">
               <a:ln>
@@ -6656,122 +6801,37 @@
       </p:pic>
       <p:sp>
         <p:nvSpPr>
-          <p:cNvPr id="9" name="Rectangle 6">
+          <p:cNvPr id="11" name="Місце для номера слайда 10">
             <a:extLst>
               <a:ext uri="{FF2B5EF4-FFF2-40B4-BE49-F238E27FC236}">
-                <a16:creationId xmlns:a16="http://schemas.microsoft.com/office/drawing/2014/main" id="{83001EEE-C628-46C6-99B2-42DA79AA1E88}"/>
+                <a16:creationId xmlns:a16="http://schemas.microsoft.com/office/drawing/2014/main" id="{F2FEE55F-7524-4A6F-8C13-3A65A8D36C05}"/>
               </a:ext>
             </a:extLst>
           </p:cNvPr>
           <p:cNvSpPr>
-            <a:spLocks noChangeArrowheads="1"/>
+            <a:spLocks noGrp="1"/>
           </p:cNvSpPr>
-          <p:nvPr/>
+          <p:nvPr>
+            <p:ph type="sldNum" sz="quarter" idx="12"/>
+          </p:nvPr>
         </p:nvSpPr>
-        <p:spPr bwMode="auto">
+        <p:spPr>
           <a:xfrm>
-            <a:off x="5617395" y="5551022"/>
-            <a:ext cx="6379182" cy="307777"/>
+            <a:off x="10558300" y="5956137"/>
+            <a:ext cx="1633700" cy="781093"/>
           </a:xfrm>
-          <a:prstGeom prst="rect">
-            <a:avLst/>
-          </a:prstGeom>
-          <a:noFill/>
-          <a:ln>
-            <a:noFill/>
-          </a:ln>
-          <a:effectLst/>
-          <a:extLst>
-            <a:ext uri="{909E8E84-426E-40DD-AFC4-6F175D3DCCD1}">
-              <a14:hiddenFill xmlns:a14="http://schemas.microsoft.com/office/drawing/2010/main">
-                <a:solidFill>
-                  <a:schemeClr val="accent1"/>
-                </a:solidFill>
-              </a14:hiddenFill>
-            </a:ext>
-            <a:ext uri="{91240B29-F687-4F45-9708-019B960494DF}">
-              <a14:hiddenLine xmlns:a14="http://schemas.microsoft.com/office/drawing/2010/main" w="9525">
-                <a:solidFill>
-                  <a:schemeClr val="tx1"/>
-                </a:solidFill>
-                <a:miter lim="800000"/>
-                <a:headEnd/>
-                <a:tailEnd/>
-              </a14:hiddenLine>
-            </a:ext>
-            <a:ext uri="{AF507438-7753-43E0-B8FC-AC1667EBCBE1}">
-              <a14:hiddenEffects xmlns:a14="http://schemas.microsoft.com/office/drawing/2010/main">
-                <a:effectLst>
-                  <a:outerShdw dist="35921" dir="2700000" algn="ctr" rotWithShape="0">
-                    <a:schemeClr val="bg2"/>
-                  </a:outerShdw>
-                </a:effectLst>
-              </a14:hiddenEffects>
-            </a:ext>
-          </a:extLst>
         </p:spPr>
         <p:txBody>
-          <a:bodyPr vert="horz" wrap="none" lIns="91440" tIns="45720" rIns="91440" bIns="45720" numCol="1" anchor="ctr" anchorCtr="0" compatLnSpc="1">
-            <a:prstTxWarp prst="textNoShape">
-              <a:avLst/>
-            </a:prstTxWarp>
-            <a:spAutoFit/>
-          </a:bodyPr>
+          <a:bodyPr/>
           <a:lstStyle/>
           <a:p>
-            <a:pPr marL="0" marR="0" lvl="0" indent="450850" algn="ctr" defTabSz="914400" rtl="0" eaLnBrk="0" fontAlgn="base" latinLnBrk="0" hangingPunct="0">
-              <a:lnSpc>
-                <a:spcPct val="100000"/>
-              </a:lnSpc>
-              <a:spcBef>
-                <a:spcPct val="0"/>
-              </a:spcBef>
-              <a:spcAft>
-                <a:spcPct val="0"/>
-              </a:spcAft>
-              <a:buClrTx/>
-              <a:buSzTx/>
-              <a:buFontTx/>
-              <a:buNone/>
-              <a:tabLst/>
-            </a:pPr>
-            <a:r>
-              <a:rPr kumimoji="0" lang="uk-UA" altLang="uk-UA" sz="1400" b="0" i="0" u="none" strike="noStrike" cap="none" normalizeH="0" baseline="0" dirty="0">
-                <a:ln>
-                  <a:noFill/>
-                </a:ln>
-                <a:solidFill>
-                  <a:schemeClr val="tx1"/>
-                </a:solidFill>
-                <a:effectLst/>
-                <a:ea typeface="Calibri" panose="020F0502020204030204" pitchFamily="34" charset="0"/>
-                <a:cs typeface="Times New Roman" panose="02020603050405020304" pitchFamily="18" charset="0"/>
-              </a:rPr>
-              <a:t>Рис 2. Графік середніх рівнів експресії генів для захворювання типу </a:t>
-            </a:r>
-            <a:r>
-              <a:rPr kumimoji="0" lang="en-US" altLang="uk-UA" sz="1400" b="0" i="0" u="none" strike="noStrike" cap="none" normalizeH="0" baseline="0" dirty="0">
-                <a:ln>
-                  <a:noFill/>
-                </a:ln>
-                <a:solidFill>
-                  <a:schemeClr val="tx1"/>
-                </a:solidFill>
-                <a:effectLst/>
-                <a:ea typeface="Calibri" panose="020F0502020204030204" pitchFamily="34" charset="0"/>
-                <a:cs typeface="Times New Roman" panose="02020603050405020304" pitchFamily="18" charset="0"/>
-              </a:rPr>
-              <a:t>NEG</a:t>
-            </a:r>
-            <a:endParaRPr kumimoji="0" lang="en-US" altLang="uk-UA" sz="1800" b="0" i="0" u="none" strike="noStrike" cap="none" normalizeH="0" baseline="0" dirty="0">
-              <a:ln>
-                <a:noFill/>
-              </a:ln>
-              <a:solidFill>
-                <a:schemeClr val="tx1"/>
-              </a:solidFill>
-              <a:effectLst/>
-            </a:endParaRPr>
+            <a:pPr rtl="0"/>
+            <a:fld id="{D57F1E4F-1CFF-5643-939E-217C01CDF565}" type="slidenum">
+              <a:rPr lang="uk-UA" smtClean="0"/>
+              <a:pPr rtl="0"/>
+              <a:t>4</a:t>
+            </a:fld>
+            <a:endParaRPr lang="uk-UA" dirty="0"/>
           </a:p>
         </p:txBody>
       </p:sp>
@@ -7941,6 +8001,37 @@
           </p:sp>
         </mc:Fallback>
       </mc:AlternateContent>
+      <p:sp>
+        <p:nvSpPr>
+          <p:cNvPr id="5" name="Місце для номера слайда 4">
+            <a:extLst>
+              <a:ext uri="{FF2B5EF4-FFF2-40B4-BE49-F238E27FC236}">
+                <a16:creationId xmlns:a16="http://schemas.microsoft.com/office/drawing/2014/main" id="{A5A5FE27-962A-465B-8368-95C30B71543D}"/>
+              </a:ext>
+            </a:extLst>
+          </p:cNvPr>
+          <p:cNvSpPr>
+            <a:spLocks noGrp="1"/>
+          </p:cNvSpPr>
+          <p:nvPr>
+            <p:ph type="sldNum" sz="quarter" idx="12"/>
+          </p:nvPr>
+        </p:nvSpPr>
+        <p:spPr/>
+        <p:txBody>
+          <a:bodyPr/>
+          <a:lstStyle/>
+          <a:p>
+            <a:pPr rtl="0"/>
+            <a:fld id="{D57F1E4F-1CFF-5643-939E-217C01CDF565}" type="slidenum">
+              <a:rPr lang="uk-UA" smtClean="0"/>
+              <a:pPr rtl="0"/>
+              <a:t>5</a:t>
+            </a:fld>
+            <a:endParaRPr lang="uk-UA" dirty="0"/>
+          </a:p>
+        </p:txBody>
+      </p:sp>
     </p:spTree>
     <p:extLst>
       <p:ext uri="{BB962C8B-B14F-4D97-AF65-F5344CB8AC3E}">
@@ -10026,6 +10117,37 @@
           </p:sp>
         </mc:Fallback>
       </mc:AlternateContent>
+      <p:sp>
+        <p:nvSpPr>
+          <p:cNvPr id="5" name="Місце для номера слайда 4">
+            <a:extLst>
+              <a:ext uri="{FF2B5EF4-FFF2-40B4-BE49-F238E27FC236}">
+                <a16:creationId xmlns:a16="http://schemas.microsoft.com/office/drawing/2014/main" id="{1400D328-25D9-4020-98F8-D1DF42A7E005}"/>
+              </a:ext>
+            </a:extLst>
+          </p:cNvPr>
+          <p:cNvSpPr>
+            <a:spLocks noGrp="1"/>
+          </p:cNvSpPr>
+          <p:nvPr>
+            <p:ph type="sldNum" sz="quarter" idx="12"/>
+          </p:nvPr>
+        </p:nvSpPr>
+        <p:spPr/>
+        <p:txBody>
+          <a:bodyPr/>
+          <a:lstStyle/>
+          <a:p>
+            <a:pPr rtl="0"/>
+            <a:fld id="{D57F1E4F-1CFF-5643-939E-217C01CDF565}" type="slidenum">
+              <a:rPr lang="uk-UA" smtClean="0"/>
+              <a:pPr rtl="0"/>
+              <a:t>6</a:t>
+            </a:fld>
+            <a:endParaRPr lang="uk-UA" dirty="0"/>
+          </a:p>
+        </p:txBody>
+      </p:sp>
     </p:spTree>
     <p:extLst>
       <p:ext uri="{BB962C8B-B14F-4D97-AF65-F5344CB8AC3E}">
@@ -12874,6 +12996,37 @@
           </a:p>
         </p:txBody>
       </p:sp>
+      <p:sp>
+        <p:nvSpPr>
+          <p:cNvPr id="5" name="Місце для номера слайда 4">
+            <a:extLst>
+              <a:ext uri="{FF2B5EF4-FFF2-40B4-BE49-F238E27FC236}">
+                <a16:creationId xmlns:a16="http://schemas.microsoft.com/office/drawing/2014/main" id="{069B3E5E-075B-47D8-B3E4-C7B55DC82C07}"/>
+              </a:ext>
+            </a:extLst>
+          </p:cNvPr>
+          <p:cNvSpPr>
+            <a:spLocks noGrp="1"/>
+          </p:cNvSpPr>
+          <p:nvPr>
+            <p:ph type="sldNum" sz="quarter" idx="12"/>
+          </p:nvPr>
+        </p:nvSpPr>
+        <p:spPr/>
+        <p:txBody>
+          <a:bodyPr/>
+          <a:lstStyle/>
+          <a:p>
+            <a:pPr rtl="0"/>
+            <a:fld id="{D57F1E4F-1CFF-5643-939E-217C01CDF565}" type="slidenum">
+              <a:rPr lang="uk-UA" smtClean="0"/>
+              <a:pPr rtl="0"/>
+              <a:t>7</a:t>
+            </a:fld>
+            <a:endParaRPr lang="uk-UA" dirty="0"/>
+          </a:p>
+        </p:txBody>
+      </p:sp>
     </p:spTree>
     <p:extLst>
       <p:ext uri="{BB962C8B-B14F-4D97-AF65-F5344CB8AC3E}">
@@ -13566,6 +13719,37 @@
           </a:p>
         </p:txBody>
       </p:sp>
+      <p:sp>
+        <p:nvSpPr>
+          <p:cNvPr id="6" name="Місце для номера слайда 5">
+            <a:extLst>
+              <a:ext uri="{FF2B5EF4-FFF2-40B4-BE49-F238E27FC236}">
+                <a16:creationId xmlns:a16="http://schemas.microsoft.com/office/drawing/2014/main" id="{AC156473-FC80-4CEC-AB97-8DE5E36D49CE}"/>
+              </a:ext>
+            </a:extLst>
+          </p:cNvPr>
+          <p:cNvSpPr>
+            <a:spLocks noGrp="1"/>
+          </p:cNvSpPr>
+          <p:nvPr>
+            <p:ph type="sldNum" sz="quarter" idx="12"/>
+          </p:nvPr>
+        </p:nvSpPr>
+        <p:spPr/>
+        <p:txBody>
+          <a:bodyPr/>
+          <a:lstStyle/>
+          <a:p>
+            <a:pPr rtl="0"/>
+            <a:fld id="{D57F1E4F-1CFF-5643-939E-217C01CDF565}" type="slidenum">
+              <a:rPr lang="uk-UA" smtClean="0"/>
+              <a:pPr rtl="0"/>
+              <a:t>8</a:t>
+            </a:fld>
+            <a:endParaRPr lang="uk-UA" dirty="0"/>
+          </a:p>
+        </p:txBody>
+      </p:sp>
     </p:spTree>
     <p:extLst>
       <p:ext uri="{BB962C8B-B14F-4D97-AF65-F5344CB8AC3E}">
@@ -13870,6 +14054,37 @@
           </p:sp>
         </mc:Fallback>
       </mc:AlternateContent>
+      <p:sp>
+        <p:nvSpPr>
+          <p:cNvPr id="5" name="Місце для номера слайда 4">
+            <a:extLst>
+              <a:ext uri="{FF2B5EF4-FFF2-40B4-BE49-F238E27FC236}">
+                <a16:creationId xmlns:a16="http://schemas.microsoft.com/office/drawing/2014/main" id="{F28E0A7E-837B-419C-91C2-90EF6AFC4306}"/>
+              </a:ext>
+            </a:extLst>
+          </p:cNvPr>
+          <p:cNvSpPr>
+            <a:spLocks noGrp="1"/>
+          </p:cNvSpPr>
+          <p:nvPr>
+            <p:ph type="sldNum" sz="quarter" idx="12"/>
+          </p:nvPr>
+        </p:nvSpPr>
+        <p:spPr/>
+        <p:txBody>
+          <a:bodyPr/>
+          <a:lstStyle/>
+          <a:p>
+            <a:pPr rtl="0"/>
+            <a:fld id="{D57F1E4F-1CFF-5643-939E-217C01CDF565}" type="slidenum">
+              <a:rPr lang="uk-UA" smtClean="0"/>
+              <a:pPr rtl="0"/>
+              <a:t>9</a:t>
+            </a:fld>
+            <a:endParaRPr lang="uk-UA" dirty="0"/>
+          </a:p>
+        </p:txBody>
+      </p:sp>
     </p:spTree>
     <p:extLst>
       <p:ext uri="{BB962C8B-B14F-4D97-AF65-F5344CB8AC3E}">

</xml_diff>

<commit_message>
Fixed small typos, added pdf versions
</commit_message>
<xml_diff>
--- a/Презентація.pptx
+++ b/Презентація.pptx
@@ -5192,7 +5192,27 @@
                 <a:ea typeface="Cambria" panose="02040503050406030204" pitchFamily="18" charset="0"/>
                 <a:cs typeface="Times New Roman" panose="02020603050405020304" pitchFamily="18" charset="0"/>
               </a:rPr>
-              <a:t>Студент групи МС-23м-1													   </a:t>
+              <a:t>Студент групи МС-23м-1													</a:t>
+            </a:r>
+            <a:r>
+              <a:rPr lang="uk-UA">
+                <a:solidFill>
+                  <a:srgbClr val="FFFFF3"/>
+                </a:solidFill>
+                <a:ea typeface="Cambria" panose="02040503050406030204" pitchFamily="18" charset="0"/>
+                <a:cs typeface="Times New Roman" panose="02020603050405020304" pitchFamily="18" charset="0"/>
+              </a:rPr>
+              <a:t>    </a:t>
+            </a:r>
+            <a:r>
+              <a:rPr lang="ru-RU">
+                <a:solidFill>
+                  <a:srgbClr val="FFFFF3"/>
+                </a:solidFill>
+                <a:ea typeface="Cambria" panose="02040503050406030204" pitchFamily="18" charset="0"/>
+                <a:cs typeface="Times New Roman" panose="02020603050405020304" pitchFamily="18" charset="0"/>
+              </a:rPr>
+              <a:t>доцент </a:t>
             </a:r>
             <a:r>
               <a:rPr lang="ru-RU" dirty="0">
@@ -5202,28 +5222,28 @@
                 <a:ea typeface="Cambria" panose="02040503050406030204" pitchFamily="18" charset="0"/>
                 <a:cs typeface="Times New Roman" panose="02020603050405020304" pitchFamily="18" charset="0"/>
               </a:rPr>
-              <a:t>доцент каф. МСТ, к. ф.-м. н.</a:t>
+              <a:t>каф. МСТ, к. ф.-</a:t>
             </a:r>
-            <a:fld id="{7F6640C6-1A07-45A5-9BAE-98CEF719C095}" type="slidenum">
-              <a:rPr lang="ru-RU" smtClean="0">
+            <a:r>
+              <a:rPr lang="ru-RU" dirty="0" err="1">
                 <a:solidFill>
                   <a:srgbClr val="FFFFF3"/>
                 </a:solidFill>
                 <a:ea typeface="Cambria" panose="02040503050406030204" pitchFamily="18" charset="0"/>
                 <a:cs typeface="Times New Roman" panose="02020603050405020304" pitchFamily="18" charset="0"/>
               </a:rPr>
-              <a:t>1</a:t>
-            </a:fld>
-            <a:fld id="{4646129C-C09D-42F0-B6B1-674755D0B96B}" type="slidenum">
-              <a:rPr lang="ru-RU" smtClean="0">
+              <a:t>м.н</a:t>
+            </a:r>
+            <a:r>
+              <a:rPr lang="ru-RU" dirty="0">
                 <a:solidFill>
                   <a:srgbClr val="FFFFF3"/>
                 </a:solidFill>
                 <a:ea typeface="Cambria" panose="02040503050406030204" pitchFamily="18" charset="0"/>
                 <a:cs typeface="Times New Roman" panose="02020603050405020304" pitchFamily="18" charset="0"/>
               </a:rPr>
-              <a:t>1</a:t>
-            </a:fld>
+              <a:t>.</a:t>
+            </a:r>
             <a:br>
               <a:rPr lang="uk-UA" dirty="0">
                 <a:solidFill>
@@ -15207,16 +15227,16 @@
 <file path=customXml/itemProps2.xml><?xml version="1.0" encoding="utf-8"?>
 <ds:datastoreItem xmlns:ds="http://schemas.openxmlformats.org/officeDocument/2006/customXml" ds:itemID="{1EBC12AA-1C15-4500-BC9C-8EE83A441DE9}">
   <ds:schemaRefs>
+    <ds:schemaRef ds:uri="http://www.w3.org/XML/1998/namespace"/>
+    <ds:schemaRef ds:uri="71af3243-3dd4-4a8d-8c0d-dd76da1f02a5"/>
+    <ds:schemaRef ds:uri="http://schemas.microsoft.com/office/infopath/2007/PartnerControls"/>
+    <ds:schemaRef ds:uri="http://purl.org/dc/terms/"/>
+    <ds:schemaRef ds:uri="http://schemas.microsoft.com/office/2006/metadata/properties"/>
     <ds:schemaRef ds:uri="http://purl.org/dc/dcmitype/"/>
     <ds:schemaRef ds:uri="http://schemas.microsoft.com/office/2006/documentManagement/types"/>
-    <ds:schemaRef ds:uri="http://schemas.microsoft.com/office/infopath/2007/PartnerControls"/>
-    <ds:schemaRef ds:uri="http://schemas.microsoft.com/office/2006/metadata/properties"/>
     <ds:schemaRef ds:uri="http://purl.org/dc/elements/1.1/"/>
+    <ds:schemaRef ds:uri="http://schemas.openxmlformats.org/package/2006/metadata/core-properties"/>
     <ds:schemaRef ds:uri="16c05727-aa75-4e4a-9b5f-8a80a1165891"/>
-    <ds:schemaRef ds:uri="http://schemas.openxmlformats.org/package/2006/metadata/core-properties"/>
-    <ds:schemaRef ds:uri="71af3243-3dd4-4a8d-8c0d-dd76da1f02a5"/>
-    <ds:schemaRef ds:uri="http://www.w3.org/XML/1998/namespace"/>
-    <ds:schemaRef ds:uri="http://purl.org/dc/terms/"/>
   </ds:schemaRefs>
 </ds:datastoreItem>
 </file>

</xml_diff>

<commit_message>
Small text and presentation fixes, defended 90/100
</commit_message>
<xml_diff>
--- a/Презентація.pptx
+++ b/Презентація.pptx
@@ -712,7 +712,7 @@
           <a:bodyPr/>
           <a:lstStyle/>
           <a:p>
-            <a:endParaRPr lang="uk-UA"/>
+            <a:endParaRPr lang="uk-UA" dirty="0"/>
           </a:p>
         </p:txBody>
       </p:sp>
@@ -5192,57 +5192,7 @@
                 <a:ea typeface="Cambria" panose="02040503050406030204" pitchFamily="18" charset="0"/>
                 <a:cs typeface="Times New Roman" panose="02020603050405020304" pitchFamily="18" charset="0"/>
               </a:rPr>
-              <a:t>Студент групи МС-23м-1													</a:t>
-            </a:r>
-            <a:r>
-              <a:rPr lang="uk-UA">
-                <a:solidFill>
-                  <a:srgbClr val="FFFFF3"/>
-                </a:solidFill>
-                <a:ea typeface="Cambria" panose="02040503050406030204" pitchFamily="18" charset="0"/>
-                <a:cs typeface="Times New Roman" panose="02020603050405020304" pitchFamily="18" charset="0"/>
-              </a:rPr>
-              <a:t>    </a:t>
-            </a:r>
-            <a:r>
-              <a:rPr lang="ru-RU">
-                <a:solidFill>
-                  <a:srgbClr val="FFFFF3"/>
-                </a:solidFill>
-                <a:ea typeface="Cambria" panose="02040503050406030204" pitchFamily="18" charset="0"/>
-                <a:cs typeface="Times New Roman" panose="02020603050405020304" pitchFamily="18" charset="0"/>
-              </a:rPr>
-              <a:t>доцент </a:t>
-            </a:r>
-            <a:r>
-              <a:rPr lang="ru-RU" dirty="0">
-                <a:solidFill>
-                  <a:srgbClr val="FFFFF3"/>
-                </a:solidFill>
-                <a:ea typeface="Cambria" panose="02040503050406030204" pitchFamily="18" charset="0"/>
-                <a:cs typeface="Times New Roman" panose="02020603050405020304" pitchFamily="18" charset="0"/>
-              </a:rPr>
-              <a:t>каф. МСТ, к. ф.-</a:t>
-            </a:r>
-            <a:r>
-              <a:rPr lang="ru-RU" dirty="0" err="1">
-                <a:solidFill>
-                  <a:srgbClr val="FFFFF3"/>
-                </a:solidFill>
-                <a:ea typeface="Cambria" panose="02040503050406030204" pitchFamily="18" charset="0"/>
-                <a:cs typeface="Times New Roman" panose="02020603050405020304" pitchFamily="18" charset="0"/>
-              </a:rPr>
-              <a:t>м.н</a:t>
-            </a:r>
-            <a:r>
-              <a:rPr lang="ru-RU" dirty="0">
-                <a:solidFill>
-                  <a:srgbClr val="FFFFF3"/>
-                </a:solidFill>
-                <a:ea typeface="Cambria" panose="02040503050406030204" pitchFamily="18" charset="0"/>
-                <a:cs typeface="Times New Roman" panose="02020603050405020304" pitchFamily="18" charset="0"/>
-              </a:rPr>
-              <a:t>.</a:t>
+              <a:t>Студент групи МС-23м-1												КАРНАУХ ЄВГЕН ВОЛОДИМИРОВИЧ</a:t>
             </a:r>
             <a:br>
               <a:rPr lang="uk-UA" dirty="0">
@@ -5261,7 +5211,7 @@
                 <a:ea typeface="Cambria" panose="02040503050406030204" pitchFamily="18" charset="0"/>
                 <a:cs typeface="Times New Roman" panose="02020603050405020304" pitchFamily="18" charset="0"/>
               </a:rPr>
-              <a:t>Щербак Роман Олексійович											КАРНАУХ ЄВГЕН ВОЛОДИМИРОВИЧ</a:t>
+              <a:t>Щербак Роман Олексійович											</a:t>
             </a:r>
             <a:endParaRPr lang="uk-UA" dirty="0"/>
           </a:p>
@@ -5487,8 +5437,8 @@
         </p:nvSpPr>
         <p:spPr>
           <a:xfrm>
-            <a:off x="8296275" y="1419226"/>
-            <a:ext cx="3081576" cy="1746762"/>
+            <a:off x="8167938" y="1810470"/>
+            <a:ext cx="4024061" cy="1746762"/>
           </a:xfrm>
         </p:spPr>
         <p:txBody>
@@ -5497,20 +5447,14 @@
           </a:bodyPr>
           <a:lstStyle/>
           <a:p>
-            <a:pPr rtl="0"/>
             <a:r>
-              <a:rPr lang="uk-UA">
+              <a:rPr lang="uk-UA" sz="3200" dirty="0">
                 <a:solidFill>
                   <a:srgbClr val="FFFFFF"/>
                 </a:solidFill>
               </a:rPr>
-              <a:t>Дякуємо!</a:t>
+              <a:t>Дякую ЗА УВАГУ!</a:t>
             </a:r>
-            <a:endParaRPr lang="uk-UA" dirty="0">
-              <a:solidFill>
-                <a:srgbClr val="FFFFFF"/>
-              </a:solidFill>
-            </a:endParaRPr>
           </a:p>
         </p:txBody>
       </p:sp>
@@ -5702,31 +5646,6 @@
           </p:style>
         </p:sp>
       </p:grpSp>
-      <p:sp>
-        <p:nvSpPr>
-          <p:cNvPr id="6" name="Підзаголовок 5">
-            <a:extLst>
-              <a:ext uri="{FF2B5EF4-FFF2-40B4-BE49-F238E27FC236}">
-                <a16:creationId xmlns:a16="http://schemas.microsoft.com/office/drawing/2014/main" id="{BD57014D-273A-49AB-8BD8-E865A8C41737}"/>
-              </a:ext>
-            </a:extLst>
-          </p:cNvPr>
-          <p:cNvSpPr>
-            <a:spLocks noGrp="1"/>
-          </p:cNvSpPr>
-          <p:nvPr>
-            <p:ph type="subTitle" idx="1"/>
-          </p:nvPr>
-        </p:nvSpPr>
-        <p:spPr/>
-        <p:txBody>
-          <a:bodyPr/>
-          <a:lstStyle/>
-          <a:p>
-            <a:endParaRPr lang="uk-UA" dirty="0"/>
-          </a:p>
-        </p:txBody>
-      </p:sp>
     </p:spTree>
     <p:extLst>
       <p:ext uri="{BB962C8B-B14F-4D97-AF65-F5344CB8AC3E}">
@@ -5897,27 +5816,7 @@
                 </a:r>
                 <a:r>
                   <a:rPr lang="uk-UA" sz="2400" dirty="0"/>
-                  <a:t>– застосувати методи статистичного аналізу для встановлення </a:t>
-                </a:r>
-                <a:r>
-                  <a:rPr lang="uk-UA" sz="2400" dirty="0" err="1"/>
-                  <a:t>іс</a:t>
-                </a:r>
-                <a:fld id="{B58A5466-C6A5-4B30-857E-71D27DF599DB}" type="slidenum">
-                  <a:rPr lang="uk-UA" sz="2400" smtClean="0"/>
-                  <a:t>2</a:t>
-                </a:fld>
-                <a:fld id="{7F292E7C-D156-4B80-A676-2E8F4A586DFD}" type="slidenum">
-                  <a:rPr lang="uk-UA" sz="2400" smtClean="0"/>
-                  <a:t>2</a:t>
-                </a:fld>
-                <a:r>
-                  <a:rPr lang="uk-UA" sz="2400" dirty="0" err="1"/>
-                  <a:t>тотности</a:t>
-                </a:r>
-                <a:r>
-                  <a:rPr lang="uk-UA" sz="2400" dirty="0"/>
-                  <a:t> різниці середніми рівнями експресії генів</a:t>
+                  <a:t>– застосувати методи статистичного аналізу для встановлення істотности різниці між середніми рівнями експресії генів</a:t>
                 </a:r>
                 <a:r>
                   <a:rPr lang="en-US" sz="2400" dirty="0"/>
@@ -6023,7 +5922,7 @@
               <a:blipFill>
                 <a:blip r:embed="rId2"/>
                 <a:stretch>
-                  <a:fillRect l="-829" t="-14570" r="-166" b="-2815"/>
+                  <a:fillRect l="-829" t="-14570" b="-2815"/>
                 </a:stretch>
               </a:blipFill>
             </p:spPr>
@@ -13828,8 +13727,8 @@
           </a:p>
         </p:txBody>
       </p:sp>
-      <mc:AlternateContent xmlns:mc="http://schemas.openxmlformats.org/markup-compatibility/2006" xmlns:a14="http://schemas.microsoft.com/office/drawing/2010/main">
-        <mc:Choice Requires="a14">
+      <mc:AlternateContent xmlns:mc="http://schemas.openxmlformats.org/markup-compatibility/2006">
+        <mc:Choice xmlns:a14="http://schemas.microsoft.com/office/drawing/2010/main" Requires="a14">
           <p:sp>
             <p:nvSpPr>
               <p:cNvPr id="3" name="Місце для вмісту 2">
@@ -13886,48 +13785,16 @@
                   <a:buNone/>
                 </a:pPr>
                 <a:r>
-                  <a:rPr lang="ru-RU" sz="2400" dirty="0" err="1"/>
-                  <a:t>Розглянуто</a:t>
+                  <a:rPr lang="uk-UA" sz="2400" dirty="0"/>
+                  <a:t>Розглянуто методи статистичного</a:t>
                 </a:r>
                 <a:r>
                   <a:rPr lang="ru-RU" sz="2400" dirty="0"/>
                   <a:t> </a:t>
                 </a:r>
                 <a:r>
-                  <a:rPr lang="ru-RU" sz="2400" dirty="0" err="1"/>
-                  <a:t>методи</a:t>
-                </a:r>
-                <a:r>
-                  <a:rPr lang="ru-RU" sz="2400" dirty="0"/>
-                  <a:t> </a:t>
-                </a:r>
-                <a:r>
-                  <a:rPr lang="ru-RU" sz="2400" dirty="0" err="1"/>
-                  <a:t>статистичного</a:t>
-                </a:r>
-                <a:r>
-                  <a:rPr lang="ru-RU" sz="2400" dirty="0"/>
-                  <a:t> </a:t>
-                </a:r>
-                <a:r>
-                  <a:rPr lang="ru-RU" sz="2400" dirty="0" err="1"/>
-                  <a:t>аналізу</a:t>
-                </a:r>
-                <a:r>
-                  <a:rPr lang="ru-RU" sz="2400" dirty="0"/>
-                  <a:t> </a:t>
-                </a:r>
-                <a:r>
-                  <a:rPr lang="ru-RU" sz="2400" dirty="0" err="1"/>
-                  <a:t>генетичної</a:t>
-                </a:r>
-                <a:r>
-                  <a:rPr lang="ru-RU" sz="2400" dirty="0"/>
-                  <a:t> </a:t>
-                </a:r>
-                <a:r>
-                  <a:rPr lang="ru-RU" sz="2400" dirty="0" err="1"/>
-                  <a:t>інформації</a:t>
+                  <a:rPr lang="uk-UA" sz="2400" dirty="0"/>
+                  <a:t>аналізу генетичної інформації</a:t>
                 </a:r>
                 <a:r>
                   <a:rPr lang="en-US" sz="2400" dirty="0"/>
@@ -14034,7 +13901,7 @@
             </p:txBody>
           </p:sp>
         </mc:Choice>
-        <mc:Fallback xmlns="">
+        <mc:Fallback>
           <p:sp>
             <p:nvSpPr>
               <p:cNvPr id="3" name="Місце для вмісту 2">

</xml_diff>